<commit_message>
Container Technology and Docker Containers
</commit_message>
<xml_diff>
--- a/docker.pptx
+++ b/docker.pptx
@@ -7,14 +7,15 @@
   <p:sldIdLst>
     <p:sldId id="256" r:id="rId2"/>
     <p:sldId id="257" r:id="rId3"/>
-    <p:sldId id="270" r:id="rId4"/>
-    <p:sldId id="258" r:id="rId5"/>
-    <p:sldId id="259" r:id="rId6"/>
-    <p:sldId id="273" r:id="rId7"/>
-    <p:sldId id="271" r:id="rId8"/>
-    <p:sldId id="272" r:id="rId9"/>
-    <p:sldId id="268" r:id="rId10"/>
-    <p:sldId id="261" r:id="rId11"/>
+    <p:sldId id="274" r:id="rId4"/>
+    <p:sldId id="270" r:id="rId5"/>
+    <p:sldId id="258" r:id="rId6"/>
+    <p:sldId id="259" r:id="rId7"/>
+    <p:sldId id="273" r:id="rId8"/>
+    <p:sldId id="271" r:id="rId9"/>
+    <p:sldId id="272" r:id="rId10"/>
+    <p:sldId id="268" r:id="rId11"/>
+    <p:sldId id="261" r:id="rId12"/>
   </p:sldIdLst>
   <p:sldSz cx="12192000" cy="6858000"/>
   <p:notesSz cx="6858000" cy="9144000"/>
@@ -452,7 +453,7 @@
             <a:fld id="{5923F103-BC34-4FE4-A40E-EDDEECFDA5D0}" type="datetimeFigureOut">
               <a:rPr lang="en-US" dirty="0"/>
               <a:pPr/>
-              <a:t>5/16/2021</a:t>
+              <a:t>5/19/2021</a:t>
             </a:fld>
             <a:endParaRPr lang="en-US" dirty="0"/>
           </a:p>
@@ -1536,7 +1537,7 @@
           <a:p>
             <a:fld id="{923A1CC3-2375-41D4-9E03-427CAF2A4C1A}" type="datetimeFigureOut">
               <a:rPr lang="en-US" dirty="0"/>
-              <a:t>5/16/2021</a:t>
+              <a:t>5/19/2021</a:t>
             </a:fld>
             <a:endParaRPr lang="en-US" dirty="0"/>
           </a:p>
@@ -2512,7 +2513,7 @@
           <a:p>
             <a:fld id="{AFF16868-8199-4C2C-A5B1-63AEE139F88E}" type="datetimeFigureOut">
               <a:rPr lang="en-US" dirty="0"/>
-              <a:t>5/16/2021</a:t>
+              <a:t>5/19/2021</a:t>
             </a:fld>
             <a:endParaRPr lang="en-US" dirty="0"/>
           </a:p>
@@ -3642,7 +3643,7 @@
           <a:p>
             <a:fld id="{AAD9FF7F-6988-44CC-821B-644E70CD2F73}" type="datetimeFigureOut">
               <a:rPr lang="en-US" dirty="0"/>
-              <a:t>5/16/2021</a:t>
+              <a:t>5/19/2021</a:t>
             </a:fld>
             <a:endParaRPr lang="en-US" dirty="0"/>
           </a:p>
@@ -4671,7 +4672,7 @@
           <a:p>
             <a:fld id="{5C12C299-16B2-4475-990D-751901EACC14}" type="datetimeFigureOut">
               <a:rPr lang="en-US" dirty="0"/>
-              <a:t>5/16/2021</a:t>
+              <a:t>5/19/2021</a:t>
             </a:fld>
             <a:endParaRPr lang="en-US" dirty="0"/>
           </a:p>
@@ -5327,7 +5328,7 @@
           <a:p>
             <a:fld id="{9FE86839-B9D8-4651-8783-F325ECE74E65}" type="datetimeFigureOut">
               <a:rPr lang="en-US" dirty="0"/>
-              <a:t>5/16/2021</a:t>
+              <a:t>5/19/2021</a:t>
             </a:fld>
             <a:endParaRPr lang="en-US" dirty="0"/>
           </a:p>
@@ -6184,7 +6185,7 @@
           <a:p>
             <a:fld id="{FD484F64-32F6-45C5-931F-ADC1662401D0}" type="datetimeFigureOut">
               <a:rPr lang="en-US" dirty="0"/>
-              <a:t>5/16/2021</a:t>
+              <a:t>5/19/2021</a:t>
             </a:fld>
             <a:endParaRPr lang="en-US" dirty="0"/>
           </a:p>
@@ -6370,7 +6371,7 @@
           <a:p>
             <a:fld id="{53086D93-FCAC-47E0-A2EE-787E62CA814C}" type="datetimeFigureOut">
               <a:rPr lang="en-US" dirty="0"/>
-              <a:t>5/16/2021</a:t>
+              <a:t>5/19/2021</a:t>
             </a:fld>
             <a:endParaRPr lang="en-US" dirty="0"/>
           </a:p>
@@ -7338,7 +7339,7 @@
           <a:p>
             <a:fld id="{CDA879A6-0FD0-4734-A311-86BFCA472E6E}" type="datetimeFigureOut">
               <a:rPr lang="en-US" dirty="0"/>
-              <a:t>5/16/2021</a:t>
+              <a:t>5/19/2021</a:t>
             </a:fld>
             <a:endParaRPr lang="en-US" dirty="0"/>
           </a:p>
@@ -7545,7 +7546,7 @@
           <a:p>
             <a:fld id="{19C9CA7B-DFD4-44B5-8C60-D14B8CD1FB59}" type="datetimeFigureOut">
               <a:rPr lang="en-US" dirty="0"/>
-              <a:t>5/16/2021</a:t>
+              <a:t>5/19/2021</a:t>
             </a:fld>
             <a:endParaRPr lang="en-US" dirty="0"/>
           </a:p>
@@ -8575,7 +8576,7 @@
           <a:p>
             <a:fld id="{F34E6425-0181-43F2-84FC-787E803FD2F8}" type="datetimeFigureOut">
               <a:rPr lang="en-US" dirty="0"/>
-              <a:t>5/16/2021</a:t>
+              <a:t>5/19/2021</a:t>
             </a:fld>
             <a:endParaRPr lang="en-US" dirty="0"/>
           </a:p>
@@ -8843,7 +8844,7 @@
           <a:p>
             <a:fld id="{3BDB8791-F1B0-41E7-B7FD-A781E65C4266}" type="datetimeFigureOut">
               <a:rPr lang="en-US" dirty="0"/>
-              <a:t>5/16/2021</a:t>
+              <a:t>5/19/2021</a:t>
             </a:fld>
             <a:endParaRPr lang="en-US" dirty="0"/>
           </a:p>
@@ -9249,7 +9250,7 @@
           <a:p>
             <a:fld id="{5FDD63B2-E120-4ED8-B27B-C685F510A5FE}" type="datetimeFigureOut">
               <a:rPr lang="en-US" dirty="0"/>
-              <a:t>5/16/2021</a:t>
+              <a:t>5/19/2021</a:t>
             </a:fld>
             <a:endParaRPr lang="en-US" dirty="0"/>
           </a:p>
@@ -9372,7 +9373,7 @@
           <a:p>
             <a:fld id="{7AA18ACC-A947-437B-A130-35BD54FDF1E9}" type="datetimeFigureOut">
               <a:rPr lang="en-US" dirty="0"/>
-              <a:t>5/16/2021</a:t>
+              <a:t>5/19/2021</a:t>
             </a:fld>
             <a:endParaRPr lang="en-US" dirty="0"/>
           </a:p>
@@ -9463,7 +9464,7 @@
           <a:p>
             <a:fld id="{7C8D7E02-BCB8-4D50-A234-369438C08659}" type="datetimeFigureOut">
               <a:rPr lang="en-US" dirty="0"/>
-              <a:t>5/16/2021</a:t>
+              <a:t>5/19/2021</a:t>
             </a:fld>
             <a:endParaRPr lang="en-US" dirty="0"/>
           </a:p>
@@ -10540,7 +10541,7 @@
           <a:p>
             <a:fld id="{76E86A4C-8E40-4F87-A4F0-01A0687C5742}" type="datetimeFigureOut">
               <a:rPr lang="en-US" dirty="0"/>
-              <a:t>5/16/2021</a:t>
+              <a:t>5/19/2021</a:t>
             </a:fld>
             <a:endParaRPr lang="en-US" dirty="0"/>
           </a:p>
@@ -11644,7 +11645,7 @@
           <a:p>
             <a:fld id="{35E72C73-2D91-4E12-BA25-F0AA0C03599B}" type="datetimeFigureOut">
               <a:rPr lang="en-US" dirty="0"/>
-              <a:t>5/16/2021</a:t>
+              <a:t>5/19/2021</a:t>
             </a:fld>
             <a:endParaRPr lang="en-US" dirty="0"/>
           </a:p>
@@ -12637,7 +12638,7 @@
           <a:p>
             <a:fld id="{2BE451C3-0FF4-47C4-B829-773ADF60F88C}" type="datetimeFigureOut">
               <a:rPr lang="en-US" dirty="0"/>
-              <a:t>5/16/2021</a:t>
+              <a:t>5/19/2021</a:t>
             </a:fld>
             <a:endParaRPr lang="en-US" dirty="0"/>
           </a:p>
@@ -13198,7 +13199,7 @@
           <p:cNvPr id="2" name="Title 1">
             <a:extLst>
               <a:ext uri="{FF2B5EF4-FFF2-40B4-BE49-F238E27FC236}">
-                <a16:creationId xmlns="" xmlns:a16="http://schemas.microsoft.com/office/drawing/2014/main" id="{21636317-EC45-C244-A3D9-EA8C110D2BF3}"/>
+                <a16:creationId xmlns:a16="http://schemas.microsoft.com/office/drawing/2014/main" xmlns="" id="{21636317-EC45-C244-A3D9-EA8C110D2BF3}"/>
               </a:ext>
             </a:extLst>
           </p:cNvPr>
@@ -13227,7 +13228,7 @@
           <p:cNvPr id="3" name="Subtitle 2">
             <a:extLst>
               <a:ext uri="{FF2B5EF4-FFF2-40B4-BE49-F238E27FC236}">
-                <a16:creationId xmlns="" xmlns:a16="http://schemas.microsoft.com/office/drawing/2014/main" id="{1ACCAD81-8D75-CD4F-A3A2-1EE0DA200391}"/>
+                <a16:creationId xmlns:a16="http://schemas.microsoft.com/office/drawing/2014/main" xmlns="" id="{1ACCAD81-8D75-CD4F-A3A2-1EE0DA200391}"/>
               </a:ext>
             </a:extLst>
           </p:cNvPr>
@@ -13243,7 +13244,7 @@
           <a:bodyPr/>
           <a:lstStyle/>
           <a:p>
-            <a:endParaRPr lang="en-US"/>
+            <a:endParaRPr lang="en-US" dirty="0"/>
           </a:p>
         </p:txBody>
       </p:sp>
@@ -13289,7 +13290,7 @@
           <p:cNvPr id="2" name="Title 1">
             <a:extLst>
               <a:ext uri="{FF2B5EF4-FFF2-40B4-BE49-F238E27FC236}">
-                <a16:creationId xmlns="" xmlns:a16="http://schemas.microsoft.com/office/drawing/2014/main" id="{E6BED199-5988-3649-A777-705A2852C012}"/>
+                <a16:creationId xmlns:a16="http://schemas.microsoft.com/office/drawing/2014/main" xmlns="" id="{022EF37B-0053-5445-92AD-0BFB56B8098A}"/>
               </a:ext>
             </a:extLst>
           </p:cNvPr>
@@ -13306,18 +13307,10 @@
           <a:lstStyle/>
           <a:p>
             <a:r>
-              <a:rPr lang="en-IN" dirty="0" err="1" smtClean="0"/>
-              <a:t>Docker</a:t>
-            </a:r>
-            <a:r>
-              <a:rPr lang="en-IN" dirty="0" smtClean="0"/>
-              <a:t> </a:t>
-            </a:r>
-            <a:r>
-              <a:rPr lang="en-IN" dirty="0" smtClean="0"/>
-              <a:t>Commands</a:t>
-            </a:r>
-            <a:endParaRPr lang="en-US" dirty="0"/>
+              <a:rPr lang="en-IN"/>
+              <a:t>Docker Registry</a:t>
+            </a:r>
+            <a:endParaRPr lang="en-US"/>
           </a:p>
         </p:txBody>
       </p:sp>
@@ -13326,7 +13319,258 @@
           <p:cNvPr id="3" name="Content Placeholder 2">
             <a:extLst>
               <a:ext uri="{FF2B5EF4-FFF2-40B4-BE49-F238E27FC236}">
-                <a16:creationId xmlns="" xmlns:a16="http://schemas.microsoft.com/office/drawing/2014/main" id="{ECCCB671-0E58-9841-9F17-CC45A8AFCFC0}"/>
+                <a16:creationId xmlns:a16="http://schemas.microsoft.com/office/drawing/2014/main" xmlns="" id="{5D72B523-BBC6-CD48-9A35-296DF2B31BD1}"/>
+              </a:ext>
+            </a:extLst>
+          </p:cNvPr>
+          <p:cNvSpPr>
+            <a:spLocks noGrp="1"/>
+          </p:cNvSpPr>
+          <p:nvPr>
+            <p:ph idx="1"/>
+          </p:nvPr>
+        </p:nvSpPr>
+        <p:spPr>
+          <a:xfrm>
+            <a:off x="533400" y="2286000"/>
+            <a:ext cx="11277600" cy="4343400"/>
+          </a:xfrm>
+        </p:spPr>
+        <p:txBody>
+          <a:bodyPr/>
+          <a:lstStyle/>
+          <a:p>
+            <a:pPr algn="just"/>
+            <a:r>
+              <a:rPr lang="en-US" dirty="0" smtClean="0">
+                <a:latin typeface="Open Sans"/>
+              </a:rPr>
+              <a:t>The </a:t>
+            </a:r>
+            <a:r>
+              <a:rPr lang="en-US" dirty="0" err="1" smtClean="0">
+                <a:latin typeface="Open Sans"/>
+              </a:rPr>
+              <a:t>Docker</a:t>
+            </a:r>
+            <a:r>
+              <a:rPr lang="en-US" dirty="0" smtClean="0">
+                <a:latin typeface="Open Sans"/>
+              </a:rPr>
+              <a:t> Registry is the stateless, highly scalable server side application that stores and let </a:t>
+            </a:r>
+            <a:r>
+              <a:rPr lang="en-US" dirty="0" err="1" smtClean="0">
+                <a:latin typeface="Open Sans"/>
+              </a:rPr>
+              <a:t>distributedocker</a:t>
+            </a:r>
+            <a:r>
+              <a:rPr lang="en-US" dirty="0" smtClean="0">
+                <a:latin typeface="Open Sans"/>
+              </a:rPr>
+              <a:t> images. It allows:</a:t>
+            </a:r>
+          </a:p>
+          <a:p>
+            <a:pPr lvl="1" algn="just"/>
+            <a:r>
+              <a:rPr lang="en-US" dirty="0" smtClean="0">
+                <a:latin typeface="Open Sans"/>
+              </a:rPr>
+              <a:t>Tightly control where your images are stored.</a:t>
+            </a:r>
+          </a:p>
+          <a:p>
+            <a:pPr lvl="1" algn="just"/>
+            <a:r>
+              <a:rPr lang="en-US" dirty="0" smtClean="0">
+                <a:latin typeface="Open Sans"/>
+              </a:rPr>
+              <a:t>Fully own your image distribution pipeline</a:t>
+            </a:r>
+          </a:p>
+          <a:p>
+            <a:pPr lvl="1" algn="just"/>
+            <a:r>
+              <a:rPr lang="en-US" dirty="0" smtClean="0">
+                <a:latin typeface="Open Sans"/>
+              </a:rPr>
+              <a:t>Integrate image storage and distribution tightly into your in-house development workflow.</a:t>
+            </a:r>
+          </a:p>
+          <a:p>
+            <a:pPr lvl="1" algn="just"/>
+            <a:r>
+              <a:rPr lang="en-US" dirty="0" smtClean="0">
+                <a:latin typeface="Open Sans"/>
+              </a:rPr>
+              <a:t>Commands:</a:t>
+            </a:r>
+          </a:p>
+          <a:p>
+            <a:pPr marL="457200" lvl="1" indent="0" algn="just">
+              <a:buNone/>
+            </a:pPr>
+            <a:r>
+              <a:rPr lang="en-US" dirty="0">
+                <a:latin typeface="Open Sans"/>
+              </a:rPr>
+              <a:t>	</a:t>
+            </a:r>
+            <a:r>
+              <a:rPr lang="en-US" dirty="0" smtClean="0">
+                <a:latin typeface="Open Sans"/>
+              </a:rPr>
+              <a:t>To start registry: </a:t>
+            </a:r>
+            <a:r>
+              <a:rPr lang="en-US" dirty="0" err="1" smtClean="0">
+                <a:latin typeface="Open Sans"/>
+              </a:rPr>
+              <a:t>docker</a:t>
+            </a:r>
+            <a:r>
+              <a:rPr lang="en-US" dirty="0" smtClean="0">
+                <a:latin typeface="Open Sans"/>
+              </a:rPr>
+              <a:t> run –d –p 5000:5000 –name registry registry:2</a:t>
+            </a:r>
+          </a:p>
+          <a:p>
+            <a:pPr marL="457200" lvl="1" indent="0" algn="just">
+              <a:buNone/>
+            </a:pPr>
+            <a:r>
+              <a:rPr lang="en-US" dirty="0">
+                <a:latin typeface="Open Sans"/>
+              </a:rPr>
+              <a:t>	</a:t>
+            </a:r>
+            <a:r>
+              <a:rPr lang="en-US" dirty="0" smtClean="0">
+                <a:latin typeface="Open Sans"/>
+              </a:rPr>
+              <a:t>To stop Registry: </a:t>
+            </a:r>
+            <a:r>
+              <a:rPr lang="en-US" dirty="0" err="1" smtClean="0">
+                <a:latin typeface="Open Sans"/>
+              </a:rPr>
+              <a:t>docker</a:t>
+            </a:r>
+            <a:r>
+              <a:rPr lang="en-US" dirty="0" smtClean="0">
+                <a:latin typeface="Open Sans"/>
+              </a:rPr>
+              <a:t> container stop registry &amp;&amp;  </a:t>
+            </a:r>
+            <a:r>
+              <a:rPr lang="en-US" dirty="0" err="1" smtClean="0">
+                <a:latin typeface="Open Sans"/>
+              </a:rPr>
+              <a:t>docker</a:t>
+            </a:r>
+            <a:r>
+              <a:rPr lang="en-US" dirty="0" smtClean="0">
+                <a:latin typeface="Open Sans"/>
+              </a:rPr>
+              <a:t> container </a:t>
+            </a:r>
+            <a:r>
+              <a:rPr lang="en-US" dirty="0" err="1" smtClean="0">
+                <a:latin typeface="Open Sans"/>
+              </a:rPr>
+              <a:t>rm</a:t>
+            </a:r>
+            <a:r>
+              <a:rPr lang="en-US" dirty="0" smtClean="0">
+                <a:latin typeface="Open Sans"/>
+              </a:rPr>
+              <a:t> –v registry </a:t>
+            </a:r>
+            <a:endParaRPr lang="en-US" dirty="0">
+              <a:latin typeface="Open Sans"/>
+            </a:endParaRPr>
+          </a:p>
+        </p:txBody>
+      </p:sp>
+    </p:spTree>
+    <p:extLst>
+      <p:ext uri="{BB962C8B-B14F-4D97-AF65-F5344CB8AC3E}">
+        <p14:creationId xmlns:p14="http://schemas.microsoft.com/office/powerpoint/2010/main" val="1699113012"/>
+      </p:ext>
+    </p:extLst>
+  </p:cSld>
+  <p:clrMapOvr>
+    <a:masterClrMapping/>
+  </p:clrMapOvr>
+  <p:timing>
+    <p:tnLst>
+      <p:par>
+        <p:cTn id="1" dur="indefinite" restart="never" nodeType="tmRoot"/>
+      </p:par>
+    </p:tnLst>
+  </p:timing>
+</p:sld>
+</file>
+
+<file path=ppt/slides/slide11.xml><?xml version="1.0" encoding="utf-8"?>
+<p:sld xmlns:a="http://schemas.openxmlformats.org/drawingml/2006/main" xmlns:r="http://schemas.openxmlformats.org/officeDocument/2006/relationships" xmlns:p="http://schemas.openxmlformats.org/presentationml/2006/main">
+  <p:cSld>
+    <p:spTree>
+      <p:nvGrpSpPr>
+        <p:cNvPr id="1" name=""/>
+        <p:cNvGrpSpPr/>
+        <p:nvPr/>
+      </p:nvGrpSpPr>
+      <p:grpSpPr>
+        <a:xfrm>
+          <a:off x="0" y="0"/>
+          <a:ext cx="0" cy="0"/>
+          <a:chOff x="0" y="0"/>
+          <a:chExt cx="0" cy="0"/>
+        </a:xfrm>
+      </p:grpSpPr>
+      <p:sp>
+        <p:nvSpPr>
+          <p:cNvPr id="2" name="Title 1">
+            <a:extLst>
+              <a:ext uri="{FF2B5EF4-FFF2-40B4-BE49-F238E27FC236}">
+                <a16:creationId xmlns:a16="http://schemas.microsoft.com/office/drawing/2014/main" xmlns="" id="{E6BED199-5988-3649-A777-705A2852C012}"/>
+              </a:ext>
+            </a:extLst>
+          </p:cNvPr>
+          <p:cNvSpPr>
+            <a:spLocks noGrp="1"/>
+          </p:cNvSpPr>
+          <p:nvPr>
+            <p:ph type="title"/>
+          </p:nvPr>
+        </p:nvSpPr>
+        <p:spPr/>
+        <p:txBody>
+          <a:bodyPr/>
+          <a:lstStyle/>
+          <a:p>
+            <a:r>
+              <a:rPr lang="en-IN" dirty="0" err="1" smtClean="0"/>
+              <a:t>Docker</a:t>
+            </a:r>
+            <a:r>
+              <a:rPr lang="en-IN" dirty="0" smtClean="0"/>
+              <a:t> Commands</a:t>
+            </a:r>
+            <a:endParaRPr lang="en-US" dirty="0"/>
+          </a:p>
+        </p:txBody>
+      </p:sp>
+      <p:sp>
+        <p:nvSpPr>
+          <p:cNvPr id="3" name="Content Placeholder 2">
+            <a:extLst>
+              <a:ext uri="{FF2B5EF4-FFF2-40B4-BE49-F238E27FC236}">
+                <a16:creationId xmlns:a16="http://schemas.microsoft.com/office/drawing/2014/main" xmlns="" id="{ECCCB671-0E58-9841-9F17-CC45A8AFCFC0}"/>
               </a:ext>
             </a:extLst>
           </p:cNvPr>
@@ -13398,13 +13642,19 @@
               <a:rPr lang="en-US" dirty="0" smtClean="0">
                 <a:latin typeface="Open Sans"/>
               </a:rPr>
-              <a:t> </a:t>
+              <a:t> version 	$</a:t>
+            </a:r>
+            <a:r>
+              <a:rPr lang="en-US" dirty="0" err="1" smtClean="0">
+                <a:latin typeface="Open Sans"/>
+              </a:rPr>
+              <a:t>docker</a:t>
             </a:r>
             <a:r>
               <a:rPr lang="en-US" dirty="0" smtClean="0">
                 <a:latin typeface="Open Sans"/>
               </a:rPr>
-              <a:t>version 	$</a:t>
+              <a:t> –help		$</a:t>
             </a:r>
             <a:r>
               <a:rPr lang="en-US" dirty="0" err="1" smtClean="0">
@@ -13416,19 +13666,31 @@
               <a:rPr lang="en-US" dirty="0" smtClean="0">
                 <a:latin typeface="Open Sans"/>
               </a:rPr>
-              <a:t> </a:t>
+              <a:t> &lt;command&gt; --help		$</a:t>
+            </a:r>
+            <a:r>
+              <a:rPr lang="en-US" dirty="0" err="1" smtClean="0">
+                <a:latin typeface="Open Sans"/>
+              </a:rPr>
+              <a:t>docker</a:t>
             </a:r>
             <a:r>
               <a:rPr lang="en-US" dirty="0" smtClean="0">
                 <a:latin typeface="Open Sans"/>
               </a:rPr>
-              <a:t>–</a:t>
+              <a:t> login		$</a:t>
+            </a:r>
+            <a:r>
+              <a:rPr lang="en-US" dirty="0" err="1" smtClean="0">
+                <a:latin typeface="Open Sans"/>
+              </a:rPr>
+              <a:t>docker</a:t>
             </a:r>
             <a:r>
               <a:rPr lang="en-US" dirty="0" smtClean="0">
                 <a:latin typeface="Open Sans"/>
               </a:rPr>
-              <a:t>help		$</a:t>
+              <a:t> attach $</a:t>
             </a:r>
             <a:r>
               <a:rPr lang="en-US" dirty="0" err="1" smtClean="0">
@@ -13440,7 +13702,7 @@
               <a:rPr lang="en-US" dirty="0" smtClean="0">
                 <a:latin typeface="Open Sans"/>
               </a:rPr>
-              <a:t> &lt;command&gt; --help		$</a:t>
+              <a:t> build		$</a:t>
             </a:r>
             <a:r>
               <a:rPr lang="en-US" dirty="0" err="1" smtClean="0">
@@ -13452,61 +13714,7 @@
               <a:rPr lang="en-US" dirty="0" smtClean="0">
                 <a:latin typeface="Open Sans"/>
               </a:rPr>
-              <a:t> login		</a:t>
-            </a:r>
-            <a:r>
-              <a:rPr lang="en-US" dirty="0" smtClean="0">
-                <a:latin typeface="Open Sans"/>
-              </a:rPr>
-              <a:t>$</a:t>
-            </a:r>
-            <a:r>
-              <a:rPr lang="en-US" dirty="0" err="1" smtClean="0">
-                <a:latin typeface="Open Sans"/>
-              </a:rPr>
-              <a:t>docker</a:t>
-            </a:r>
-            <a:r>
-              <a:rPr lang="en-US" dirty="0" smtClean="0">
-                <a:latin typeface="Open Sans"/>
-              </a:rPr>
-              <a:t> attach </a:t>
-            </a:r>
-            <a:r>
-              <a:rPr lang="en-US" dirty="0" smtClean="0">
-                <a:latin typeface="Open Sans"/>
-              </a:rPr>
-              <a:t>$</a:t>
-            </a:r>
-            <a:r>
-              <a:rPr lang="en-US" dirty="0" err="1" smtClean="0">
-                <a:latin typeface="Open Sans"/>
-              </a:rPr>
-              <a:t>docker</a:t>
-            </a:r>
-            <a:r>
-              <a:rPr lang="en-US" dirty="0" smtClean="0">
-                <a:latin typeface="Open Sans"/>
-              </a:rPr>
-              <a:t> build		$</a:t>
-            </a:r>
-            <a:r>
-              <a:rPr lang="en-US" dirty="0" err="1" smtClean="0">
-                <a:latin typeface="Open Sans"/>
-              </a:rPr>
-              <a:t>docker</a:t>
-            </a:r>
-            <a:r>
-              <a:rPr lang="en-US" dirty="0" smtClean="0">
-                <a:latin typeface="Open Sans"/>
-              </a:rPr>
-              <a:t> builder	</a:t>
-            </a:r>
-            <a:r>
-              <a:rPr lang="en-US" dirty="0" smtClean="0">
-                <a:latin typeface="Open Sans"/>
-              </a:rPr>
-              <a:t>$</a:t>
+              <a:t> builder	$</a:t>
             </a:r>
             <a:r>
               <a:rPr lang="en-US" dirty="0" err="1" smtClean="0">
@@ -14565,9 +14773,6 @@
               </a:rPr>
               <a:t>Ref: https://docs.docker.com/engine/reference/commandline/docker/</a:t>
             </a:r>
-            <a:endParaRPr lang="en-US" dirty="0" smtClean="0">
-              <a:latin typeface="Open Sans"/>
-            </a:endParaRPr>
           </a:p>
         </p:txBody>
       </p:sp>
@@ -14613,7 +14818,7 @@
           <p:cNvPr id="2" name="Title 1">
             <a:extLst>
               <a:ext uri="{FF2B5EF4-FFF2-40B4-BE49-F238E27FC236}">
-                <a16:creationId xmlns="" xmlns:a16="http://schemas.microsoft.com/office/drawing/2014/main" id="{9BA1904D-3783-564B-8293-3ACF5C93F8BE}"/>
+                <a16:creationId xmlns:a16="http://schemas.microsoft.com/office/drawing/2014/main" xmlns="" id="{9BA1904D-3783-564B-8293-3ACF5C93F8BE}"/>
               </a:ext>
             </a:extLst>
           </p:cNvPr>
@@ -14642,7 +14847,7 @@
           <p:cNvPr id="3" name="Content Placeholder 2">
             <a:extLst>
               <a:ext uri="{FF2B5EF4-FFF2-40B4-BE49-F238E27FC236}">
-                <a16:creationId xmlns="" xmlns:a16="http://schemas.microsoft.com/office/drawing/2014/main" id="{71366C8A-5967-BF47-B1BA-B0D4AA74949F}"/>
+                <a16:creationId xmlns:a16="http://schemas.microsoft.com/office/drawing/2014/main" xmlns="" id="{71366C8A-5967-BF47-B1BA-B0D4AA74949F}"/>
               </a:ext>
             </a:extLst>
           </p:cNvPr>
@@ -14853,16 +15058,37 @@
             <p:ph type="title"/>
           </p:nvPr>
         </p:nvSpPr>
-        <p:spPr/>
+        <p:spPr>
+          <a:xfrm>
+            <a:off x="1143000" y="973668"/>
+            <a:ext cx="9296400" cy="706964"/>
+          </a:xfrm>
+        </p:spPr>
         <p:txBody>
           <a:bodyPr/>
           <a:lstStyle/>
           <a:p>
             <a:r>
-              <a:rPr lang="en-US" dirty="0" smtClean="0"/>
-              <a:t>Virtualization and Containerization</a:t>
-            </a:r>
-            <a:endParaRPr lang="en-US" dirty="0"/>
+              <a:rPr lang="en-US" dirty="0" smtClean="0">
+                <a:latin typeface="Open Sans"/>
+              </a:rPr>
+              <a:t>Container Technology and </a:t>
+            </a:r>
+            <a:r>
+              <a:rPr lang="en-US" dirty="0" err="1" smtClean="0">
+                <a:latin typeface="Open Sans"/>
+              </a:rPr>
+              <a:t>Docker</a:t>
+            </a:r>
+            <a:r>
+              <a:rPr lang="en-US" dirty="0" smtClean="0">
+                <a:latin typeface="Open Sans"/>
+              </a:rPr>
+              <a:t> Container</a:t>
+            </a:r>
+            <a:endParaRPr lang="en-US" dirty="0">
+              <a:latin typeface="Open Sans"/>
+            </a:endParaRPr>
           </a:p>
         </p:txBody>
       </p:sp>
@@ -14878,136 +15104,216 @@
         </p:nvSpPr>
         <p:spPr>
           <a:xfrm>
-            <a:off x="457200" y="2362200"/>
-            <a:ext cx="11353800" cy="4343400"/>
+            <a:off x="533400" y="2603500"/>
+            <a:ext cx="11277600" cy="3721100"/>
           </a:xfrm>
         </p:spPr>
         <p:txBody>
-          <a:bodyPr/>
+          <a:bodyPr>
+            <a:normAutofit/>
+          </a:bodyPr>
           <a:lstStyle/>
           <a:p>
-            <a:r>
-              <a:rPr lang="en-US" b="1" dirty="0">
+            <a:pPr algn="just"/>
+            <a:r>
+              <a:rPr lang="en-US" sz="1600" b="1" dirty="0">
+                <a:latin typeface="Open Sans"/>
+              </a:rPr>
+              <a:t>Container technology</a:t>
+            </a:r>
+            <a:r>
+              <a:rPr lang="en-US" sz="1600" dirty="0">
+                <a:latin typeface="Open Sans"/>
+              </a:rPr>
+              <a:t>, also simply known as just a container, is a method to package an application so it can be run, with its dependencies, isolated from other </a:t>
+            </a:r>
+            <a:r>
+              <a:rPr lang="en-US" sz="1600" dirty="0" smtClean="0">
+                <a:latin typeface="Open Sans"/>
+              </a:rPr>
+              <a:t>processes. In other words, a container </a:t>
+            </a:r>
+            <a:r>
+              <a:rPr lang="en-US" sz="1600" dirty="0">
+                <a:latin typeface="Open Sans"/>
+              </a:rPr>
+              <a:t>is a standard unit of software that packages up code and all its dependencies so the application runs quickly and reliably from one computing </a:t>
+            </a:r>
+            <a:r>
+              <a:rPr lang="en-US" sz="1600" dirty="0" smtClean="0">
+                <a:latin typeface="Open Sans"/>
+              </a:rPr>
+              <a:t>environment </a:t>
+            </a:r>
+            <a:r>
+              <a:rPr lang="en-US" sz="1600" dirty="0">
+                <a:latin typeface="Open Sans"/>
+              </a:rPr>
+              <a:t>to another</a:t>
+            </a:r>
+            <a:r>
+              <a:rPr lang="en-US" sz="1600" dirty="0" smtClean="0">
+                <a:latin typeface="Open Sans"/>
+              </a:rPr>
+              <a:t>. </a:t>
+            </a:r>
+            <a:r>
+              <a:rPr lang="en-US" sz="1600" dirty="0">
+                <a:latin typeface="Open Sans"/>
+              </a:rPr>
+              <a:t>In short, by standardizing the process, and keeping the items together, the container can be moved as a unit, and it costs less to do it this way</a:t>
+            </a:r>
+            <a:r>
+              <a:rPr lang="en-US" sz="1600" dirty="0" smtClean="0">
+                <a:latin typeface="Open Sans"/>
+              </a:rPr>
+              <a:t>.</a:t>
+            </a:r>
+          </a:p>
+          <a:p>
+            <a:pPr algn="just"/>
+            <a:r>
+              <a:rPr lang="en-US" sz="1600" dirty="0">
+                <a:latin typeface="Open Sans"/>
+              </a:rPr>
+              <a:t>A </a:t>
+            </a:r>
+            <a:r>
+              <a:rPr lang="en-US" sz="1600" b="1" dirty="0" err="1" smtClean="0">
+                <a:latin typeface="Open Sans"/>
+              </a:rPr>
+              <a:t>Docker</a:t>
+            </a:r>
+            <a:r>
+              <a:rPr lang="en-US" sz="1600" b="1" dirty="0" smtClean="0">
+                <a:latin typeface="Open Sans"/>
+              </a:rPr>
+              <a:t> Container</a:t>
+            </a:r>
+            <a:r>
+              <a:rPr lang="en-US" sz="1600" dirty="0" smtClean="0">
+                <a:latin typeface="Open Sans"/>
+              </a:rPr>
+              <a:t> </a:t>
+            </a:r>
+            <a:r>
+              <a:rPr lang="en-US" sz="1600" dirty="0">
+                <a:latin typeface="Open Sans"/>
+              </a:rPr>
+              <a:t>is a standard unit of software that packages up code and all its dependencies so the application runs quickly and reliably from one computing environment to another. A </a:t>
+            </a:r>
+            <a:r>
+              <a:rPr lang="en-US" sz="1600" dirty="0" err="1">
+                <a:latin typeface="Open Sans"/>
+              </a:rPr>
+              <a:t>Docker</a:t>
+            </a:r>
+            <a:r>
+              <a:rPr lang="en-US" sz="1600" dirty="0">
+                <a:latin typeface="Open Sans"/>
+              </a:rPr>
+              <a:t> </a:t>
+            </a:r>
+            <a:r>
+              <a:rPr lang="en-US" sz="1600" dirty="0" smtClean="0">
+                <a:latin typeface="Open Sans"/>
+              </a:rPr>
+              <a:t>Container </a:t>
+            </a:r>
+            <a:r>
+              <a:rPr lang="en-US" sz="1600" dirty="0">
+                <a:latin typeface="Open Sans"/>
+              </a:rPr>
+              <a:t>image is a lightweight, standalone, executable package of software that includes everything needed to run an application: code, runtime, system tools, system libraries and </a:t>
+            </a:r>
+            <a:r>
+              <a:rPr lang="en-US" sz="1600" dirty="0" smtClean="0">
+                <a:latin typeface="Open Sans"/>
+              </a:rPr>
+              <a:t>settings. Container </a:t>
+            </a:r>
+            <a:r>
+              <a:rPr lang="en-US" sz="1600" dirty="0">
+                <a:latin typeface="Open Sans"/>
+              </a:rPr>
+              <a:t>images become containers at runtime and in the case of </a:t>
+            </a:r>
+            <a:r>
+              <a:rPr lang="en-US" sz="1600" dirty="0" err="1">
+                <a:latin typeface="Open Sans"/>
+              </a:rPr>
+              <a:t>Docker</a:t>
+            </a:r>
+            <a:r>
+              <a:rPr lang="en-US" sz="1600" dirty="0">
+                <a:latin typeface="Open Sans"/>
+              </a:rPr>
+              <a:t> containers - images become containers when they run on</a:t>
+            </a:r>
+            <a:r>
+              <a:rPr lang="en-US" sz="1600" dirty="0">
                 <a:solidFill>
-                  <a:srgbClr val="4A4A4A"/>
+                  <a:schemeClr val="tx1"/>
                 </a:solidFill>
                 <a:latin typeface="Open Sans"/>
               </a:rPr>
-              <a:t>Virtualization</a:t>
-            </a:r>
-            <a:r>
-              <a:rPr lang="en-US" dirty="0">
+              <a:t> </a:t>
+            </a:r>
+            <a:r>
+              <a:rPr lang="en-US" sz="1600" dirty="0" err="1">
                 <a:solidFill>
-                  <a:srgbClr val="4A4A4A"/>
+                  <a:schemeClr val="tx1"/>
                 </a:solidFill>
                 <a:latin typeface="Open Sans"/>
               </a:rPr>
-              <a:t> is the process of creating a software-based, virtual version of something(compute storage, servers, application, etc.). These virtual versions or environments are created from a single physical hardware system. Virtualization lets you split one system into many different sections which act like separate, distinct individual systems. A software called Hypervisor makes this kind of splitting possible. The virtual environment created by the hypervisor is called Virtual Machine</a:t>
-            </a:r>
-            <a:r>
-              <a:rPr lang="en-US" dirty="0" smtClean="0">
+              <a:t>Docker</a:t>
+            </a:r>
+            <a:r>
+              <a:rPr lang="en-US" sz="1600" dirty="0">
                 <a:solidFill>
-                  <a:srgbClr val="4A4A4A"/>
+                  <a:schemeClr val="tx1"/>
                 </a:solidFill>
                 <a:latin typeface="Open Sans"/>
               </a:rPr>
+              <a:t> </a:t>
+            </a:r>
+            <a:r>
+              <a:rPr lang="en-US" sz="1600" dirty="0" smtClean="0">
+                <a:solidFill>
+                  <a:schemeClr val="tx1"/>
+                </a:solidFill>
+                <a:latin typeface="Open Sans"/>
+              </a:rPr>
+              <a:t>Engine. </a:t>
+            </a:r>
+            <a:r>
+              <a:rPr lang="en-US" sz="1600" dirty="0">
+                <a:latin typeface="Open Sans"/>
+              </a:rPr>
+              <a:t>Available for both Linux and Windows-based applications, containerized software will always run the same, regardless of the infrastructure. Containers isolate software from its environment and ensure that it works uniformly despite differences for instance between development and staging</a:t>
+            </a:r>
+            <a:r>
+              <a:rPr lang="en-US" sz="1600" dirty="0" smtClean="0">
+                <a:latin typeface="Open Sans"/>
+              </a:rPr>
               <a:t>.</a:t>
             </a:r>
-          </a:p>
-          <a:p>
-            <a:r>
-              <a:rPr lang="en-US" dirty="0" smtClean="0">
-                <a:solidFill>
-                  <a:srgbClr val="4A4A4A"/>
-                </a:solidFill>
-                <a:latin typeface="Open Sans"/>
-              </a:rPr>
-              <a:t>In </a:t>
-            </a:r>
-            <a:r>
-              <a:rPr lang="en-US" dirty="0">
-                <a:solidFill>
-                  <a:srgbClr val="4A4A4A"/>
-                </a:solidFill>
-                <a:latin typeface="Open Sans"/>
-              </a:rPr>
-              <a:t>the software development process, code developed on one machine might not work perfectly fine on any other machine because of the dependencies. This problem was solved by the </a:t>
-            </a:r>
-            <a:r>
-              <a:rPr lang="en-US" b="1" dirty="0">
-                <a:solidFill>
-                  <a:srgbClr val="4A4A4A"/>
-                </a:solidFill>
-                <a:latin typeface="Open Sans"/>
-              </a:rPr>
-              <a:t>containerization</a:t>
-            </a:r>
-            <a:r>
-              <a:rPr lang="en-US" dirty="0">
-                <a:solidFill>
-                  <a:srgbClr val="4A4A4A"/>
-                </a:solidFill>
-                <a:latin typeface="Open Sans"/>
-              </a:rPr>
-              <a:t> concept. So basically, an application that is being developed and deployed is bundled and wrapped together with all its configuration files and dependencies. This bundle is called a container. Now when you wish to run the application on another system, the container is deployed which will give a bug-free environment as all the dependencies and libraries are wrapped together. Most famous containerization environments are </a:t>
-            </a:r>
-            <a:r>
-              <a:rPr lang="en-US" dirty="0" err="1">
-                <a:solidFill>
-                  <a:srgbClr val="4A4A4A"/>
-                </a:solidFill>
-                <a:latin typeface="Open Sans"/>
-              </a:rPr>
-              <a:t>Docker</a:t>
-            </a:r>
-            <a:r>
-              <a:rPr lang="en-US" dirty="0">
-                <a:solidFill>
-                  <a:srgbClr val="4A4A4A"/>
-                </a:solidFill>
-                <a:latin typeface="Open Sans"/>
-              </a:rPr>
-              <a:t> and </a:t>
-            </a:r>
-            <a:r>
-              <a:rPr lang="en-US" dirty="0" err="1">
-                <a:solidFill>
-                  <a:srgbClr val="4A4A4A"/>
-                </a:solidFill>
-                <a:latin typeface="Open Sans"/>
-              </a:rPr>
-              <a:t>Kubernetes</a:t>
-            </a:r>
-            <a:r>
-              <a:rPr lang="en-US" dirty="0">
-                <a:solidFill>
-                  <a:srgbClr val="4A4A4A"/>
-                </a:solidFill>
-                <a:latin typeface="Open Sans"/>
-              </a:rPr>
-              <a:t>.</a:t>
-            </a:r>
-            <a:endParaRPr lang="en-US" dirty="0"/>
+            <a:endParaRPr lang="en-US" sz="1600" dirty="0">
+              <a:latin typeface="Open Sans"/>
+            </a:endParaRPr>
           </a:p>
         </p:txBody>
       </p:sp>
     </p:spTree>
     <p:extLst>
       <p:ext uri="{BB962C8B-B14F-4D97-AF65-F5344CB8AC3E}">
-        <p14:creationId xmlns:p14="http://schemas.microsoft.com/office/powerpoint/2010/main" val="1122287654"/>
+        <p14:creationId xmlns:p14="http://schemas.microsoft.com/office/powerpoint/2010/main" val="3815118729"/>
       </p:ext>
     </p:extLst>
   </p:cSld>
   <p:clrMapOvr>
     <a:masterClrMapping/>
   </p:clrMapOvr>
-  <p:timing>
-    <p:tnLst>
-      <p:par>
-        <p:cTn id="1" dur="indefinite" restart="never" nodeType="tmRoot"/>
-      </p:par>
-    </p:tnLst>
-  </p:timing>
 </p:sld>
 </file>
 
@@ -15030,13 +15336,7 @@
       </p:grpSpPr>
       <p:sp>
         <p:nvSpPr>
-          <p:cNvPr id="2" name="Title 1">
-            <a:extLst>
-              <a:ext uri="{FF2B5EF4-FFF2-40B4-BE49-F238E27FC236}">
-                <a16:creationId xmlns="" xmlns:a16="http://schemas.microsoft.com/office/drawing/2014/main" id="{56620923-99EF-B74A-9C1D-414CE50BBB09}"/>
-              </a:ext>
-            </a:extLst>
-          </p:cNvPr>
+          <p:cNvPr id="2" name="Title 1"/>
           <p:cNvSpPr>
             <a:spLocks noGrp="1"/>
           </p:cNvSpPr>
@@ -15050,16 +15350,8 @@
           <a:lstStyle/>
           <a:p>
             <a:r>
-              <a:rPr lang="en-IN" dirty="0" err="1"/>
-              <a:t>Docker</a:t>
-            </a:r>
-            <a:r>
-              <a:rPr lang="en-IN" dirty="0"/>
-              <a:t> </a:t>
-            </a:r>
-            <a:r>
-              <a:rPr lang="en-IN" dirty="0" smtClean="0"/>
-              <a:t>– Images and Volumes</a:t>
+              <a:rPr lang="en-US" dirty="0" smtClean="0"/>
+              <a:t>Virtualization and Containerization</a:t>
             </a:r>
             <a:endParaRPr lang="en-US" dirty="0"/>
           </a:p>
@@ -15067,13 +15359,7 @@
       </p:sp>
       <p:sp>
         <p:nvSpPr>
-          <p:cNvPr id="3" name="Content Placeholder 2">
-            <a:extLst>
-              <a:ext uri="{FF2B5EF4-FFF2-40B4-BE49-F238E27FC236}">
-                <a16:creationId xmlns="" xmlns:a16="http://schemas.microsoft.com/office/drawing/2014/main" id="{070B9698-93FF-0C47-A943-A0FF369D0681}"/>
-              </a:ext>
-            </a:extLst>
-          </p:cNvPr>
+          <p:cNvPr id="3" name="Content Placeholder 2"/>
           <p:cNvSpPr>
             <a:spLocks noGrp="1"/>
           </p:cNvSpPr>
@@ -15083,351 +15369,123 @@
         </p:nvSpPr>
         <p:spPr>
           <a:xfrm>
-            <a:off x="457200" y="2286000"/>
-            <a:ext cx="11277600" cy="4419600"/>
+            <a:off x="457200" y="2362200"/>
+            <a:ext cx="11353800" cy="4343400"/>
           </a:xfrm>
         </p:spPr>
         <p:txBody>
-          <a:bodyPr>
-            <a:normAutofit/>
-          </a:bodyPr>
+          <a:bodyPr/>
           <a:lstStyle/>
           <a:p>
-            <a:pPr algn="just"/>
+            <a:r>
+              <a:rPr lang="en-US" b="1" dirty="0">
+                <a:solidFill>
+                  <a:srgbClr val="4A4A4A"/>
+                </a:solidFill>
+                <a:latin typeface="Open Sans"/>
+              </a:rPr>
+              <a:t>Virtualization</a:t>
+            </a:r>
+            <a:r>
+              <a:rPr lang="en-US" dirty="0">
+                <a:solidFill>
+                  <a:srgbClr val="4A4A4A"/>
+                </a:solidFill>
+                <a:latin typeface="Open Sans"/>
+              </a:rPr>
+              <a:t> is the process of creating a software-based, virtual version of something(compute storage, servers, application, etc.). These virtual versions or environments are created from a single physical hardware system. Virtualization lets you split one system into many different sections which act like separate, distinct individual systems. A software called Hypervisor makes this kind of splitting possible. The virtual environment created by the hypervisor is called Virtual Machine</a:t>
+            </a:r>
+            <a:r>
+              <a:rPr lang="en-US" dirty="0" smtClean="0">
+                <a:solidFill>
+                  <a:srgbClr val="4A4A4A"/>
+                </a:solidFill>
+                <a:latin typeface="Open Sans"/>
+              </a:rPr>
+              <a:t>.</a:t>
+            </a:r>
+          </a:p>
+          <a:p>
+            <a:r>
+              <a:rPr lang="en-US" dirty="0" smtClean="0">
+                <a:solidFill>
+                  <a:srgbClr val="4A4A4A"/>
+                </a:solidFill>
+                <a:latin typeface="Open Sans"/>
+              </a:rPr>
+              <a:t>In </a:t>
+            </a:r>
+            <a:r>
+              <a:rPr lang="en-US" dirty="0">
+                <a:solidFill>
+                  <a:srgbClr val="4A4A4A"/>
+                </a:solidFill>
+                <a:latin typeface="Open Sans"/>
+              </a:rPr>
+              <a:t>the software development process, code developed on one machine might not work perfectly fine on any other machine because of the dependencies. This problem was solved by the </a:t>
+            </a:r>
+            <a:r>
+              <a:rPr lang="en-US" b="1" dirty="0">
+                <a:solidFill>
+                  <a:srgbClr val="4A4A4A"/>
+                </a:solidFill>
+                <a:latin typeface="Open Sans"/>
+              </a:rPr>
+              <a:t>containerization</a:t>
+            </a:r>
+            <a:r>
+              <a:rPr lang="en-US" dirty="0">
+                <a:solidFill>
+                  <a:srgbClr val="4A4A4A"/>
+                </a:solidFill>
+                <a:latin typeface="Open Sans"/>
+              </a:rPr>
+              <a:t> concept. So basically, an application that is being developed and deployed is bundled and wrapped together with all its configuration files and dependencies. This bundle is called a container. Now when you wish to run the application on another system, the container is deployed which will give a bug-free environment as all the dependencies and libraries are wrapped together. Most famous containerization environments are </a:t>
+            </a:r>
             <a:r>
               <a:rPr lang="en-US" dirty="0" err="1">
+                <a:solidFill>
+                  <a:srgbClr val="4A4A4A"/>
+                </a:solidFill>
                 <a:latin typeface="Open Sans"/>
               </a:rPr>
               <a:t>Docker</a:t>
             </a:r>
             <a:r>
               <a:rPr lang="en-US" dirty="0">
-                <a:latin typeface="Open Sans"/>
-              </a:rPr>
-              <a:t> image is the source of </a:t>
+                <a:solidFill>
+                  <a:srgbClr val="4A4A4A"/>
+                </a:solidFill>
+                <a:latin typeface="Open Sans"/>
+              </a:rPr>
+              <a:t> and </a:t>
             </a:r>
             <a:r>
               <a:rPr lang="en-US" dirty="0" err="1">
-                <a:latin typeface="Open Sans"/>
-              </a:rPr>
-              <a:t>Docker</a:t>
+                <a:solidFill>
+                  <a:srgbClr val="4A4A4A"/>
+                </a:solidFill>
+                <a:latin typeface="Open Sans"/>
+              </a:rPr>
+              <a:t>Kubernetes</a:t>
             </a:r>
             <a:r>
               <a:rPr lang="en-US" dirty="0">
-                <a:latin typeface="Open Sans"/>
-              </a:rPr>
-              <a:t> container. In other words, </a:t>
-            </a:r>
-            <a:r>
-              <a:rPr lang="en-US" dirty="0" err="1">
-                <a:latin typeface="Open Sans"/>
-              </a:rPr>
-              <a:t>Docker</a:t>
-            </a:r>
-            <a:r>
-              <a:rPr lang="en-US" dirty="0">
-                <a:latin typeface="Open Sans"/>
-              </a:rPr>
-              <a:t> images are used to create containers. When a user runs a </a:t>
-            </a:r>
-            <a:r>
-              <a:rPr lang="en-US" dirty="0" err="1">
-                <a:latin typeface="Open Sans"/>
-              </a:rPr>
-              <a:t>Docker</a:t>
-            </a:r>
-            <a:r>
-              <a:rPr lang="en-US" dirty="0">
-                <a:latin typeface="Open Sans"/>
-              </a:rPr>
-              <a:t> image, an instance of a container is created. These </a:t>
-            </a:r>
-            <a:r>
-              <a:rPr lang="en-US" dirty="0" err="1">
-                <a:latin typeface="Open Sans"/>
-              </a:rPr>
-              <a:t>docker</a:t>
-            </a:r>
-            <a:r>
-              <a:rPr lang="en-US" dirty="0">
-                <a:latin typeface="Open Sans"/>
-              </a:rPr>
-              <a:t> images can be </a:t>
-            </a:r>
-            <a:r>
-              <a:rPr lang="en-US" dirty="0" smtClean="0">
-                <a:latin typeface="Open Sans"/>
-              </a:rPr>
-              <a:t>deployed </a:t>
-            </a:r>
-            <a:r>
-              <a:rPr lang="en-US" dirty="0">
-                <a:latin typeface="Open Sans"/>
-              </a:rPr>
-              <a:t>to any </a:t>
-            </a:r>
-            <a:r>
-              <a:rPr lang="en-US" dirty="0" err="1">
-                <a:latin typeface="Open Sans"/>
-              </a:rPr>
-              <a:t>Docker</a:t>
-            </a:r>
-            <a:r>
-              <a:rPr lang="en-US" dirty="0">
-                <a:latin typeface="Open Sans"/>
-              </a:rPr>
-              <a:t> environment</a:t>
-            </a:r>
-            <a:r>
-              <a:rPr lang="en-US" dirty="0" smtClean="0">
+                <a:solidFill>
+                  <a:srgbClr val="4A4A4A"/>
+                </a:solidFill>
                 <a:latin typeface="Open Sans"/>
               </a:rPr>
               <a:t>.</a:t>
             </a:r>
-          </a:p>
-          <a:p>
-            <a:pPr algn="just"/>
-            <a:r>
-              <a:rPr lang="en-US" dirty="0" err="1" smtClean="0">
-                <a:latin typeface="Open Sans"/>
-              </a:rPr>
-              <a:t>Docker</a:t>
-            </a:r>
-            <a:r>
-              <a:rPr lang="en-US" dirty="0" smtClean="0">
-                <a:latin typeface="Open Sans"/>
-              </a:rPr>
-              <a:t> volumes are the preferred mechanism for persisting data generated by and used by </a:t>
-            </a:r>
-            <a:r>
-              <a:rPr lang="en-US" dirty="0" err="1" smtClean="0">
-                <a:latin typeface="Open Sans"/>
-              </a:rPr>
-              <a:t>docker</a:t>
-            </a:r>
-            <a:r>
-              <a:rPr lang="en-US" dirty="0" smtClean="0">
-                <a:latin typeface="Open Sans"/>
-              </a:rPr>
-              <a:t> containers. Volumes are completely managed by </a:t>
-            </a:r>
-            <a:r>
-              <a:rPr lang="en-US" dirty="0" err="1" smtClean="0">
-                <a:latin typeface="Open Sans"/>
-              </a:rPr>
-              <a:t>docker</a:t>
-            </a:r>
-            <a:r>
-              <a:rPr lang="en-US" dirty="0" smtClean="0">
-                <a:latin typeface="Open Sans"/>
-              </a:rPr>
-              <a:t>. I have many advantages</a:t>
-            </a:r>
-          </a:p>
-          <a:p>
-            <a:pPr lvl="1" algn="just"/>
-            <a:r>
-              <a:rPr lang="en-US" dirty="0" smtClean="0">
-                <a:latin typeface="Open Sans"/>
-              </a:rPr>
-              <a:t>Easier to backup or migrate than bind mounts, Work on all </a:t>
-            </a:r>
-            <a:r>
-              <a:rPr lang="en-US" dirty="0" err="1" smtClean="0">
-                <a:latin typeface="Open Sans"/>
-              </a:rPr>
-              <a:t>plateform</a:t>
-            </a:r>
-            <a:r>
-              <a:rPr lang="en-US" dirty="0" smtClean="0">
-                <a:latin typeface="Open Sans"/>
-              </a:rPr>
-              <a:t> containers, can be safely shared. One can </a:t>
-            </a:r>
-            <a:r>
-              <a:rPr lang="en-US" dirty="0" err="1" smtClean="0">
-                <a:latin typeface="Open Sans"/>
-              </a:rPr>
-              <a:t>managevolumes</a:t>
-            </a:r>
-            <a:r>
-              <a:rPr lang="en-US" dirty="0" smtClean="0">
-                <a:latin typeface="Open Sans"/>
-              </a:rPr>
-              <a:t> using </a:t>
-            </a:r>
-            <a:r>
-              <a:rPr lang="en-US" dirty="0" err="1" smtClean="0">
-                <a:latin typeface="Open Sans"/>
-              </a:rPr>
-              <a:t>docker</a:t>
-            </a:r>
-            <a:r>
-              <a:rPr lang="en-US" dirty="0" smtClean="0">
-                <a:latin typeface="Open Sans"/>
-              </a:rPr>
-              <a:t> CLI commands or </a:t>
-            </a:r>
-            <a:r>
-              <a:rPr lang="en-US" dirty="0" err="1" smtClean="0">
-                <a:latin typeface="Open Sans"/>
-              </a:rPr>
-              <a:t>docker</a:t>
-            </a:r>
-            <a:r>
-              <a:rPr lang="en-US" dirty="0" smtClean="0">
-                <a:latin typeface="Open Sans"/>
-              </a:rPr>
-              <a:t> API.</a:t>
-            </a:r>
-          </a:p>
-          <a:p>
-            <a:pPr lvl="1" algn="just"/>
-            <a:r>
-              <a:rPr lang="en-US" dirty="0" smtClean="0">
-                <a:latin typeface="Open Sans"/>
-              </a:rPr>
-              <a:t>Volume drivers let you store volumes on remote hosts or cloud providers, to encrypt the contents or other functionality. Volumes on </a:t>
-            </a:r>
-            <a:r>
-              <a:rPr lang="en-US" dirty="0" err="1" smtClean="0">
-                <a:latin typeface="Open Sans"/>
-              </a:rPr>
-              <a:t>docker</a:t>
-            </a:r>
-            <a:r>
-              <a:rPr lang="en-US" dirty="0" smtClean="0">
-                <a:latin typeface="Open Sans"/>
-              </a:rPr>
-              <a:t> desktop have higher performance than bind mounts from Mac or Windows hosts.</a:t>
-            </a:r>
-            <a:endParaRPr lang="en-US" dirty="0">
-              <a:latin typeface="Open Sans"/>
-            </a:endParaRPr>
-          </a:p>
-          <a:p>
-            <a:pPr algn="just"/>
-            <a:r>
-              <a:rPr lang="en-US" dirty="0" smtClean="0">
-                <a:latin typeface="Open Sans"/>
-              </a:rPr>
-              <a:t>Commands</a:t>
-            </a:r>
-          </a:p>
-          <a:p>
-            <a:pPr lvl="1" algn="just"/>
-            <a:r>
-              <a:rPr lang="en-US" dirty="0" smtClean="0">
-                <a:latin typeface="Open Sans"/>
-              </a:rPr>
-              <a:t>To create a volume: $</a:t>
-            </a:r>
-            <a:r>
-              <a:rPr lang="en-US" dirty="0" err="1" smtClean="0">
-                <a:latin typeface="Open Sans"/>
-              </a:rPr>
-              <a:t>docker</a:t>
-            </a:r>
-            <a:r>
-              <a:rPr lang="en-US" dirty="0" smtClean="0">
-                <a:latin typeface="Open Sans"/>
-              </a:rPr>
-              <a:t> volume  create &lt;</a:t>
-            </a:r>
-            <a:r>
-              <a:rPr lang="en-US" dirty="0" err="1" smtClean="0">
-                <a:latin typeface="Open Sans"/>
-              </a:rPr>
-              <a:t>Vol_name</a:t>
-            </a:r>
-            <a:r>
-              <a:rPr lang="en-US" dirty="0" smtClean="0">
-                <a:latin typeface="Open Sans"/>
-              </a:rPr>
-              <a:t>&gt;</a:t>
-            </a:r>
-          </a:p>
-          <a:p>
-            <a:pPr lvl="1" algn="just"/>
-            <a:r>
-              <a:rPr lang="en-US" dirty="0" smtClean="0">
-                <a:latin typeface="Open Sans"/>
-              </a:rPr>
-              <a:t>Listing: $</a:t>
-            </a:r>
-            <a:r>
-              <a:rPr lang="en-US" dirty="0" err="1" smtClean="0">
-                <a:latin typeface="Open Sans"/>
-              </a:rPr>
-              <a:t>docker</a:t>
-            </a:r>
-            <a:r>
-              <a:rPr lang="en-US" dirty="0" smtClean="0">
-                <a:latin typeface="Open Sans"/>
-              </a:rPr>
-              <a:t> volume </a:t>
-            </a:r>
-            <a:r>
-              <a:rPr lang="en-US" dirty="0" err="1" smtClean="0">
-                <a:latin typeface="Open Sans"/>
-              </a:rPr>
-              <a:t>ls</a:t>
-            </a:r>
-            <a:endParaRPr lang="en-US" dirty="0" smtClean="0">
-              <a:latin typeface="Open Sans"/>
-            </a:endParaRPr>
-          </a:p>
-          <a:p>
-            <a:pPr lvl="1" algn="just"/>
-            <a:r>
-              <a:rPr lang="en-US" dirty="0" smtClean="0">
-                <a:latin typeface="Open Sans"/>
-              </a:rPr>
-              <a:t>To remove: $</a:t>
-            </a:r>
-            <a:r>
-              <a:rPr lang="en-US" dirty="0" err="1" smtClean="0">
-                <a:latin typeface="Open Sans"/>
-              </a:rPr>
-              <a:t>docker</a:t>
-            </a:r>
-            <a:r>
-              <a:rPr lang="en-US" dirty="0" smtClean="0">
-                <a:latin typeface="Open Sans"/>
-              </a:rPr>
-              <a:t> volume </a:t>
-            </a:r>
-            <a:r>
-              <a:rPr lang="en-US" dirty="0" err="1" smtClean="0">
-                <a:latin typeface="Open Sans"/>
-              </a:rPr>
-              <a:t>rm</a:t>
-            </a:r>
-            <a:r>
-              <a:rPr lang="en-US" dirty="0" smtClean="0">
-                <a:latin typeface="Open Sans"/>
-              </a:rPr>
-              <a:t> &lt;</a:t>
-            </a:r>
-            <a:r>
-              <a:rPr lang="en-US" dirty="0" err="1" smtClean="0">
-                <a:latin typeface="Open Sans"/>
-              </a:rPr>
-              <a:t>Vol_name</a:t>
-            </a:r>
-            <a:r>
-              <a:rPr lang="en-US" dirty="0" smtClean="0">
-                <a:latin typeface="Open Sans"/>
-              </a:rPr>
-              <a:t>&gt;</a:t>
-            </a:r>
+            <a:endParaRPr lang="en-US" dirty="0"/>
           </a:p>
         </p:txBody>
       </p:sp>
     </p:spTree>
     <p:extLst>
       <p:ext uri="{BB962C8B-B14F-4D97-AF65-F5344CB8AC3E}">
-        <p14:creationId xmlns:p14="http://schemas.microsoft.com/office/powerpoint/2010/main" val="3976184958"/>
+        <p14:creationId xmlns:p14="http://schemas.microsoft.com/office/powerpoint/2010/main" val="1122287654"/>
       </p:ext>
     </p:extLst>
   </p:cSld>
@@ -15466,7 +15524,7 @@
           <p:cNvPr id="2" name="Title 1">
             <a:extLst>
               <a:ext uri="{FF2B5EF4-FFF2-40B4-BE49-F238E27FC236}">
-                <a16:creationId xmlns="" xmlns:a16="http://schemas.microsoft.com/office/drawing/2014/main" id="{45A6B393-B7CD-FB4C-AD69-4CA7CD97F1B7}"/>
+                <a16:creationId xmlns:a16="http://schemas.microsoft.com/office/drawing/2014/main" xmlns="" id="{56620923-99EF-B74A-9C1D-414CE50BBB09}"/>
               </a:ext>
             </a:extLst>
           </p:cNvPr>
@@ -15483,10 +15541,18 @@
           <a:lstStyle/>
           <a:p>
             <a:r>
-              <a:rPr lang="en-IN"/>
-              <a:t>Docker - Container</a:t>
-            </a:r>
-            <a:endParaRPr lang="en-US"/>
+              <a:rPr lang="en-IN" dirty="0" err="1"/>
+              <a:t>Docker</a:t>
+            </a:r>
+            <a:r>
+              <a:rPr lang="en-IN" dirty="0"/>
+              <a:t> </a:t>
+            </a:r>
+            <a:r>
+              <a:rPr lang="en-IN" dirty="0" smtClean="0"/>
+              <a:t>– Images and Volumes</a:t>
+            </a:r>
+            <a:endParaRPr lang="en-US" dirty="0"/>
           </a:p>
         </p:txBody>
       </p:sp>
@@ -15495,7 +15561,7 @@
           <p:cNvPr id="3" name="Content Placeholder 2">
             <a:extLst>
               <a:ext uri="{FF2B5EF4-FFF2-40B4-BE49-F238E27FC236}">
-                <a16:creationId xmlns="" xmlns:a16="http://schemas.microsoft.com/office/drawing/2014/main" id="{0221C280-9F5B-F342-84F1-E34D26C4B1A7}"/>
+                <a16:creationId xmlns:a16="http://schemas.microsoft.com/office/drawing/2014/main" xmlns="" id="{070B9698-93FF-0C47-A943-A0FF369D0681}"/>
               </a:ext>
             </a:extLst>
           </p:cNvPr>
@@ -15508,39 +15574,28 @@
         </p:nvSpPr>
         <p:spPr>
           <a:xfrm>
-            <a:off x="533400" y="2603500"/>
-            <a:ext cx="11277600" cy="3416300"/>
+            <a:off x="457200" y="2286000"/>
+            <a:ext cx="11277600" cy="4419600"/>
           </a:xfrm>
         </p:spPr>
         <p:txBody>
           <a:bodyPr>
-            <a:normAutofit lnSpcReduction="10000"/>
+            <a:normAutofit/>
           </a:bodyPr>
           <a:lstStyle/>
           <a:p>
-            <a:r>
-              <a:rPr lang="en-US" b="1" dirty="0" err="1">
-                <a:solidFill>
-                  <a:srgbClr val="4A4A4A"/>
-                </a:solidFill>
+            <a:pPr algn="just"/>
+            <a:r>
+              <a:rPr lang="en-US" dirty="0" err="1">
                 <a:latin typeface="Open Sans"/>
               </a:rPr>
               <a:t>Docker</a:t>
             </a:r>
             <a:r>
-              <a:rPr lang="en-US" b="1" dirty="0">
-                <a:solidFill>
-                  <a:srgbClr val="4A4A4A"/>
-                </a:solidFill>
-                <a:latin typeface="Open Sans"/>
-              </a:rPr>
-              <a:t> Containers </a:t>
-            </a:r>
-            <a:r>
               <a:rPr lang="en-US" dirty="0">
                 <a:latin typeface="Open Sans"/>
               </a:rPr>
-              <a:t>include the application and all of its dependencies. It shares the kernel with other containers, running as isolated processes in user space on the host operating system. </a:t>
+              <a:t> image is the source of </a:t>
             </a:r>
             <a:r>
               <a:rPr lang="en-US" dirty="0" err="1">
@@ -15552,7 +15607,7 @@
               <a:rPr lang="en-US" dirty="0">
                 <a:latin typeface="Open Sans"/>
               </a:rPr>
-              <a:t> containers are not tied to any specific infrastructure: they run on any computer, on any infrastructure, and in any cloud. </a:t>
+              <a:t> container. In other words, </a:t>
             </a:r>
             <a:r>
               <a:rPr lang="en-US" dirty="0" err="1">
@@ -15564,7 +15619,7 @@
               <a:rPr lang="en-US" dirty="0">
                 <a:latin typeface="Open Sans"/>
               </a:rPr>
-              <a:t> containers are basically runtime instances of </a:t>
+              <a:t> images are used to create containers. When a user runs a </a:t>
             </a:r>
             <a:r>
               <a:rPr lang="en-US" dirty="0" err="1">
@@ -15576,133 +15631,294 @@
               <a:rPr lang="en-US" dirty="0">
                 <a:latin typeface="Open Sans"/>
               </a:rPr>
-              <a:t> images</a:t>
+              <a:t> image, an instance of a container is created. These </a:t>
+            </a:r>
+            <a:r>
+              <a:rPr lang="en-US" dirty="0" err="1">
+                <a:latin typeface="Open Sans"/>
+              </a:rPr>
+              <a:t>docker</a:t>
+            </a:r>
+            <a:r>
+              <a:rPr lang="en-US" dirty="0">
+                <a:latin typeface="Open Sans"/>
+              </a:rPr>
+              <a:t> images can be </a:t>
             </a:r>
             <a:r>
               <a:rPr lang="en-US" dirty="0" smtClean="0">
                 <a:latin typeface="Open Sans"/>
               </a:rPr>
+              <a:t>deployed </a:t>
+            </a:r>
+            <a:r>
+              <a:rPr lang="en-US" dirty="0">
+                <a:latin typeface="Open Sans"/>
+              </a:rPr>
+              <a:t>to any </a:t>
+            </a:r>
+            <a:r>
+              <a:rPr lang="en-US" dirty="0" err="1">
+                <a:latin typeface="Open Sans"/>
+              </a:rPr>
+              <a:t>Docker</a:t>
+            </a:r>
+            <a:r>
+              <a:rPr lang="en-US" dirty="0">
+                <a:latin typeface="Open Sans"/>
+              </a:rPr>
+              <a:t> environment</a:t>
+            </a:r>
+            <a:r>
+              <a:rPr lang="en-US" dirty="0" smtClean="0">
+                <a:latin typeface="Open Sans"/>
+              </a:rPr>
               <a:t>.</a:t>
             </a:r>
           </a:p>
           <a:p>
-            <a:r>
-              <a:rPr lang="en-US" b="1" dirty="0">
-                <a:solidFill>
-                  <a:srgbClr val="4A4A4A"/>
-                </a:solidFill>
-                <a:latin typeface="Open Sans"/>
-              </a:rPr>
-              <a:t>Containers</a:t>
-            </a:r>
-            <a:r>
-              <a:rPr lang="en-US" dirty="0">
-                <a:solidFill>
-                  <a:srgbClr val="4A4A4A"/>
-                </a:solidFill>
-                <a:latin typeface="Open Sans"/>
-              </a:rPr>
-              <a:t> provide an isolated environment for running the application. The entire user space is explicitly dedicated to the application. Any changes made inside the container is never reflected on the host or even other containers running on the same host. Containers are an abstraction of the application layer. Each container is a different application</a:t>
+            <a:pPr algn="just"/>
+            <a:r>
+              <a:rPr lang="en-US" dirty="0" err="1" smtClean="0">
+                <a:latin typeface="Open Sans"/>
+              </a:rPr>
+              <a:t>Docker</a:t>
             </a:r>
             <a:r>
               <a:rPr lang="en-US" dirty="0" smtClean="0">
-                <a:solidFill>
-                  <a:srgbClr val="4A4A4A"/>
-                </a:solidFill>
-                <a:latin typeface="Open Sans"/>
-              </a:rPr>
-              <a:t>.</a:t>
-            </a:r>
-          </a:p>
-          <a:p>
-            <a:r>
-              <a:rPr lang="en-US" dirty="0" err="1">
-                <a:solidFill>
-                  <a:srgbClr val="4A4A4A"/>
-                </a:solidFill>
-                <a:latin typeface="Open Sans"/>
-              </a:rPr>
-              <a:t>Docker</a:t>
-            </a:r>
-            <a:r>
-              <a:rPr lang="en-US" dirty="0">
-                <a:solidFill>
-                  <a:srgbClr val="4A4A4A"/>
-                </a:solidFill>
-                <a:latin typeface="Open Sans"/>
-              </a:rPr>
-              <a:t> can build images automatically by reading the instructions from a file called </a:t>
-            </a:r>
-            <a:r>
-              <a:rPr lang="en-US" dirty="0" err="1">
-                <a:solidFill>
-                  <a:srgbClr val="4A4A4A"/>
-                </a:solidFill>
-                <a:latin typeface="Open Sans"/>
-              </a:rPr>
-              <a:t>Dockerfile</a:t>
-            </a:r>
-            <a:r>
-              <a:rPr lang="en-US" dirty="0">
-                <a:solidFill>
-                  <a:srgbClr val="4A4A4A"/>
-                </a:solidFill>
-                <a:latin typeface="Open Sans"/>
-              </a:rPr>
-              <a:t>. A </a:t>
-            </a:r>
-            <a:r>
-              <a:rPr lang="en-US" b="1" dirty="0" err="1">
-                <a:solidFill>
-                  <a:srgbClr val="4A4A4A"/>
-                </a:solidFill>
-                <a:latin typeface="Open Sans"/>
-              </a:rPr>
-              <a:t>Dockerfile</a:t>
-            </a:r>
-            <a:r>
-              <a:rPr lang="en-US" dirty="0">
-                <a:solidFill>
-                  <a:srgbClr val="4A4A4A"/>
-                </a:solidFill>
-                <a:latin typeface="Open Sans"/>
-              </a:rPr>
-              <a:t> is a text document that contains all the commands a user could call on the command line to assemble an image. Using </a:t>
-            </a:r>
-            <a:r>
-              <a:rPr lang="en-US" dirty="0" err="1">
-                <a:solidFill>
-                  <a:srgbClr val="4A4A4A"/>
-                </a:solidFill>
+                <a:latin typeface="Open Sans"/>
+              </a:rPr>
+              <a:t> volumes are the preferred mechanism for persisting data generated by and used by </a:t>
+            </a:r>
+            <a:r>
+              <a:rPr lang="en-US" dirty="0" err="1" smtClean="0">
                 <a:latin typeface="Open Sans"/>
               </a:rPr>
               <a:t>docker</a:t>
             </a:r>
             <a:r>
-              <a:rPr lang="en-US" dirty="0">
-                <a:solidFill>
-                  <a:srgbClr val="4A4A4A"/>
-                </a:solidFill>
-                <a:latin typeface="Open Sans"/>
-              </a:rPr>
-              <a:t> build, users can create an automated build that executes several command-line instructions in succession.</a:t>
-            </a:r>
-            <a:endParaRPr lang="en-US" dirty="0"/>
-          </a:p>
-          <a:p>
-            <a:endParaRPr lang="en-US" b="1" dirty="0">
+              <a:rPr lang="en-US" dirty="0" smtClean="0">
+                <a:latin typeface="Open Sans"/>
+              </a:rPr>
+              <a:t> containers. Volumes are completely managed by </a:t>
+            </a:r>
+            <a:r>
+              <a:rPr lang="en-US" dirty="0" err="1" smtClean="0">
+                <a:latin typeface="Open Sans"/>
+              </a:rPr>
+              <a:t>docker</a:t>
+            </a:r>
+            <a:r>
+              <a:rPr lang="en-US" dirty="0" smtClean="0">
+                <a:latin typeface="Open Sans"/>
+              </a:rPr>
+              <a:t>. I have many advantages</a:t>
+            </a:r>
+          </a:p>
+          <a:p>
+            <a:pPr lvl="1" algn="just"/>
+            <a:r>
+              <a:rPr lang="en-US" dirty="0" smtClean="0">
+                <a:latin typeface="Open Sans"/>
+              </a:rPr>
+              <a:t>Easier to backup or migrate than bind mounts, Work on all </a:t>
+            </a:r>
+            <a:r>
+              <a:rPr lang="en-US" dirty="0" err="1" smtClean="0">
+                <a:latin typeface="Open Sans"/>
+              </a:rPr>
+              <a:t>plateform</a:t>
+            </a:r>
+            <a:r>
+              <a:rPr lang="en-US" dirty="0" smtClean="0">
+                <a:latin typeface="Open Sans"/>
+              </a:rPr>
+              <a:t> containers, can be safely shared. One can </a:t>
+            </a:r>
+            <a:r>
+              <a:rPr lang="en-US" dirty="0" err="1" smtClean="0">
+                <a:latin typeface="Open Sans"/>
+              </a:rPr>
+              <a:t>managevolumes</a:t>
+            </a:r>
+            <a:r>
+              <a:rPr lang="en-US" dirty="0" smtClean="0">
+                <a:latin typeface="Open Sans"/>
+              </a:rPr>
+              <a:t> using </a:t>
+            </a:r>
+            <a:r>
+              <a:rPr lang="en-US" dirty="0" err="1" smtClean="0">
+                <a:latin typeface="Open Sans"/>
+              </a:rPr>
+              <a:t>docker</a:t>
+            </a:r>
+            <a:r>
+              <a:rPr lang="en-US" dirty="0" smtClean="0">
+                <a:latin typeface="Open Sans"/>
+              </a:rPr>
+              <a:t> CLI commands or </a:t>
+            </a:r>
+            <a:r>
+              <a:rPr lang="en-US" dirty="0" err="1" smtClean="0">
+                <a:latin typeface="Open Sans"/>
+              </a:rPr>
+              <a:t>docker</a:t>
+            </a:r>
+            <a:r>
+              <a:rPr lang="en-US" dirty="0" smtClean="0">
+                <a:latin typeface="Open Sans"/>
+              </a:rPr>
+              <a:t> API.</a:t>
+            </a:r>
+          </a:p>
+          <a:p>
+            <a:pPr lvl="1" algn="just"/>
+            <a:r>
+              <a:rPr lang="en-US" dirty="0" smtClean="0">
+                <a:latin typeface="Open Sans"/>
+              </a:rPr>
+              <a:t>Volume drivers let you store volumes on remote hosts or cloud providers, to encrypt the contents or other functionality. Volumes on </a:t>
+            </a:r>
+            <a:r>
+              <a:rPr lang="en-US" dirty="0" err="1" smtClean="0">
+                <a:latin typeface="Open Sans"/>
+              </a:rPr>
+              <a:t>docker</a:t>
+            </a:r>
+            <a:r>
+              <a:rPr lang="en-US" dirty="0" smtClean="0">
+                <a:latin typeface="Open Sans"/>
+              </a:rPr>
+              <a:t> desktop have higher performance than bind mounts from Mac or Windows hosts.</a:t>
+            </a:r>
+            <a:endParaRPr lang="en-US" dirty="0">
               <a:latin typeface="Open Sans"/>
             </a:endParaRPr>
           </a:p>
           <a:p>
-            <a:endParaRPr lang="en-US" dirty="0"/>
+            <a:pPr algn="just"/>
+            <a:r>
+              <a:rPr lang="en-US" dirty="0" smtClean="0">
+                <a:latin typeface="Open Sans"/>
+              </a:rPr>
+              <a:t>Commands</a:t>
+            </a:r>
+          </a:p>
+          <a:p>
+            <a:pPr lvl="1" algn="just"/>
+            <a:r>
+              <a:rPr lang="en-US" dirty="0" smtClean="0">
+                <a:latin typeface="Open Sans"/>
+              </a:rPr>
+              <a:t>To create a volume: $</a:t>
+            </a:r>
+            <a:r>
+              <a:rPr lang="en-US" dirty="0" err="1" smtClean="0">
+                <a:latin typeface="Open Sans"/>
+              </a:rPr>
+              <a:t>docker</a:t>
+            </a:r>
+            <a:r>
+              <a:rPr lang="en-US" dirty="0" smtClean="0">
+                <a:latin typeface="Open Sans"/>
+              </a:rPr>
+              <a:t> volume  create &lt;</a:t>
+            </a:r>
+            <a:r>
+              <a:rPr lang="en-US" dirty="0" err="1" smtClean="0">
+                <a:latin typeface="Open Sans"/>
+              </a:rPr>
+              <a:t>Vol_name</a:t>
+            </a:r>
+            <a:r>
+              <a:rPr lang="en-US" dirty="0" smtClean="0">
+                <a:latin typeface="Open Sans"/>
+              </a:rPr>
+              <a:t>&gt;</a:t>
+            </a:r>
+          </a:p>
+          <a:p>
+            <a:pPr lvl="1" algn="just"/>
+            <a:r>
+              <a:rPr lang="en-US" dirty="0" smtClean="0">
+                <a:latin typeface="Open Sans"/>
+              </a:rPr>
+              <a:t>Listing: $</a:t>
+            </a:r>
+            <a:r>
+              <a:rPr lang="en-US" dirty="0" err="1" smtClean="0">
+                <a:latin typeface="Open Sans"/>
+              </a:rPr>
+              <a:t>docker</a:t>
+            </a:r>
+            <a:r>
+              <a:rPr lang="en-US" dirty="0" smtClean="0">
+                <a:latin typeface="Open Sans"/>
+              </a:rPr>
+              <a:t> volume </a:t>
+            </a:r>
+            <a:r>
+              <a:rPr lang="en-US" dirty="0" err="1" smtClean="0">
+                <a:latin typeface="Open Sans"/>
+              </a:rPr>
+              <a:t>ls</a:t>
+            </a:r>
+            <a:endParaRPr lang="en-US" dirty="0" smtClean="0">
+              <a:latin typeface="Open Sans"/>
+            </a:endParaRPr>
+          </a:p>
+          <a:p>
+            <a:pPr lvl="1" algn="just"/>
+            <a:r>
+              <a:rPr lang="en-US" dirty="0" smtClean="0">
+                <a:latin typeface="Open Sans"/>
+              </a:rPr>
+              <a:t>To remove: $</a:t>
+            </a:r>
+            <a:r>
+              <a:rPr lang="en-US" dirty="0" err="1" smtClean="0">
+                <a:latin typeface="Open Sans"/>
+              </a:rPr>
+              <a:t>docker</a:t>
+            </a:r>
+            <a:r>
+              <a:rPr lang="en-US" dirty="0" smtClean="0">
+                <a:latin typeface="Open Sans"/>
+              </a:rPr>
+              <a:t> volume </a:t>
+            </a:r>
+            <a:r>
+              <a:rPr lang="en-US" dirty="0" err="1" smtClean="0">
+                <a:latin typeface="Open Sans"/>
+              </a:rPr>
+              <a:t>rm</a:t>
+            </a:r>
+            <a:r>
+              <a:rPr lang="en-US" dirty="0" smtClean="0">
+                <a:latin typeface="Open Sans"/>
+              </a:rPr>
+              <a:t> &lt;</a:t>
+            </a:r>
+            <a:r>
+              <a:rPr lang="en-US" dirty="0" err="1" smtClean="0">
+                <a:latin typeface="Open Sans"/>
+              </a:rPr>
+              <a:t>Vol_name</a:t>
+            </a:r>
+            <a:r>
+              <a:rPr lang="en-US" dirty="0" smtClean="0">
+                <a:latin typeface="Open Sans"/>
+              </a:rPr>
+              <a:t>&gt;</a:t>
+            </a:r>
           </a:p>
         </p:txBody>
       </p:sp>
     </p:spTree>
     <p:extLst>
       <p:ext uri="{BB962C8B-B14F-4D97-AF65-F5344CB8AC3E}">
-        <p14:creationId xmlns:p14="http://schemas.microsoft.com/office/powerpoint/2010/main" val="3600009220"/>
+        <p14:creationId xmlns:p14="http://schemas.microsoft.com/office/powerpoint/2010/main" val="3976184958"/>
       </p:ext>
     </p:extLst>
   </p:cSld>
@@ -15738,7 +15954,13 @@
       </p:grpSpPr>
       <p:sp>
         <p:nvSpPr>
-          <p:cNvPr id="2" name="Title 1"/>
+          <p:cNvPr id="2" name="Title 1">
+            <a:extLst>
+              <a:ext uri="{FF2B5EF4-FFF2-40B4-BE49-F238E27FC236}">
+                <a16:creationId xmlns:a16="http://schemas.microsoft.com/office/drawing/2014/main" xmlns="" id="{45A6B393-B7CD-FB4C-AD69-4CA7CD97F1B7}"/>
+              </a:ext>
+            </a:extLst>
+          </p:cNvPr>
           <p:cNvSpPr>
             <a:spLocks noGrp="1"/>
           </p:cNvSpPr>
@@ -15752,24 +15974,22 @@
           <a:lstStyle/>
           <a:p>
             <a:r>
-              <a:rPr lang="en-US" dirty="0" smtClean="0"/>
-              <a:t>Lifecycle of </a:t>
-            </a:r>
-            <a:r>
-              <a:rPr lang="en-US" dirty="0" err="1" smtClean="0"/>
-              <a:t>Docker</a:t>
-            </a:r>
-            <a:r>
-              <a:rPr lang="en-US" dirty="0" smtClean="0"/>
-              <a:t> Container</a:t>
-            </a:r>
-            <a:endParaRPr lang="en-US" dirty="0"/>
+              <a:rPr lang="en-IN"/>
+              <a:t>Docker - Container</a:t>
+            </a:r>
+            <a:endParaRPr lang="en-US"/>
           </a:p>
         </p:txBody>
       </p:sp>
       <p:sp>
         <p:nvSpPr>
-          <p:cNvPr id="3" name="Content Placeholder 2"/>
+          <p:cNvPr id="3" name="Content Placeholder 2">
+            <a:extLst>
+              <a:ext uri="{FF2B5EF4-FFF2-40B4-BE49-F238E27FC236}">
+                <a16:creationId xmlns:a16="http://schemas.microsoft.com/office/drawing/2014/main" xmlns="" id="{0221C280-9F5B-F342-84F1-E34D26C4B1A7}"/>
+              </a:ext>
+            </a:extLst>
+          </p:cNvPr>
           <p:cNvSpPr>
             <a:spLocks noGrp="1"/>
           </p:cNvSpPr>
@@ -15779,25 +15999,101 @@
         </p:nvSpPr>
         <p:spPr>
           <a:xfrm>
-            <a:off x="533400" y="2286000"/>
-            <a:ext cx="10591800" cy="4343400"/>
+            <a:off x="533400" y="2603500"/>
+            <a:ext cx="11277600" cy="3416300"/>
           </a:xfrm>
         </p:spPr>
         <p:txBody>
           <a:bodyPr>
-            <a:normAutofit/>
+            <a:normAutofit lnSpcReduction="10000"/>
           </a:bodyPr>
           <a:lstStyle/>
           <a:p>
-            <a:pPr algn="just"/>
-            <a:r>
-              <a:rPr lang="en-US" dirty="0" err="1" smtClean="0">
+            <a:r>
+              <a:rPr lang="en-US" b="1" dirty="0" err="1">
                 <a:solidFill>
                   <a:srgbClr val="4A4A4A"/>
                 </a:solidFill>
                 <a:latin typeface="Open Sans"/>
               </a:rPr>
               <a:t>Docker</a:t>
+            </a:r>
+            <a:r>
+              <a:rPr lang="en-US" b="1" dirty="0">
+                <a:solidFill>
+                  <a:srgbClr val="4A4A4A"/>
+                </a:solidFill>
+                <a:latin typeface="Open Sans"/>
+              </a:rPr>
+              <a:t> Containers </a:t>
+            </a:r>
+            <a:r>
+              <a:rPr lang="en-US" dirty="0">
+                <a:latin typeface="Open Sans"/>
+              </a:rPr>
+              <a:t>include the application and all of its dependencies. It shares the kernel with other containers, running as isolated processes in user space on the host operating system. </a:t>
+            </a:r>
+            <a:r>
+              <a:rPr lang="en-US" dirty="0" err="1">
+                <a:latin typeface="Open Sans"/>
+              </a:rPr>
+              <a:t>Docker</a:t>
+            </a:r>
+            <a:r>
+              <a:rPr lang="en-US" dirty="0">
+                <a:latin typeface="Open Sans"/>
+              </a:rPr>
+              <a:t> containers are not tied to any specific infrastructure: they run on any computer, on any infrastructure, and in any cloud. </a:t>
+            </a:r>
+            <a:r>
+              <a:rPr lang="en-US" dirty="0" err="1">
+                <a:latin typeface="Open Sans"/>
+              </a:rPr>
+              <a:t>Docker</a:t>
+            </a:r>
+            <a:r>
+              <a:rPr lang="en-US" dirty="0">
+                <a:latin typeface="Open Sans"/>
+              </a:rPr>
+              <a:t> containers are basically runtime instances of </a:t>
+            </a:r>
+            <a:r>
+              <a:rPr lang="en-US" dirty="0" err="1">
+                <a:latin typeface="Open Sans"/>
+              </a:rPr>
+              <a:t>Docker</a:t>
+            </a:r>
+            <a:r>
+              <a:rPr lang="en-US" dirty="0">
+                <a:latin typeface="Open Sans"/>
+              </a:rPr>
+              <a:t> images</a:t>
+            </a:r>
+            <a:r>
+              <a:rPr lang="en-US" dirty="0" smtClean="0">
+                <a:latin typeface="Open Sans"/>
+              </a:rPr>
+              <a:t>.</a:t>
+            </a:r>
+          </a:p>
+          <a:p>
+            <a:r>
+              <a:rPr lang="en-US" b="1" dirty="0">
+                <a:solidFill>
+                  <a:srgbClr val="4A4A4A"/>
+                </a:solidFill>
+                <a:latin typeface="Open Sans"/>
+              </a:rPr>
+              <a:t>Containers</a:t>
+            </a:r>
+            <a:r>
+              <a:rPr lang="en-US" dirty="0">
+                <a:solidFill>
+                  <a:srgbClr val="4A4A4A"/>
+                </a:solidFill>
+                <a:latin typeface="Open Sans"/>
+              </a:rPr>
+              <a:t> provide an isolated environment for running the application. The entire user space is explicitly dedicated to the application. Any changes made inside the container is never reflected on the host or even other containers running on the same host. Containers are an abstraction of the application layer. Each container is a different application</a:t>
             </a:r>
             <a:r>
               <a:rPr lang="en-US" dirty="0" smtClean="0">
@@ -15806,7 +16102,18 @@
                 </a:solidFill>
                 <a:latin typeface="Open Sans"/>
               </a:rPr>
-              <a:t> </a:t>
+              <a:t>.</a:t>
+            </a:r>
+          </a:p>
+          <a:p>
+            <a:r>
+              <a:rPr lang="en-US" dirty="0" err="1">
+                <a:solidFill>
+                  <a:srgbClr val="4A4A4A"/>
+                </a:solidFill>
+                <a:latin typeface="Open Sans"/>
+              </a:rPr>
+              <a:t>Docker</a:t>
             </a:r>
             <a:r>
               <a:rPr lang="en-US" dirty="0">
@@ -15815,143 +16122,68 @@
                 </a:solidFill>
                 <a:latin typeface="Open Sans"/>
               </a:rPr>
-              <a:t>containers have the following lifecycle:</a:t>
-            </a:r>
-          </a:p>
-          <a:p>
-            <a:pPr lvl="1" algn="just">
-              <a:buFont typeface="Arial"/>
-              <a:buChar char="•"/>
-            </a:pPr>
-            <a:r>
-              <a:rPr lang="en-US" sz="1800" dirty="0">
+              <a:t> can build images automatically by reading the instructions from a file called </a:t>
+            </a:r>
+            <a:r>
+              <a:rPr lang="en-US" dirty="0" err="1">
                 <a:solidFill>
                   <a:srgbClr val="4A4A4A"/>
                 </a:solidFill>
                 <a:latin typeface="Open Sans"/>
               </a:rPr>
-              <a:t>Create a container</a:t>
-            </a:r>
-          </a:p>
-          <a:p>
-            <a:pPr lvl="1" algn="just">
-              <a:buFont typeface="Arial"/>
-              <a:buChar char="•"/>
-            </a:pPr>
-            <a:r>
-              <a:rPr lang="en-US" sz="1800" dirty="0">
+              <a:t>Dockerfile</a:t>
+            </a:r>
+            <a:r>
+              <a:rPr lang="en-US" dirty="0">
                 <a:solidFill>
                   <a:srgbClr val="4A4A4A"/>
                 </a:solidFill>
                 <a:latin typeface="Open Sans"/>
               </a:rPr>
-              <a:t>Run the container</a:t>
-            </a:r>
-          </a:p>
-          <a:p>
-            <a:pPr lvl="2" algn="just">
-              <a:buFont typeface="Wingdings" pitchFamily="2" charset="2"/>
-              <a:buChar char="q"/>
-            </a:pPr>
-            <a:r>
-              <a:rPr lang="en-US" sz="1600" dirty="0">
+              <a:t>. A </a:t>
+            </a:r>
+            <a:r>
+              <a:rPr lang="en-US" b="1" dirty="0" err="1">
                 <a:solidFill>
                   <a:srgbClr val="4A4A4A"/>
                 </a:solidFill>
                 <a:latin typeface="Open Sans"/>
               </a:rPr>
-              <a:t>Pause the container(optional)</a:t>
-            </a:r>
-          </a:p>
-          <a:p>
-            <a:pPr lvl="2" algn="just">
-              <a:buFont typeface="Wingdings" pitchFamily="2" charset="2"/>
-              <a:buChar char="q"/>
-            </a:pPr>
-            <a:r>
-              <a:rPr lang="en-US" sz="1600" dirty="0">
+              <a:t>Dockerfile</a:t>
+            </a:r>
+            <a:r>
+              <a:rPr lang="en-US" dirty="0">
                 <a:solidFill>
                   <a:srgbClr val="4A4A4A"/>
                 </a:solidFill>
                 <a:latin typeface="Open Sans"/>
               </a:rPr>
-              <a:t>Un-pause the container(optional)</a:t>
-            </a:r>
-          </a:p>
-          <a:p>
-            <a:pPr lvl="2" algn="just">
-              <a:buFont typeface="Wingdings" pitchFamily="2" charset="2"/>
-              <a:buChar char="q"/>
-            </a:pPr>
-            <a:r>
-              <a:rPr lang="en-US" sz="1600" dirty="0">
+              <a:t> is a text document that contains all the commands a user could call on the command line to assemble an image. Using </a:t>
+            </a:r>
+            <a:r>
+              <a:rPr lang="en-US" dirty="0" err="1">
                 <a:solidFill>
                   <a:srgbClr val="4A4A4A"/>
                 </a:solidFill>
                 <a:latin typeface="Open Sans"/>
               </a:rPr>
-              <a:t>Start the container</a:t>
-            </a:r>
-          </a:p>
-          <a:p>
-            <a:pPr lvl="2" algn="just">
-              <a:buFont typeface="Wingdings" pitchFamily="2" charset="2"/>
-              <a:buChar char="q"/>
-            </a:pPr>
-            <a:r>
-              <a:rPr lang="en-US" sz="1600" dirty="0">
+              <a:t>docker</a:t>
+            </a:r>
+            <a:r>
+              <a:rPr lang="en-US" dirty="0">
                 <a:solidFill>
                   <a:srgbClr val="4A4A4A"/>
                 </a:solidFill>
                 <a:latin typeface="Open Sans"/>
               </a:rPr>
-              <a:t>Stop the container</a:t>
-            </a:r>
-          </a:p>
-          <a:p>
-            <a:pPr lvl="2" algn="just">
-              <a:buFont typeface="Wingdings" pitchFamily="2" charset="2"/>
-              <a:buChar char="q"/>
-            </a:pPr>
-            <a:r>
-              <a:rPr lang="en-US" sz="1600" dirty="0">
-                <a:solidFill>
-                  <a:srgbClr val="4A4A4A"/>
-                </a:solidFill>
-                <a:latin typeface="Open Sans"/>
-              </a:rPr>
-              <a:t>Restart the container</a:t>
-            </a:r>
-          </a:p>
-          <a:p>
-            <a:pPr lvl="2" algn="just">
-              <a:buFont typeface="Wingdings" pitchFamily="2" charset="2"/>
-              <a:buChar char="q"/>
-            </a:pPr>
-            <a:r>
-              <a:rPr lang="en-US" sz="1600" dirty="0">
-                <a:solidFill>
-                  <a:srgbClr val="4A4A4A"/>
-                </a:solidFill>
-                <a:latin typeface="Open Sans"/>
-              </a:rPr>
-              <a:t>Kill the container</a:t>
-            </a:r>
-          </a:p>
-          <a:p>
-            <a:pPr lvl="1" algn="just">
-              <a:buFont typeface="Arial"/>
-              <a:buChar char="•"/>
-            </a:pPr>
-            <a:r>
-              <a:rPr lang="en-US" sz="1800" dirty="0">
-                <a:solidFill>
-                  <a:srgbClr val="4A4A4A"/>
-                </a:solidFill>
-                <a:latin typeface="Open Sans"/>
-              </a:rPr>
-              <a:t>Destroy the container</a:t>
-            </a:r>
+              <a:t> build, users can create an automated build that executes several command-line instructions in succession.</a:t>
+            </a:r>
+            <a:endParaRPr lang="en-US" dirty="0"/>
+          </a:p>
+          <a:p>
+            <a:endParaRPr lang="en-US" b="1" dirty="0">
+              <a:latin typeface="Open Sans"/>
+            </a:endParaRPr>
           </a:p>
           <a:p>
             <a:endParaRPr lang="en-US" dirty="0"/>
@@ -15961,7 +16193,7 @@
     </p:spTree>
     <p:extLst>
       <p:ext uri="{BB962C8B-B14F-4D97-AF65-F5344CB8AC3E}">
-        <p14:creationId xmlns:p14="http://schemas.microsoft.com/office/powerpoint/2010/main" val="688499976"/>
+        <p14:creationId xmlns:p14="http://schemas.microsoft.com/office/powerpoint/2010/main" val="3600009220"/>
       </p:ext>
     </p:extLst>
   </p:cSld>
@@ -16011,12 +16243,16 @@
           <a:lstStyle/>
           <a:p>
             <a:r>
+              <a:rPr lang="en-US" dirty="0" smtClean="0"/>
+              <a:t>Lifecycle of </a:t>
+            </a:r>
+            <a:r>
               <a:rPr lang="en-US" dirty="0" err="1" smtClean="0"/>
               <a:t>Docker</a:t>
             </a:r>
             <a:r>
               <a:rPr lang="en-US" dirty="0" smtClean="0"/>
-              <a:t> Hub</a:t>
+              <a:t> Container</a:t>
             </a:r>
             <a:endParaRPr lang="en-US" dirty="0"/>
           </a:p>
@@ -16034,22 +16270,34 @@
         </p:nvSpPr>
         <p:spPr>
           <a:xfrm>
-            <a:off x="533400" y="2603500"/>
-            <a:ext cx="9447213" cy="3416300"/>
+            <a:off x="533400" y="2286000"/>
+            <a:ext cx="10591800" cy="4343400"/>
           </a:xfrm>
         </p:spPr>
         <p:txBody>
-          <a:bodyPr/>
+          <a:bodyPr>
+            <a:normAutofit/>
+          </a:bodyPr>
           <a:lstStyle/>
           <a:p>
-            <a:r>
-              <a:rPr lang="en-US" dirty="0" err="1">
+            <a:pPr algn="just"/>
+            <a:r>
+              <a:rPr lang="en-US" dirty="0" err="1" smtClean="0">
                 <a:solidFill>
                   <a:srgbClr val="4A4A4A"/>
                 </a:solidFill>
                 <a:latin typeface="Open Sans"/>
               </a:rPr>
               <a:t>Docker</a:t>
+            </a:r>
+            <a:r>
+              <a:rPr lang="en-US" dirty="0" smtClean="0">
+                <a:solidFill>
+                  <a:srgbClr val="4A4A4A"/>
+                </a:solidFill>
+                <a:latin typeface="Open Sans"/>
+              </a:rPr>
+              <a:t> </a:t>
             </a:r>
             <a:r>
               <a:rPr lang="en-US" dirty="0">
@@ -16058,226 +16306,145 @@
                 </a:solidFill>
                 <a:latin typeface="Open Sans"/>
               </a:rPr>
-              <a:t> images create </a:t>
-            </a:r>
-            <a:r>
-              <a:rPr lang="en-US" dirty="0" err="1">
+              <a:t>containers have the following lifecycle:</a:t>
+            </a:r>
+          </a:p>
+          <a:p>
+            <a:pPr lvl="1" algn="just">
+              <a:buFont typeface="Arial"/>
+              <a:buChar char="•"/>
+            </a:pPr>
+            <a:r>
+              <a:rPr lang="en-US" sz="1800" dirty="0">
                 <a:solidFill>
                   <a:srgbClr val="4A4A4A"/>
                 </a:solidFill>
                 <a:latin typeface="Open Sans"/>
               </a:rPr>
-              <a:t>docker</a:t>
-            </a:r>
-            <a:r>
-              <a:rPr lang="en-US" dirty="0">
+              <a:t>Create a container</a:t>
+            </a:r>
+          </a:p>
+          <a:p>
+            <a:pPr lvl="1" algn="just">
+              <a:buFont typeface="Arial"/>
+              <a:buChar char="•"/>
+            </a:pPr>
+            <a:r>
+              <a:rPr lang="en-US" sz="1800" dirty="0">
                 <a:solidFill>
                   <a:srgbClr val="4A4A4A"/>
                 </a:solidFill>
                 <a:latin typeface="Open Sans"/>
               </a:rPr>
-              <a:t> containers. There has to be a registry where these </a:t>
-            </a:r>
-            <a:r>
-              <a:rPr lang="en-US" dirty="0" err="1">
+              <a:t>Run the container</a:t>
+            </a:r>
+          </a:p>
+          <a:p>
+            <a:pPr lvl="2" algn="just">
+              <a:buFont typeface="Wingdings" pitchFamily="2" charset="2"/>
+              <a:buChar char="q"/>
+            </a:pPr>
+            <a:r>
+              <a:rPr lang="en-US" sz="1600" dirty="0">
                 <a:solidFill>
                   <a:srgbClr val="4A4A4A"/>
                 </a:solidFill>
                 <a:latin typeface="Open Sans"/>
               </a:rPr>
-              <a:t>docker</a:t>
-            </a:r>
-            <a:r>
-              <a:rPr lang="en-US" dirty="0">
+              <a:t>Pause the container(optional)</a:t>
+            </a:r>
+          </a:p>
+          <a:p>
+            <a:pPr lvl="2" algn="just">
+              <a:buFont typeface="Wingdings" pitchFamily="2" charset="2"/>
+              <a:buChar char="q"/>
+            </a:pPr>
+            <a:r>
+              <a:rPr lang="en-US" sz="1600" dirty="0">
                 <a:solidFill>
                   <a:srgbClr val="4A4A4A"/>
                 </a:solidFill>
                 <a:latin typeface="Open Sans"/>
               </a:rPr>
-              <a:t> images live. This registry is </a:t>
-            </a:r>
-            <a:r>
-              <a:rPr lang="en-US" dirty="0" err="1">
+              <a:t>Un-pause the container(optional)</a:t>
+            </a:r>
+          </a:p>
+          <a:p>
+            <a:pPr lvl="2" algn="just">
+              <a:buFont typeface="Wingdings" pitchFamily="2" charset="2"/>
+              <a:buChar char="q"/>
+            </a:pPr>
+            <a:r>
+              <a:rPr lang="en-US" sz="1600" dirty="0">
                 <a:solidFill>
                   <a:srgbClr val="4A4A4A"/>
                 </a:solidFill>
                 <a:latin typeface="Open Sans"/>
               </a:rPr>
-              <a:t>Docker</a:t>
-            </a:r>
-            <a:r>
-              <a:rPr lang="en-US" dirty="0">
+              <a:t>Start the container</a:t>
+            </a:r>
+          </a:p>
+          <a:p>
+            <a:pPr lvl="2" algn="just">
+              <a:buFont typeface="Wingdings" pitchFamily="2" charset="2"/>
+              <a:buChar char="q"/>
+            </a:pPr>
+            <a:r>
+              <a:rPr lang="en-US" sz="1600" dirty="0">
                 <a:solidFill>
                   <a:srgbClr val="4A4A4A"/>
                 </a:solidFill>
                 <a:latin typeface="Open Sans"/>
               </a:rPr>
-              <a:t> Hub. Users can pick up images from </a:t>
-            </a:r>
-            <a:r>
-              <a:rPr lang="en-US" dirty="0" err="1">
+              <a:t>Stop the container</a:t>
+            </a:r>
+          </a:p>
+          <a:p>
+            <a:pPr lvl="2" algn="just">
+              <a:buFont typeface="Wingdings" pitchFamily="2" charset="2"/>
+              <a:buChar char="q"/>
+            </a:pPr>
+            <a:r>
+              <a:rPr lang="en-US" sz="1600" dirty="0">
                 <a:solidFill>
                   <a:srgbClr val="4A4A4A"/>
                 </a:solidFill>
                 <a:latin typeface="Open Sans"/>
               </a:rPr>
-              <a:t>Docker</a:t>
-            </a:r>
-            <a:r>
-              <a:rPr lang="en-US" dirty="0">
+              <a:t>Restart the container</a:t>
+            </a:r>
+          </a:p>
+          <a:p>
+            <a:pPr lvl="2" algn="just">
+              <a:buFont typeface="Wingdings" pitchFamily="2" charset="2"/>
+              <a:buChar char="q"/>
+            </a:pPr>
+            <a:r>
+              <a:rPr lang="en-US" sz="1600" dirty="0">
                 <a:solidFill>
                   <a:srgbClr val="4A4A4A"/>
                 </a:solidFill>
                 <a:latin typeface="Open Sans"/>
               </a:rPr>
-              <a:t> Hub and use them to create customized images and containers. Currently, </a:t>
-            </a:r>
-            <a:r>
-              <a:rPr lang="en-US" dirty="0" smtClean="0">
+              <a:t>Kill the container</a:t>
+            </a:r>
+          </a:p>
+          <a:p>
+            <a:pPr lvl="1" algn="just">
+              <a:buFont typeface="Arial"/>
+              <a:buChar char="•"/>
+            </a:pPr>
+            <a:r>
+              <a:rPr lang="en-US" sz="1800" dirty="0">
                 <a:solidFill>
                   <a:srgbClr val="4A4A4A"/>
                 </a:solidFill>
                 <a:latin typeface="Open Sans"/>
               </a:rPr>
-              <a:t>the </a:t>
-            </a:r>
-            <a:r>
-              <a:rPr lang="en-US" dirty="0" err="1" smtClean="0">
-                <a:solidFill>
-                  <a:srgbClr val="4A4A4A"/>
-                </a:solidFill>
-                <a:latin typeface="Open Sans"/>
-              </a:rPr>
-              <a:t>Docker</a:t>
-            </a:r>
-            <a:r>
-              <a:rPr lang="en-US" dirty="0" smtClean="0">
-                <a:solidFill>
-                  <a:srgbClr val="4A4A4A"/>
-                </a:solidFill>
-                <a:latin typeface="Open Sans"/>
-              </a:rPr>
-              <a:t> hub(hub.docker.com)</a:t>
-            </a:r>
-            <a:r>
-              <a:rPr lang="en-US" dirty="0">
-                <a:solidFill>
-                  <a:srgbClr val="4A4A4A"/>
-                </a:solidFill>
-                <a:latin typeface="Open Sans"/>
-              </a:rPr>
-              <a:t> is the world’s largest public repository of image containers</a:t>
-            </a:r>
-            <a:r>
-              <a:rPr lang="en-US" dirty="0" smtClean="0">
-                <a:solidFill>
-                  <a:srgbClr val="4A4A4A"/>
-                </a:solidFill>
-                <a:latin typeface="Open Sans"/>
-              </a:rPr>
-              <a:t>.</a:t>
-            </a:r>
-          </a:p>
-          <a:p>
-            <a:r>
-              <a:rPr lang="en-US" b="1" dirty="0" err="1">
-                <a:solidFill>
-                  <a:srgbClr val="4A4A4A"/>
-                </a:solidFill>
-                <a:latin typeface="Open Sans"/>
-              </a:rPr>
-              <a:t>Docker</a:t>
-            </a:r>
-            <a:r>
-              <a:rPr lang="en-US" b="1" dirty="0">
-                <a:solidFill>
-                  <a:srgbClr val="4A4A4A"/>
-                </a:solidFill>
-                <a:latin typeface="Open Sans"/>
-              </a:rPr>
-              <a:t> machine </a:t>
-            </a:r>
-            <a:r>
-              <a:rPr lang="en-US" dirty="0">
-                <a:solidFill>
-                  <a:srgbClr val="4A4A4A"/>
-                </a:solidFill>
-                <a:latin typeface="Open Sans"/>
-              </a:rPr>
-              <a:t>is a tool that lets you install </a:t>
-            </a:r>
-            <a:r>
-              <a:rPr lang="en-US" dirty="0" err="1">
-                <a:solidFill>
-                  <a:srgbClr val="4A4A4A"/>
-                </a:solidFill>
-                <a:latin typeface="Open Sans"/>
-              </a:rPr>
-              <a:t>Docker</a:t>
-            </a:r>
-            <a:r>
-              <a:rPr lang="en-US" dirty="0">
-                <a:solidFill>
-                  <a:srgbClr val="4A4A4A"/>
-                </a:solidFill>
-                <a:latin typeface="Open Sans"/>
-              </a:rPr>
-              <a:t> Engine on virtual hosts. These hosts can now be managed using the </a:t>
-            </a:r>
-            <a:r>
-              <a:rPr lang="en-US" dirty="0" err="1">
-                <a:solidFill>
-                  <a:srgbClr val="4A4A4A"/>
-                </a:solidFill>
-                <a:latin typeface="Open Sans"/>
-              </a:rPr>
-              <a:t>docker</a:t>
-            </a:r>
-            <a:r>
-              <a:rPr lang="en-US" dirty="0">
-                <a:solidFill>
-                  <a:srgbClr val="4A4A4A"/>
-                </a:solidFill>
-                <a:latin typeface="Open Sans"/>
-              </a:rPr>
-              <a:t>-machine commands. </a:t>
-            </a:r>
-            <a:r>
-              <a:rPr lang="en-US" dirty="0" err="1">
-                <a:solidFill>
-                  <a:srgbClr val="4A4A4A"/>
-                </a:solidFill>
-                <a:latin typeface="Open Sans"/>
-              </a:rPr>
-              <a:t>Docker</a:t>
-            </a:r>
-            <a:r>
-              <a:rPr lang="en-US" dirty="0">
-                <a:solidFill>
-                  <a:srgbClr val="4A4A4A"/>
-                </a:solidFill>
-                <a:latin typeface="Open Sans"/>
-              </a:rPr>
-              <a:t> machine also lets you provision </a:t>
-            </a:r>
-            <a:r>
-              <a:rPr lang="en-US" dirty="0" err="1">
-                <a:solidFill>
-                  <a:srgbClr val="4A4A4A"/>
-                </a:solidFill>
-                <a:latin typeface="Open Sans"/>
-              </a:rPr>
-              <a:t>Docker</a:t>
-            </a:r>
-            <a:r>
-              <a:rPr lang="en-US" dirty="0">
-                <a:solidFill>
-                  <a:srgbClr val="4A4A4A"/>
-                </a:solidFill>
-                <a:latin typeface="Open Sans"/>
-              </a:rPr>
-              <a:t> Swarm Clusters.</a:t>
-            </a:r>
+              <a:t>Destroy the container</a:t>
+            </a:r>
+          </a:p>
+          <a:p>
             <a:endParaRPr lang="en-US" dirty="0"/>
           </a:p>
         </p:txBody>
@@ -16285,7 +16452,7 @@
     </p:spTree>
     <p:extLst>
       <p:ext uri="{BB962C8B-B14F-4D97-AF65-F5344CB8AC3E}">
-        <p14:creationId xmlns:p14="http://schemas.microsoft.com/office/powerpoint/2010/main" val="1417969648"/>
+        <p14:creationId xmlns:p14="http://schemas.microsoft.com/office/powerpoint/2010/main" val="688499976"/>
       </p:ext>
     </p:extLst>
   </p:cSld>
@@ -16335,16 +16502,12 @@
           <a:lstStyle/>
           <a:p>
             <a:r>
-              <a:rPr lang="en-US" dirty="0" err="1">
-                <a:latin typeface="Open Sans"/>
-              </a:rPr>
+              <a:rPr lang="en-US" dirty="0" err="1" smtClean="0"/>
               <a:t>Docker</a:t>
             </a:r>
             <a:r>
-              <a:rPr lang="en-US" dirty="0">
-                <a:latin typeface="Open Sans"/>
-              </a:rPr>
-              <a:t> Architecture</a:t>
+              <a:rPr lang="en-US" dirty="0" smtClean="0"/>
+              <a:t> Hub</a:t>
             </a:r>
             <a:endParaRPr lang="en-US" dirty="0"/>
           </a:p>
@@ -16362,169 +16525,250 @@
         </p:nvSpPr>
         <p:spPr>
           <a:xfrm>
-            <a:off x="457200" y="2603500"/>
-            <a:ext cx="11353800" cy="3416300"/>
+            <a:off x="533400" y="2603500"/>
+            <a:ext cx="9447213" cy="3416300"/>
           </a:xfrm>
         </p:spPr>
         <p:txBody>
           <a:bodyPr/>
           <a:lstStyle/>
           <a:p>
-            <a:pPr marL="0" indent="0">
-              <a:buNone/>
-            </a:pPr>
+            <a:r>
+              <a:rPr lang="en-US" dirty="0" err="1">
+                <a:solidFill>
+                  <a:srgbClr val="4A4A4A"/>
+                </a:solidFill>
+                <a:latin typeface="Open Sans"/>
+              </a:rPr>
+              <a:t>Docker</a:t>
+            </a:r>
+            <a:r>
+              <a:rPr lang="en-US" dirty="0">
+                <a:solidFill>
+                  <a:srgbClr val="4A4A4A"/>
+                </a:solidFill>
+                <a:latin typeface="Open Sans"/>
+              </a:rPr>
+              <a:t> images create </a:t>
+            </a:r>
+            <a:r>
+              <a:rPr lang="en-US" dirty="0" err="1">
+                <a:solidFill>
+                  <a:srgbClr val="4A4A4A"/>
+                </a:solidFill>
+                <a:latin typeface="Open Sans"/>
+              </a:rPr>
+              <a:t>docker</a:t>
+            </a:r>
+            <a:r>
+              <a:rPr lang="en-US" dirty="0">
+                <a:solidFill>
+                  <a:srgbClr val="4A4A4A"/>
+                </a:solidFill>
+                <a:latin typeface="Open Sans"/>
+              </a:rPr>
+              <a:t> containers. There has to be a registry where these </a:t>
+            </a:r>
+            <a:r>
+              <a:rPr lang="en-US" dirty="0" err="1">
+                <a:solidFill>
+                  <a:srgbClr val="4A4A4A"/>
+                </a:solidFill>
+                <a:latin typeface="Open Sans"/>
+              </a:rPr>
+              <a:t>docker</a:t>
+            </a:r>
+            <a:r>
+              <a:rPr lang="en-US" dirty="0">
+                <a:solidFill>
+                  <a:srgbClr val="4A4A4A"/>
+                </a:solidFill>
+                <a:latin typeface="Open Sans"/>
+              </a:rPr>
+              <a:t> images live. This registry is </a:t>
+            </a:r>
+            <a:r>
+              <a:rPr lang="en-US" dirty="0" err="1">
+                <a:solidFill>
+                  <a:srgbClr val="4A4A4A"/>
+                </a:solidFill>
+                <a:latin typeface="Open Sans"/>
+              </a:rPr>
+              <a:t>Docker</a:t>
+            </a:r>
+            <a:r>
+              <a:rPr lang="en-US" dirty="0">
+                <a:solidFill>
+                  <a:srgbClr val="4A4A4A"/>
+                </a:solidFill>
+                <a:latin typeface="Open Sans"/>
+              </a:rPr>
+              <a:t> Hub. Users can pick up images from </a:t>
+            </a:r>
+            <a:r>
+              <a:rPr lang="en-US" dirty="0" err="1">
+                <a:solidFill>
+                  <a:srgbClr val="4A4A4A"/>
+                </a:solidFill>
+                <a:latin typeface="Open Sans"/>
+              </a:rPr>
+              <a:t>Docker</a:t>
+            </a:r>
+            <a:r>
+              <a:rPr lang="en-US" dirty="0">
+                <a:solidFill>
+                  <a:srgbClr val="4A4A4A"/>
+                </a:solidFill>
+                <a:latin typeface="Open Sans"/>
+              </a:rPr>
+              <a:t> Hub and use them to create customized images and containers. Currently, </a:t>
+            </a:r>
+            <a:r>
+              <a:rPr lang="en-US" dirty="0" smtClean="0">
+                <a:solidFill>
+                  <a:srgbClr val="4A4A4A"/>
+                </a:solidFill>
+                <a:latin typeface="Open Sans"/>
+              </a:rPr>
+              <a:t>the </a:t>
+            </a:r>
             <a:r>
               <a:rPr lang="en-US" dirty="0" err="1" smtClean="0">
+                <a:solidFill>
+                  <a:srgbClr val="4A4A4A"/>
+                </a:solidFill>
                 <a:latin typeface="Open Sans"/>
               </a:rPr>
               <a:t>Docker</a:t>
             </a:r>
             <a:r>
               <a:rPr lang="en-US" dirty="0" smtClean="0">
-                <a:latin typeface="Open Sans"/>
-              </a:rPr>
-              <a:t> have client server architecture having three major components</a:t>
-            </a:r>
-          </a:p>
-          <a:p>
+                <a:solidFill>
+                  <a:srgbClr val="4A4A4A"/>
+                </a:solidFill>
+                <a:latin typeface="Open Sans"/>
+              </a:rPr>
+              <a:t> hub(hub.docker.com)</a:t>
+            </a:r>
+            <a:r>
+              <a:rPr lang="en-US" dirty="0">
+                <a:solidFill>
+                  <a:srgbClr val="4A4A4A"/>
+                </a:solidFill>
+                <a:latin typeface="Open Sans"/>
+              </a:rPr>
+              <a:t> is the world’s largest public repository of image containers</a:t>
+            </a:r>
             <a:r>
               <a:rPr lang="en-US" dirty="0" smtClean="0">
-                <a:latin typeface="Open Sans"/>
-              </a:rPr>
-              <a:t>Client</a:t>
-            </a:r>
-          </a:p>
-          <a:p>
-            <a:pPr lvl="1"/>
-            <a:r>
-              <a:rPr lang="en-US" dirty="0" err="1" smtClean="0">
+                <a:solidFill>
+                  <a:srgbClr val="4A4A4A"/>
+                </a:solidFill>
+                <a:latin typeface="Open Sans"/>
+              </a:rPr>
+              <a:t>.</a:t>
+            </a:r>
+          </a:p>
+          <a:p>
+            <a:r>
+              <a:rPr lang="en-US" b="1" dirty="0" err="1">
+                <a:solidFill>
+                  <a:srgbClr val="4A4A4A"/>
+                </a:solidFill>
                 <a:latin typeface="Open Sans"/>
               </a:rPr>
               <a:t>Docker</a:t>
             </a:r>
             <a:r>
-              <a:rPr lang="en-US" dirty="0" smtClean="0">
-                <a:latin typeface="Open Sans"/>
-              </a:rPr>
-              <a:t> build, </a:t>
-            </a:r>
-            <a:r>
-              <a:rPr lang="en-US" dirty="0" err="1" smtClean="0">
+              <a:rPr lang="en-US" b="1" dirty="0">
+                <a:solidFill>
+                  <a:srgbClr val="4A4A4A"/>
+                </a:solidFill>
+                <a:latin typeface="Open Sans"/>
+              </a:rPr>
+              <a:t> machine </a:t>
+            </a:r>
+            <a:r>
+              <a:rPr lang="en-US" dirty="0">
+                <a:solidFill>
+                  <a:srgbClr val="4A4A4A"/>
+                </a:solidFill>
+                <a:latin typeface="Open Sans"/>
+              </a:rPr>
+              <a:t>is a tool that lets you install </a:t>
+            </a:r>
+            <a:r>
+              <a:rPr lang="en-US" dirty="0" err="1">
+                <a:solidFill>
+                  <a:srgbClr val="4A4A4A"/>
+                </a:solidFill>
                 <a:latin typeface="Open Sans"/>
               </a:rPr>
               <a:t>Docker</a:t>
             </a:r>
             <a:r>
-              <a:rPr lang="en-US" dirty="0" smtClean="0">
-                <a:latin typeface="Open Sans"/>
-              </a:rPr>
-              <a:t> pull, </a:t>
-            </a:r>
-            <a:r>
-              <a:rPr lang="en-US" dirty="0" err="1" smtClean="0">
+              <a:rPr lang="en-US" dirty="0">
+                <a:solidFill>
+                  <a:srgbClr val="4A4A4A"/>
+                </a:solidFill>
+                <a:latin typeface="Open Sans"/>
+              </a:rPr>
+              <a:t> Engine on virtual hosts. These hosts can now be managed using the </a:t>
+            </a:r>
+            <a:r>
+              <a:rPr lang="en-US" dirty="0" err="1">
+                <a:solidFill>
+                  <a:srgbClr val="4A4A4A"/>
+                </a:solidFill>
+                <a:latin typeface="Open Sans"/>
+              </a:rPr>
+              <a:t>docker</a:t>
+            </a:r>
+            <a:r>
+              <a:rPr lang="en-US" dirty="0">
+                <a:solidFill>
+                  <a:srgbClr val="4A4A4A"/>
+                </a:solidFill>
+                <a:latin typeface="Open Sans"/>
+              </a:rPr>
+              <a:t>-machine commands. </a:t>
+            </a:r>
+            <a:r>
+              <a:rPr lang="en-US" dirty="0" err="1">
+                <a:solidFill>
+                  <a:srgbClr val="4A4A4A"/>
+                </a:solidFill>
                 <a:latin typeface="Open Sans"/>
               </a:rPr>
               <a:t>Docker</a:t>
             </a:r>
             <a:r>
-              <a:rPr lang="en-US" dirty="0" smtClean="0">
-                <a:latin typeface="Open Sans"/>
-              </a:rPr>
-              <a:t> run etc</a:t>
-            </a:r>
-            <a:r>
               <a:rPr lang="en-US" dirty="0">
-                <a:latin typeface="Open Sans"/>
-              </a:rPr>
-              <a:t>.</a:t>
-            </a:r>
-            <a:endParaRPr lang="en-US" dirty="0" smtClean="0">
-              <a:latin typeface="Open Sans"/>
-            </a:endParaRPr>
-          </a:p>
-          <a:p>
-            <a:r>
-              <a:rPr lang="en-US" sz="1800" dirty="0" err="1" smtClean="0">
+                <a:solidFill>
+                  <a:srgbClr val="4A4A4A"/>
+                </a:solidFill>
+                <a:latin typeface="Open Sans"/>
+              </a:rPr>
+              <a:t> machine also lets you provision </a:t>
+            </a:r>
+            <a:r>
+              <a:rPr lang="en-US" dirty="0" err="1">
+                <a:solidFill>
+                  <a:srgbClr val="4A4A4A"/>
+                </a:solidFill>
                 <a:latin typeface="Open Sans"/>
               </a:rPr>
               <a:t>Docker</a:t>
             </a:r>
             <a:r>
-              <a:rPr lang="en-US" sz="1800" dirty="0" smtClean="0">
-                <a:latin typeface="Open Sans"/>
-              </a:rPr>
-              <a:t> Host</a:t>
-            </a:r>
-          </a:p>
-          <a:p>
-            <a:pPr lvl="1"/>
-            <a:r>
-              <a:rPr lang="en-US" sz="1600" dirty="0" err="1" smtClean="0">
-                <a:latin typeface="Open Sans"/>
-              </a:rPr>
-              <a:t>Docker</a:t>
-            </a:r>
-            <a:r>
-              <a:rPr lang="en-US" sz="1600" dirty="0" smtClean="0">
-                <a:latin typeface="Open Sans"/>
-              </a:rPr>
-              <a:t> daemon</a:t>
-            </a:r>
-          </a:p>
-          <a:p>
-            <a:r>
-              <a:rPr lang="en-US" dirty="0" err="1" smtClean="0">
-                <a:latin typeface="Open Sans"/>
-              </a:rPr>
-              <a:t>Regitry</a:t>
-            </a:r>
-            <a:endParaRPr lang="en-US" dirty="0" smtClean="0">
-              <a:latin typeface="Open Sans"/>
-            </a:endParaRPr>
-          </a:p>
-          <a:p>
-            <a:pPr lvl="1"/>
-            <a:r>
-              <a:rPr lang="en-US" sz="1600" dirty="0" smtClean="0">
-                <a:latin typeface="Open Sans"/>
-              </a:rPr>
-              <a:t>Like </a:t>
-            </a:r>
-            <a:r>
-              <a:rPr lang="en-US" sz="1600" dirty="0" err="1" smtClean="0">
-                <a:latin typeface="Open Sans"/>
-              </a:rPr>
-              <a:t>nginx</a:t>
-            </a:r>
-            <a:r>
-              <a:rPr lang="en-US" dirty="0" smtClean="0">
-                <a:latin typeface="Open Sans"/>
-              </a:rPr>
-              <a:t>, </a:t>
-            </a:r>
-            <a:r>
-              <a:rPr lang="en-US" dirty="0" err="1" smtClean="0">
-                <a:latin typeface="Open Sans"/>
-              </a:rPr>
-              <a:t>ubuntu</a:t>
-            </a:r>
-            <a:r>
-              <a:rPr lang="en-US" sz="1600" dirty="0" smtClean="0">
-                <a:latin typeface="Open Sans"/>
-              </a:rPr>
-              <a:t> </a:t>
-            </a:r>
-            <a:r>
-              <a:rPr lang="en-US" sz="1600" dirty="0" err="1" smtClean="0">
-                <a:latin typeface="Open Sans"/>
-              </a:rPr>
-              <a:t>etc</a:t>
-            </a:r>
-            <a:endParaRPr lang="en-US" sz="1600" dirty="0" smtClean="0">
-              <a:latin typeface="Open Sans"/>
-            </a:endParaRPr>
-          </a:p>
-          <a:p>
+              <a:rPr lang="en-US" dirty="0">
+                <a:solidFill>
+                  <a:srgbClr val="4A4A4A"/>
+                </a:solidFill>
+                <a:latin typeface="Open Sans"/>
+              </a:rPr>
+              <a:t> Swarm Clusters.</a:t>
+            </a:r>
             <a:endParaRPr lang="en-US" dirty="0"/>
           </a:p>
         </p:txBody>
@@ -16532,7 +16776,7 @@
     </p:spTree>
     <p:extLst>
       <p:ext uri="{BB962C8B-B14F-4D97-AF65-F5344CB8AC3E}">
-        <p14:creationId xmlns:p14="http://schemas.microsoft.com/office/powerpoint/2010/main" val="1023722639"/>
+        <p14:creationId xmlns:p14="http://schemas.microsoft.com/office/powerpoint/2010/main" val="1417969648"/>
       </p:ext>
     </p:extLst>
   </p:cSld>
@@ -16568,13 +16812,7 @@
       </p:grpSpPr>
       <p:sp>
         <p:nvSpPr>
-          <p:cNvPr id="2" name="Title 1">
-            <a:extLst>
-              <a:ext uri="{FF2B5EF4-FFF2-40B4-BE49-F238E27FC236}">
-                <a16:creationId xmlns="" xmlns:a16="http://schemas.microsoft.com/office/drawing/2014/main" id="{022EF37B-0053-5445-92AD-0BFB56B8098A}"/>
-              </a:ext>
-            </a:extLst>
-          </p:cNvPr>
+          <p:cNvPr id="2" name="Title 1"/>
           <p:cNvSpPr>
             <a:spLocks noGrp="1"/>
           </p:cNvSpPr>
@@ -16588,22 +16826,24 @@
           <a:lstStyle/>
           <a:p>
             <a:r>
-              <a:rPr lang="en-IN"/>
-              <a:t>Docker Registry</a:t>
-            </a:r>
-            <a:endParaRPr lang="en-US"/>
+              <a:rPr lang="en-US" dirty="0" err="1">
+                <a:latin typeface="Open Sans"/>
+              </a:rPr>
+              <a:t>Docker</a:t>
+            </a:r>
+            <a:r>
+              <a:rPr lang="en-US" dirty="0">
+                <a:latin typeface="Open Sans"/>
+              </a:rPr>
+              <a:t> Architecture</a:t>
+            </a:r>
+            <a:endParaRPr lang="en-US" dirty="0"/>
           </a:p>
         </p:txBody>
       </p:sp>
       <p:sp>
         <p:nvSpPr>
-          <p:cNvPr id="3" name="Content Placeholder 2">
-            <a:extLst>
-              <a:ext uri="{FF2B5EF4-FFF2-40B4-BE49-F238E27FC236}">
-                <a16:creationId xmlns="" xmlns:a16="http://schemas.microsoft.com/office/drawing/2014/main" id="{5D72B523-BBC6-CD48-9A35-296DF2B31BD1}"/>
-              </a:ext>
-            </a:extLst>
-          </p:cNvPr>
+          <p:cNvPr id="3" name="Content Placeholder 2"/>
           <p:cNvSpPr>
             <a:spLocks noGrp="1"/>
           </p:cNvSpPr>
@@ -16613,21 +16853,40 @@
         </p:nvSpPr>
         <p:spPr>
           <a:xfrm>
-            <a:off x="533400" y="2286000"/>
-            <a:ext cx="11277600" cy="4343400"/>
+            <a:off x="457200" y="2603500"/>
+            <a:ext cx="11353800" cy="3416300"/>
           </a:xfrm>
         </p:spPr>
         <p:txBody>
           <a:bodyPr/>
           <a:lstStyle/>
           <a:p>
-            <a:pPr algn="just"/>
+            <a:pPr marL="0" indent="0">
+              <a:buNone/>
+            </a:pPr>
+            <a:r>
+              <a:rPr lang="en-US" dirty="0" err="1" smtClean="0">
+                <a:latin typeface="Open Sans"/>
+              </a:rPr>
+              <a:t>Docker</a:t>
+            </a:r>
             <a:r>
               <a:rPr lang="en-US" dirty="0" smtClean="0">
                 <a:latin typeface="Open Sans"/>
               </a:rPr>
-              <a:t>The </a:t>
-            </a:r>
+              <a:t> have client server architecture having three major components</a:t>
+            </a:r>
+          </a:p>
+          <a:p>
+            <a:r>
+              <a:rPr lang="en-US" dirty="0" smtClean="0">
+                <a:latin typeface="Open Sans"/>
+              </a:rPr>
+              <a:t>Client</a:t>
+            </a:r>
+          </a:p>
+          <a:p>
+            <a:pPr lvl="1"/>
             <a:r>
               <a:rPr lang="en-US" dirty="0" err="1" smtClean="0">
                 <a:latin typeface="Open Sans"/>
@@ -16638,148 +16897,133 @@
               <a:rPr lang="en-US" dirty="0" smtClean="0">
                 <a:latin typeface="Open Sans"/>
               </a:rPr>
-              <a:t> Registry is the stateless, highly scalable server side application that stores and let </a:t>
+              <a:t> build, </a:t>
             </a:r>
             <a:r>
               <a:rPr lang="en-US" dirty="0" err="1" smtClean="0">
                 <a:latin typeface="Open Sans"/>
               </a:rPr>
-              <a:t>distributedocker</a:t>
+              <a:t>Docker</a:t>
             </a:r>
             <a:r>
               <a:rPr lang="en-US" dirty="0" smtClean="0">
                 <a:latin typeface="Open Sans"/>
               </a:rPr>
-              <a:t> images. It allows:</a:t>
-            </a:r>
-          </a:p>
-          <a:p>
-            <a:pPr lvl="1" algn="just"/>
+              <a:t> pull, </a:t>
+            </a:r>
+            <a:r>
+              <a:rPr lang="en-US" dirty="0" err="1" smtClean="0">
+                <a:latin typeface="Open Sans"/>
+              </a:rPr>
+              <a:t>Docker</a:t>
+            </a:r>
             <a:r>
               <a:rPr lang="en-US" dirty="0" smtClean="0">
                 <a:latin typeface="Open Sans"/>
               </a:rPr>
-              <a:t>Tightly control where your images are stored.</a:t>
-            </a:r>
-          </a:p>
-          <a:p>
-            <a:pPr lvl="1" algn="just"/>
-            <a:r>
-              <a:rPr lang="en-US" dirty="0" smtClean="0">
-                <a:latin typeface="Open Sans"/>
-              </a:rPr>
-              <a:t>Fully own your image distribution pipeline</a:t>
-            </a:r>
-          </a:p>
-          <a:p>
-            <a:pPr lvl="1" algn="just"/>
-            <a:r>
-              <a:rPr lang="en-US" dirty="0" smtClean="0">
-                <a:latin typeface="Open Sans"/>
-              </a:rPr>
-              <a:t>Integrate image storage and distribution tightly into your in-house development workflow.</a:t>
-            </a:r>
-          </a:p>
-          <a:p>
-            <a:pPr lvl="1" algn="just"/>
-            <a:r>
-              <a:rPr lang="en-US" dirty="0" smtClean="0">
-                <a:latin typeface="Open Sans"/>
-              </a:rPr>
-              <a:t>Commands:</a:t>
-            </a:r>
-          </a:p>
-          <a:p>
-            <a:pPr marL="457200" lvl="1" indent="0" algn="just">
-              <a:buNone/>
-            </a:pPr>
+              <a:t> run etc</a:t>
+            </a:r>
             <a:r>
               <a:rPr lang="en-US" dirty="0">
                 <a:latin typeface="Open Sans"/>
               </a:rPr>
-              <a:t>	</a:t>
-            </a:r>
-            <a:r>
-              <a:rPr lang="en-US" dirty="0" smtClean="0">
-                <a:latin typeface="Open Sans"/>
-              </a:rPr>
-              <a:t>To start registry: </a:t>
-            </a:r>
-            <a:r>
-              <a:rPr lang="en-US" dirty="0" err="1" smtClean="0">
-                <a:latin typeface="Open Sans"/>
-              </a:rPr>
-              <a:t>docker</a:t>
-            </a:r>
-            <a:r>
-              <a:rPr lang="en-US" dirty="0" smtClean="0">
-                <a:latin typeface="Open Sans"/>
-              </a:rPr>
-              <a:t> run –d –p 5000:5000 –name registry registry:2</a:t>
-            </a:r>
-          </a:p>
-          <a:p>
-            <a:pPr marL="457200" lvl="1" indent="0" algn="just">
-              <a:buNone/>
-            </a:pPr>
-            <a:r>
-              <a:rPr lang="en-US" dirty="0">
-                <a:latin typeface="Open Sans"/>
-              </a:rPr>
-              <a:t>	</a:t>
-            </a:r>
-            <a:r>
-              <a:rPr lang="en-US" dirty="0" smtClean="0">
-                <a:latin typeface="Open Sans"/>
-              </a:rPr>
-              <a:t>To stop Registry: </a:t>
-            </a:r>
-            <a:r>
-              <a:rPr lang="en-US" dirty="0" err="1" smtClean="0">
-                <a:latin typeface="Open Sans"/>
-              </a:rPr>
-              <a:t>docker</a:t>
-            </a:r>
-            <a:r>
-              <a:rPr lang="en-US" dirty="0" smtClean="0">
-                <a:latin typeface="Open Sans"/>
-              </a:rPr>
-              <a:t> container stop registry &amp;&amp;  </a:t>
-            </a:r>
-            <a:r>
-              <a:rPr lang="en-US" dirty="0" err="1" smtClean="0">
-                <a:latin typeface="Open Sans"/>
-              </a:rPr>
-              <a:t>docker</a:t>
-            </a:r>
-            <a:r>
-              <a:rPr lang="en-US" dirty="0" smtClean="0">
-                <a:latin typeface="Open Sans"/>
-              </a:rPr>
-              <a:t> container </a:t>
-            </a:r>
-            <a:r>
-              <a:rPr lang="en-US" dirty="0" err="1" smtClean="0">
-                <a:latin typeface="Open Sans"/>
-              </a:rPr>
-              <a:t>rm</a:t>
-            </a:r>
-            <a:r>
-              <a:rPr lang="en-US" dirty="0" smtClean="0">
-                <a:latin typeface="Open Sans"/>
-              </a:rPr>
-              <a:t> –v registry </a:t>
-            </a:r>
-            <a:endParaRPr lang="en-US" dirty="0">
+              <a:t>.</a:t>
+            </a:r>
+            <a:endParaRPr lang="en-US" dirty="0" smtClean="0">
               <a:latin typeface="Open Sans"/>
             </a:endParaRPr>
+          </a:p>
+          <a:p>
+            <a:r>
+              <a:rPr lang="en-US" sz="1800" dirty="0" err="1" smtClean="0">
+                <a:latin typeface="Open Sans"/>
+              </a:rPr>
+              <a:t>Docker</a:t>
+            </a:r>
+            <a:r>
+              <a:rPr lang="en-US" sz="1800" dirty="0" smtClean="0">
+                <a:latin typeface="Open Sans"/>
+              </a:rPr>
+              <a:t> Host</a:t>
+            </a:r>
+          </a:p>
+          <a:p>
+            <a:pPr lvl="1"/>
+            <a:r>
+              <a:rPr lang="en-US" sz="1600" dirty="0" err="1" smtClean="0">
+                <a:latin typeface="Open Sans"/>
+              </a:rPr>
+              <a:t>Docker</a:t>
+            </a:r>
+            <a:r>
+              <a:rPr lang="en-US" sz="1600" dirty="0" smtClean="0">
+                <a:latin typeface="Open Sans"/>
+              </a:rPr>
+              <a:t> daemon</a:t>
+            </a:r>
+          </a:p>
+          <a:p>
+            <a:r>
+              <a:rPr lang="en-US" dirty="0" err="1" smtClean="0">
+                <a:latin typeface="Open Sans"/>
+              </a:rPr>
+              <a:t>Regitry</a:t>
+            </a:r>
+            <a:endParaRPr lang="en-US" dirty="0" smtClean="0">
+              <a:latin typeface="Open Sans"/>
+            </a:endParaRPr>
+          </a:p>
+          <a:p>
+            <a:pPr lvl="1"/>
+            <a:r>
+              <a:rPr lang="en-US" sz="1600" dirty="0" smtClean="0">
+                <a:latin typeface="Open Sans"/>
+              </a:rPr>
+              <a:t>Like </a:t>
+            </a:r>
+            <a:r>
+              <a:rPr lang="en-US" sz="1600" dirty="0" err="1" smtClean="0">
+                <a:latin typeface="Open Sans"/>
+              </a:rPr>
+              <a:t>nginx</a:t>
+            </a:r>
+            <a:r>
+              <a:rPr lang="en-US" dirty="0" smtClean="0">
+                <a:latin typeface="Open Sans"/>
+              </a:rPr>
+              <a:t>, </a:t>
+            </a:r>
+            <a:r>
+              <a:rPr lang="en-US" dirty="0" err="1" smtClean="0">
+                <a:latin typeface="Open Sans"/>
+              </a:rPr>
+              <a:t>ubuntu</a:t>
+            </a:r>
+            <a:r>
+              <a:rPr lang="en-US" sz="1600" dirty="0" smtClean="0">
+                <a:latin typeface="Open Sans"/>
+              </a:rPr>
+              <a:t> </a:t>
+            </a:r>
+            <a:r>
+              <a:rPr lang="en-US" sz="1600" dirty="0" err="1" smtClean="0">
+                <a:latin typeface="Open Sans"/>
+              </a:rPr>
+              <a:t>etc</a:t>
+            </a:r>
+            <a:endParaRPr lang="en-US" sz="1600" dirty="0" smtClean="0">
+              <a:latin typeface="Open Sans"/>
+            </a:endParaRPr>
+          </a:p>
+          <a:p>
+            <a:endParaRPr lang="en-US" dirty="0"/>
           </a:p>
         </p:txBody>
       </p:sp>
     </p:spTree>
     <p:extLst>
       <p:ext uri="{BB962C8B-B14F-4D97-AF65-F5344CB8AC3E}">
-        <p14:creationId xmlns:p14="http://schemas.microsoft.com/office/powerpoint/2010/main" val="1699113012"/>
+        <p14:creationId xmlns:p14="http://schemas.microsoft.com/office/powerpoint/2010/main" val="1023722639"/>
       </p:ext>
     </p:extLst>
   </p:cSld>
@@ -17054,7 +17298,7 @@
   <a:extraClrSchemeLst/>
   <a:extLst>
     <a:ext uri="{05A4C25C-085E-4340-85A3-A5531E510DB2}">
-      <thm15:themeFamily xmlns="" xmlns:thm15="http://schemas.microsoft.com/office/thememl/2012/main" name="TF10001029" id="{ED3996BA-162B-43C7-B0E2-A5CA4E649741}" vid="{187088E4-27D7-4455-856F-4A44258D82E2}"/>
+      <thm15:themeFamily xmlns:thm15="http://schemas.microsoft.com/office/thememl/2012/main" xmlns="" name="TF10001029" id="{ED3996BA-162B-43C7-B0E2-A5CA4E649741}" vid="{187088E4-27D7-4455-856F-4A44258D82E2}"/>
     </a:ext>
   </a:extLst>
 </a:theme>

</xml_diff>

<commit_message>
Pages Reduced to previous
</commit_message>
<xml_diff>
--- a/docker.pptx
+++ b/docker.pptx
@@ -14,10 +14,8 @@
     <p:sldId id="258" r:id="rId8"/>
     <p:sldId id="259" r:id="rId9"/>
     <p:sldId id="273" r:id="rId10"/>
-    <p:sldId id="271" r:id="rId11"/>
-    <p:sldId id="272" r:id="rId12"/>
-    <p:sldId id="268" r:id="rId13"/>
-    <p:sldId id="261" r:id="rId14"/>
+    <p:sldId id="272" r:id="rId11"/>
+    <p:sldId id="261" r:id="rId12"/>
   </p:sldIdLst>
   <p:sldSz cx="12192000" cy="6858000"/>
   <p:notesSz cx="6858000" cy="9144000"/>
@@ -13201,7 +13199,7 @@
           <p:cNvPr id="2" name="Title 1">
             <a:extLst>
               <a:ext uri="{FF2B5EF4-FFF2-40B4-BE49-F238E27FC236}">
-                <a16:creationId xmlns:a16="http://schemas.microsoft.com/office/drawing/2014/main" xmlns="" id="{21636317-EC45-C244-A3D9-EA8C110D2BF3}"/>
+                <a16:creationId xmlns="" xmlns:a16="http://schemas.microsoft.com/office/drawing/2014/main" id="{21636317-EC45-C244-A3D9-EA8C110D2BF3}"/>
               </a:ext>
             </a:extLst>
           </p:cNvPr>
@@ -13230,7 +13228,7 @@
           <p:cNvPr id="3" name="Subtitle 2">
             <a:extLst>
               <a:ext uri="{FF2B5EF4-FFF2-40B4-BE49-F238E27FC236}">
-                <a16:creationId xmlns:a16="http://schemas.microsoft.com/office/drawing/2014/main" xmlns="" id="{1ACCAD81-8D75-CD4F-A3A2-1EE0DA200391}"/>
+                <a16:creationId xmlns="" xmlns:a16="http://schemas.microsoft.com/office/drawing/2014/main" id="{1ACCAD81-8D75-CD4F-A3A2-1EE0DA200391}"/>
               </a:ext>
             </a:extLst>
           </p:cNvPr>
@@ -13304,14 +13302,38 @@
           <a:p>
             <a:pPr algn="just"/>
             <a:r>
-              <a:rPr lang="en-US" dirty="0" err="1" smtClean="0"/>
+              <a:rPr lang="en-US" dirty="0" err="1">
+                <a:latin typeface="Open Sans"/>
+              </a:rPr>
               <a:t>Docker</a:t>
             </a:r>
             <a:r>
-              <a:rPr lang="en-US" dirty="0" smtClean="0"/>
-              <a:t> Hub</a:t>
-            </a:r>
-            <a:endParaRPr lang="en-US" dirty="0"/>
+              <a:rPr lang="en-US" dirty="0">
+                <a:latin typeface="Open Sans"/>
+              </a:rPr>
+              <a:t> </a:t>
+            </a:r>
+            <a:r>
+              <a:rPr lang="en-US" dirty="0" smtClean="0">
+                <a:latin typeface="Open Sans"/>
+              </a:rPr>
+              <a:t>Architecture and</a:t>
+            </a:r>
+            <a:r>
+              <a:rPr lang="en-IN" dirty="0" smtClean="0">
+                <a:latin typeface="Open Sans"/>
+              </a:rPr>
+              <a:t> </a:t>
+            </a:r>
+            <a:r>
+              <a:rPr lang="en-IN" dirty="0">
+                <a:latin typeface="Open Sans"/>
+              </a:rPr>
+              <a:t>Registry</a:t>
+            </a:r>
+            <a:endParaRPr lang="en-US" dirty="0">
+              <a:latin typeface="Open Sans"/>
+            </a:endParaRPr>
           </a:p>
         </p:txBody>
       </p:sp>
@@ -13327,252 +13349,336 @@
         </p:nvSpPr>
         <p:spPr>
           <a:xfrm>
-            <a:off x="533400" y="2603500"/>
-            <a:ext cx="9447213" cy="3416300"/>
+            <a:off x="457200" y="2133600"/>
+            <a:ext cx="11353800" cy="4572000"/>
           </a:xfrm>
         </p:spPr>
         <p:txBody>
-          <a:bodyPr/>
+          <a:bodyPr>
+            <a:normAutofit/>
+          </a:bodyPr>
           <a:lstStyle/>
           <a:p>
             <a:pPr algn="just"/>
             <a:r>
+              <a:rPr lang="en-US" dirty="0" err="1" smtClean="0">
+                <a:latin typeface="Open Sans"/>
+              </a:rPr>
+              <a:t>Docker</a:t>
+            </a:r>
+            <a:r>
+              <a:rPr lang="en-US" dirty="0" smtClean="0">
+                <a:latin typeface="Open Sans"/>
+              </a:rPr>
+              <a:t> have client server architecture having three major components</a:t>
+            </a:r>
+          </a:p>
+          <a:p>
+            <a:pPr lvl="1" algn="just"/>
+            <a:r>
+              <a:rPr lang="en-US" dirty="0" smtClean="0">
+                <a:latin typeface="Open Sans"/>
+              </a:rPr>
+              <a:t>Client - </a:t>
+            </a:r>
+            <a:r>
+              <a:rPr lang="en-US" dirty="0" err="1" smtClean="0">
+                <a:latin typeface="Open Sans"/>
+              </a:rPr>
+              <a:t>Docker</a:t>
+            </a:r>
+            <a:r>
+              <a:rPr lang="en-US" dirty="0" smtClean="0">
+                <a:latin typeface="Open Sans"/>
+              </a:rPr>
+              <a:t> </a:t>
+            </a:r>
+            <a:r>
+              <a:rPr lang="en-US" dirty="0" smtClean="0">
+                <a:latin typeface="Open Sans"/>
+              </a:rPr>
+              <a:t>build, </a:t>
+            </a:r>
+            <a:r>
+              <a:rPr lang="en-US" dirty="0" err="1" smtClean="0">
+                <a:latin typeface="Open Sans"/>
+              </a:rPr>
+              <a:t>Docker</a:t>
+            </a:r>
+            <a:r>
+              <a:rPr lang="en-US" dirty="0" smtClean="0">
+                <a:latin typeface="Open Sans"/>
+              </a:rPr>
+              <a:t> pull, </a:t>
+            </a:r>
+            <a:r>
+              <a:rPr lang="en-US" dirty="0" err="1" smtClean="0">
+                <a:latin typeface="Open Sans"/>
+              </a:rPr>
+              <a:t>Docker</a:t>
+            </a:r>
+            <a:r>
+              <a:rPr lang="en-US" dirty="0" smtClean="0">
+                <a:latin typeface="Open Sans"/>
+              </a:rPr>
+              <a:t> run etc</a:t>
+            </a:r>
+            <a:r>
+              <a:rPr lang="en-US" dirty="0">
+                <a:latin typeface="Open Sans"/>
+              </a:rPr>
+              <a:t>.</a:t>
+            </a:r>
+            <a:endParaRPr lang="en-US" dirty="0" smtClean="0">
+              <a:latin typeface="Open Sans"/>
+            </a:endParaRPr>
+          </a:p>
+          <a:p>
+            <a:pPr lvl="1" algn="just"/>
+            <a:r>
+              <a:rPr lang="en-US" sz="1600" dirty="0" err="1" smtClean="0">
+                <a:latin typeface="Open Sans"/>
+              </a:rPr>
+              <a:t>Docker</a:t>
+            </a:r>
+            <a:r>
+              <a:rPr lang="en-US" sz="1600" dirty="0" smtClean="0">
+                <a:latin typeface="Open Sans"/>
+              </a:rPr>
+              <a:t> </a:t>
+            </a:r>
+            <a:r>
+              <a:rPr lang="en-US" sz="1600" dirty="0" smtClean="0">
+                <a:latin typeface="Open Sans"/>
+              </a:rPr>
+              <a:t>Host - </a:t>
+            </a:r>
+            <a:r>
+              <a:rPr lang="en-US" sz="1400" dirty="0" err="1" smtClean="0">
+                <a:latin typeface="Open Sans"/>
+              </a:rPr>
+              <a:t>Docker</a:t>
+            </a:r>
+            <a:r>
+              <a:rPr lang="en-US" sz="1400" dirty="0" smtClean="0">
+                <a:latin typeface="Open Sans"/>
+              </a:rPr>
+              <a:t> </a:t>
+            </a:r>
+            <a:r>
+              <a:rPr lang="en-US" sz="1400" dirty="0" smtClean="0">
+                <a:latin typeface="Open Sans"/>
+              </a:rPr>
+              <a:t>daemon</a:t>
+            </a:r>
+          </a:p>
+          <a:p>
+            <a:pPr lvl="1" algn="just"/>
+            <a:r>
+              <a:rPr lang="en-US" dirty="0" err="1" smtClean="0">
+                <a:latin typeface="Open Sans"/>
+              </a:rPr>
+              <a:t>Regitry</a:t>
+            </a:r>
+            <a:r>
+              <a:rPr lang="en-US" dirty="0" smtClean="0">
+                <a:latin typeface="Open Sans"/>
+              </a:rPr>
+              <a:t> - </a:t>
+            </a:r>
+            <a:r>
+              <a:rPr lang="en-US" sz="1400" dirty="0" smtClean="0">
+                <a:latin typeface="Open Sans"/>
+              </a:rPr>
+              <a:t>Like </a:t>
+            </a:r>
+            <a:r>
+              <a:rPr lang="en-US" sz="1400" dirty="0" err="1" smtClean="0">
+                <a:latin typeface="Open Sans"/>
+              </a:rPr>
+              <a:t>nginx</a:t>
+            </a:r>
+            <a:r>
+              <a:rPr lang="en-US" dirty="0" smtClean="0">
+                <a:latin typeface="Open Sans"/>
+              </a:rPr>
+              <a:t>, </a:t>
+            </a:r>
+            <a:r>
+              <a:rPr lang="en-US" dirty="0" err="1" smtClean="0">
+                <a:latin typeface="Open Sans"/>
+              </a:rPr>
+              <a:t>ubuntu</a:t>
+            </a:r>
+            <a:r>
+              <a:rPr lang="en-US" sz="1400" dirty="0" smtClean="0">
+                <a:latin typeface="Open Sans"/>
+              </a:rPr>
+              <a:t> </a:t>
+            </a:r>
+            <a:r>
+              <a:rPr lang="en-US" sz="1400" dirty="0" err="1" smtClean="0">
+                <a:latin typeface="Open Sans"/>
+              </a:rPr>
+              <a:t>etc</a:t>
+            </a:r>
+            <a:endParaRPr lang="en-US" sz="1400" dirty="0" smtClean="0">
+              <a:latin typeface="Open Sans"/>
+            </a:endParaRPr>
+          </a:p>
+          <a:p>
+            <a:pPr algn="just"/>
+            <a:r>
+              <a:rPr lang="en-US" dirty="0">
+                <a:latin typeface="Open Sans"/>
+              </a:rPr>
+              <a:t>The </a:t>
+            </a:r>
+            <a:r>
               <a:rPr lang="en-US" dirty="0" err="1">
-                <a:solidFill>
-                  <a:srgbClr val="4A4A4A"/>
-                </a:solidFill>
                 <a:latin typeface="Open Sans"/>
               </a:rPr>
               <a:t>Docker</a:t>
             </a:r>
             <a:r>
               <a:rPr lang="en-US" dirty="0">
-                <a:solidFill>
-                  <a:srgbClr val="4A4A4A"/>
-                </a:solidFill>
-                <a:latin typeface="Open Sans"/>
-              </a:rPr>
-              <a:t> images create </a:t>
+                <a:latin typeface="Open Sans"/>
+              </a:rPr>
+              <a:t> Registry is the stateless, highly scalable server side application that stores and let </a:t>
+            </a:r>
+            <a:r>
+              <a:rPr lang="en-US" dirty="0" smtClean="0">
+                <a:latin typeface="Open Sans"/>
+              </a:rPr>
+              <a:t>distribute </a:t>
+            </a:r>
+            <a:r>
+              <a:rPr lang="en-US" dirty="0" err="1" smtClean="0">
+                <a:latin typeface="Open Sans"/>
+              </a:rPr>
+              <a:t>docker</a:t>
+            </a:r>
+            <a:r>
+              <a:rPr lang="en-US" dirty="0" smtClean="0">
+                <a:latin typeface="Open Sans"/>
+              </a:rPr>
+              <a:t> </a:t>
+            </a:r>
+            <a:r>
+              <a:rPr lang="en-US" dirty="0">
+                <a:latin typeface="Open Sans"/>
+              </a:rPr>
+              <a:t>images. It allows:</a:t>
+            </a:r>
+          </a:p>
+          <a:p>
+            <a:pPr lvl="1" algn="just"/>
+            <a:r>
+              <a:rPr lang="en-US" dirty="0">
+                <a:latin typeface="Open Sans"/>
+              </a:rPr>
+              <a:t>Tightly control where your images are stored.</a:t>
+            </a:r>
+          </a:p>
+          <a:p>
+            <a:pPr lvl="1" algn="just"/>
+            <a:r>
+              <a:rPr lang="en-US" dirty="0">
+                <a:latin typeface="Open Sans"/>
+              </a:rPr>
+              <a:t>Fully own your image distribution pipeline</a:t>
+            </a:r>
+          </a:p>
+          <a:p>
+            <a:pPr lvl="1" algn="just"/>
+            <a:r>
+              <a:rPr lang="en-US" dirty="0">
+                <a:latin typeface="Open Sans"/>
+              </a:rPr>
+              <a:t>Integrate image storage and distribution tightly into your in-house development workflow.</a:t>
+            </a:r>
+          </a:p>
+          <a:p>
+            <a:pPr lvl="1" algn="just"/>
+            <a:r>
+              <a:rPr lang="en-US" dirty="0">
+                <a:latin typeface="Open Sans"/>
+              </a:rPr>
+              <a:t>Commands:</a:t>
+            </a:r>
+          </a:p>
+          <a:p>
+            <a:pPr marL="457200" lvl="1" indent="0" algn="just">
+              <a:buNone/>
+            </a:pPr>
+            <a:r>
+              <a:rPr lang="en-US" dirty="0">
+                <a:latin typeface="Open Sans"/>
+              </a:rPr>
+              <a:t>	To start registry: </a:t>
             </a:r>
             <a:r>
               <a:rPr lang="en-US" dirty="0" err="1">
-                <a:solidFill>
-                  <a:srgbClr val="4A4A4A"/>
-                </a:solidFill>
                 <a:latin typeface="Open Sans"/>
               </a:rPr>
               <a:t>docker</a:t>
             </a:r>
             <a:r>
               <a:rPr lang="en-US" dirty="0">
-                <a:solidFill>
-                  <a:srgbClr val="4A4A4A"/>
-                </a:solidFill>
-                <a:latin typeface="Open Sans"/>
-              </a:rPr>
-              <a:t> containers. There has to be a registry where these </a:t>
+                <a:latin typeface="Open Sans"/>
+              </a:rPr>
+              <a:t> run –d –p 5000:5000 –name registry registry:2</a:t>
+            </a:r>
+          </a:p>
+          <a:p>
+            <a:pPr marL="457200" lvl="1" indent="0" algn="just">
+              <a:buNone/>
+            </a:pPr>
+            <a:r>
+              <a:rPr lang="en-US" dirty="0">
+                <a:latin typeface="Open Sans"/>
+              </a:rPr>
+              <a:t>	To stop Registry: </a:t>
             </a:r>
             <a:r>
               <a:rPr lang="en-US" dirty="0" err="1">
-                <a:solidFill>
-                  <a:srgbClr val="4A4A4A"/>
-                </a:solidFill>
                 <a:latin typeface="Open Sans"/>
               </a:rPr>
               <a:t>docker</a:t>
             </a:r>
             <a:r>
               <a:rPr lang="en-US" dirty="0">
-                <a:solidFill>
-                  <a:srgbClr val="4A4A4A"/>
-                </a:solidFill>
-                <a:latin typeface="Open Sans"/>
-              </a:rPr>
-              <a:t> images live. This registry is </a:t>
+                <a:latin typeface="Open Sans"/>
+              </a:rPr>
+              <a:t> container stop registry &amp;&amp;  </a:t>
             </a:r>
             <a:r>
               <a:rPr lang="en-US" dirty="0" err="1">
-                <a:solidFill>
-                  <a:srgbClr val="4A4A4A"/>
-                </a:solidFill>
-                <a:latin typeface="Open Sans"/>
-              </a:rPr>
-              <a:t>Docker</a:t>
+                <a:latin typeface="Open Sans"/>
+              </a:rPr>
+              <a:t>docker</a:t>
             </a:r>
             <a:r>
               <a:rPr lang="en-US" dirty="0">
-                <a:solidFill>
-                  <a:srgbClr val="4A4A4A"/>
-                </a:solidFill>
-                <a:latin typeface="Open Sans"/>
-              </a:rPr>
-              <a:t> Hub. Users can pick up images from </a:t>
+                <a:latin typeface="Open Sans"/>
+              </a:rPr>
+              <a:t> container </a:t>
             </a:r>
             <a:r>
               <a:rPr lang="en-US" dirty="0" err="1">
-                <a:solidFill>
-                  <a:srgbClr val="4A4A4A"/>
-                </a:solidFill>
-                <a:latin typeface="Open Sans"/>
-              </a:rPr>
-              <a:t>Docker</a:t>
+                <a:latin typeface="Open Sans"/>
+              </a:rPr>
+              <a:t>rm</a:t>
             </a:r>
             <a:r>
               <a:rPr lang="en-US" dirty="0">
-                <a:solidFill>
-                  <a:srgbClr val="4A4A4A"/>
-                </a:solidFill>
-                <a:latin typeface="Open Sans"/>
-              </a:rPr>
-              <a:t> Hub and use them to create customized images and containers. Currently, </a:t>
-            </a:r>
-            <a:r>
-              <a:rPr lang="en-US" dirty="0" smtClean="0">
-                <a:solidFill>
-                  <a:srgbClr val="4A4A4A"/>
-                </a:solidFill>
-                <a:latin typeface="Open Sans"/>
-              </a:rPr>
-              <a:t>the </a:t>
-            </a:r>
-            <a:r>
-              <a:rPr lang="en-US" dirty="0" err="1" smtClean="0">
-                <a:solidFill>
-                  <a:srgbClr val="4A4A4A"/>
-                </a:solidFill>
-                <a:latin typeface="Open Sans"/>
-              </a:rPr>
-              <a:t>Docker</a:t>
-            </a:r>
-            <a:r>
-              <a:rPr lang="en-US" dirty="0" smtClean="0">
-                <a:solidFill>
-                  <a:srgbClr val="4A4A4A"/>
-                </a:solidFill>
-                <a:latin typeface="Open Sans"/>
-              </a:rPr>
-              <a:t> hub(hub.docker.com)</a:t>
-            </a:r>
-            <a:r>
-              <a:rPr lang="en-US" dirty="0">
-                <a:solidFill>
-                  <a:srgbClr val="4A4A4A"/>
-                </a:solidFill>
-                <a:latin typeface="Open Sans"/>
-              </a:rPr>
-              <a:t> is the world’s largest public repository of image containers</a:t>
-            </a:r>
-            <a:r>
-              <a:rPr lang="en-US" dirty="0" smtClean="0">
-                <a:solidFill>
-                  <a:srgbClr val="4A4A4A"/>
-                </a:solidFill>
-                <a:latin typeface="Open Sans"/>
-              </a:rPr>
-              <a:t>.</a:t>
+                <a:latin typeface="Open Sans"/>
+              </a:rPr>
+              <a:t> –v registry </a:t>
             </a:r>
           </a:p>
           <a:p>
             <a:pPr algn="just"/>
-            <a:r>
-              <a:rPr lang="en-US" b="1" dirty="0" err="1">
-                <a:solidFill>
-                  <a:srgbClr val="4A4A4A"/>
-                </a:solidFill>
-                <a:latin typeface="Open Sans"/>
-              </a:rPr>
-              <a:t>Docker</a:t>
-            </a:r>
-            <a:r>
-              <a:rPr lang="en-US" b="1" dirty="0">
-                <a:solidFill>
-                  <a:srgbClr val="4A4A4A"/>
-                </a:solidFill>
-                <a:latin typeface="Open Sans"/>
-              </a:rPr>
-              <a:t> machine </a:t>
-            </a:r>
-            <a:r>
-              <a:rPr lang="en-US" dirty="0">
-                <a:solidFill>
-                  <a:srgbClr val="4A4A4A"/>
-                </a:solidFill>
-                <a:latin typeface="Open Sans"/>
-              </a:rPr>
-              <a:t>is a tool that lets you install </a:t>
-            </a:r>
-            <a:r>
-              <a:rPr lang="en-US" dirty="0" err="1">
-                <a:solidFill>
-                  <a:srgbClr val="4A4A4A"/>
-                </a:solidFill>
-                <a:latin typeface="Open Sans"/>
-              </a:rPr>
-              <a:t>Docker</a:t>
-            </a:r>
-            <a:r>
-              <a:rPr lang="en-US" dirty="0">
-                <a:solidFill>
-                  <a:srgbClr val="4A4A4A"/>
-                </a:solidFill>
-                <a:latin typeface="Open Sans"/>
-              </a:rPr>
-              <a:t> Engine on virtual hosts. These hosts can now be managed using the </a:t>
-            </a:r>
-            <a:r>
-              <a:rPr lang="en-US" dirty="0" err="1">
-                <a:solidFill>
-                  <a:srgbClr val="4A4A4A"/>
-                </a:solidFill>
-                <a:latin typeface="Open Sans"/>
-              </a:rPr>
-              <a:t>docker</a:t>
-            </a:r>
-            <a:r>
-              <a:rPr lang="en-US" dirty="0">
-                <a:solidFill>
-                  <a:srgbClr val="4A4A4A"/>
-                </a:solidFill>
-                <a:latin typeface="Open Sans"/>
-              </a:rPr>
-              <a:t>-machine commands. </a:t>
-            </a:r>
-            <a:r>
-              <a:rPr lang="en-US" dirty="0" err="1">
-                <a:solidFill>
-                  <a:srgbClr val="4A4A4A"/>
-                </a:solidFill>
-                <a:latin typeface="Open Sans"/>
-              </a:rPr>
-              <a:t>Docker</a:t>
-            </a:r>
-            <a:r>
-              <a:rPr lang="en-US" dirty="0">
-                <a:solidFill>
-                  <a:srgbClr val="4A4A4A"/>
-                </a:solidFill>
-                <a:latin typeface="Open Sans"/>
-              </a:rPr>
-              <a:t> machine also lets you provision </a:t>
-            </a:r>
-            <a:r>
-              <a:rPr lang="en-US" dirty="0" err="1">
-                <a:solidFill>
-                  <a:srgbClr val="4A4A4A"/>
-                </a:solidFill>
-                <a:latin typeface="Open Sans"/>
-              </a:rPr>
-              <a:t>Docker</a:t>
-            </a:r>
-            <a:r>
-              <a:rPr lang="en-US" dirty="0">
-                <a:solidFill>
-                  <a:srgbClr val="4A4A4A"/>
-                </a:solidFill>
-                <a:latin typeface="Open Sans"/>
-              </a:rPr>
-              <a:t> Swarm Clusters.</a:t>
-            </a:r>
             <a:endParaRPr lang="en-US" dirty="0"/>
           </a:p>
         </p:txBody>
@@ -13580,7 +13686,7 @@
     </p:spTree>
     <p:extLst>
       <p:ext uri="{BB962C8B-B14F-4D97-AF65-F5344CB8AC3E}">
-        <p14:creationId xmlns:p14="http://schemas.microsoft.com/office/powerpoint/2010/main" val="1417969648"/>
+        <p14:creationId xmlns:p14="http://schemas.microsoft.com/office/powerpoint/2010/main" val="1023722639"/>
       </p:ext>
     </p:extLst>
   </p:cSld>
@@ -13616,262 +13722,10 @@
       </p:grpSpPr>
       <p:sp>
         <p:nvSpPr>
-          <p:cNvPr id="2" name="Title 1"/>
-          <p:cNvSpPr>
-            <a:spLocks noGrp="1"/>
-          </p:cNvSpPr>
-          <p:nvPr>
-            <p:ph type="title"/>
-          </p:nvPr>
-        </p:nvSpPr>
-        <p:spPr/>
-        <p:txBody>
-          <a:bodyPr/>
-          <a:lstStyle/>
-          <a:p>
-            <a:pPr algn="just"/>
-            <a:r>
-              <a:rPr lang="en-US" dirty="0" err="1">
-                <a:latin typeface="Open Sans"/>
-              </a:rPr>
-              <a:t>Docker</a:t>
-            </a:r>
-            <a:r>
-              <a:rPr lang="en-US" dirty="0">
-                <a:latin typeface="Open Sans"/>
-              </a:rPr>
-              <a:t> Architecture</a:t>
-            </a:r>
-            <a:endParaRPr lang="en-US" dirty="0"/>
-          </a:p>
-        </p:txBody>
-      </p:sp>
-      <p:sp>
-        <p:nvSpPr>
-          <p:cNvPr id="3" name="Content Placeholder 2"/>
-          <p:cNvSpPr>
-            <a:spLocks noGrp="1"/>
-          </p:cNvSpPr>
-          <p:nvPr>
-            <p:ph idx="1"/>
-          </p:nvPr>
-        </p:nvSpPr>
-        <p:spPr>
-          <a:xfrm>
-            <a:off x="457200" y="2603500"/>
-            <a:ext cx="11353800" cy="3416300"/>
-          </a:xfrm>
-        </p:spPr>
-        <p:txBody>
-          <a:bodyPr/>
-          <a:lstStyle/>
-          <a:p>
-            <a:pPr marL="0" indent="0" algn="just">
-              <a:buNone/>
-            </a:pPr>
-            <a:r>
-              <a:rPr lang="en-US" dirty="0" err="1" smtClean="0">
-                <a:latin typeface="Open Sans"/>
-              </a:rPr>
-              <a:t>Docker</a:t>
-            </a:r>
-            <a:r>
-              <a:rPr lang="en-US" dirty="0" smtClean="0">
-                <a:latin typeface="Open Sans"/>
-              </a:rPr>
-              <a:t> have client server architecture having three major components</a:t>
-            </a:r>
-          </a:p>
-          <a:p>
-            <a:pPr algn="just"/>
-            <a:r>
-              <a:rPr lang="en-US" dirty="0" smtClean="0">
-                <a:latin typeface="Open Sans"/>
-              </a:rPr>
-              <a:t>Client</a:t>
-            </a:r>
-          </a:p>
-          <a:p>
-            <a:pPr lvl="1" algn="just"/>
-            <a:r>
-              <a:rPr lang="en-US" dirty="0" err="1" smtClean="0">
-                <a:latin typeface="Open Sans"/>
-              </a:rPr>
-              <a:t>Docker</a:t>
-            </a:r>
-            <a:r>
-              <a:rPr lang="en-US" dirty="0" smtClean="0">
-                <a:latin typeface="Open Sans"/>
-              </a:rPr>
-              <a:t> build, </a:t>
-            </a:r>
-            <a:r>
-              <a:rPr lang="en-US" dirty="0" err="1" smtClean="0">
-                <a:latin typeface="Open Sans"/>
-              </a:rPr>
-              <a:t>Docker</a:t>
-            </a:r>
-            <a:r>
-              <a:rPr lang="en-US" dirty="0" smtClean="0">
-                <a:latin typeface="Open Sans"/>
-              </a:rPr>
-              <a:t> pull, </a:t>
-            </a:r>
-            <a:r>
-              <a:rPr lang="en-US" dirty="0" err="1" smtClean="0">
-                <a:latin typeface="Open Sans"/>
-              </a:rPr>
-              <a:t>Docker</a:t>
-            </a:r>
-            <a:r>
-              <a:rPr lang="en-US" dirty="0" smtClean="0">
-                <a:latin typeface="Open Sans"/>
-              </a:rPr>
-              <a:t> run etc</a:t>
-            </a:r>
-            <a:r>
-              <a:rPr lang="en-US" dirty="0">
-                <a:latin typeface="Open Sans"/>
-              </a:rPr>
-              <a:t>.</a:t>
-            </a:r>
-            <a:endParaRPr lang="en-US" dirty="0" smtClean="0">
-              <a:latin typeface="Open Sans"/>
-            </a:endParaRPr>
-          </a:p>
-          <a:p>
-            <a:pPr algn="just"/>
-            <a:r>
-              <a:rPr lang="en-US" sz="1800" dirty="0" err="1" smtClean="0">
-                <a:latin typeface="Open Sans"/>
-              </a:rPr>
-              <a:t>Docker</a:t>
-            </a:r>
-            <a:r>
-              <a:rPr lang="en-US" sz="1800" dirty="0" smtClean="0">
-                <a:latin typeface="Open Sans"/>
-              </a:rPr>
-              <a:t> Host</a:t>
-            </a:r>
-          </a:p>
-          <a:p>
-            <a:pPr lvl="1" algn="just"/>
-            <a:r>
-              <a:rPr lang="en-US" sz="1600" dirty="0" err="1" smtClean="0">
-                <a:latin typeface="Open Sans"/>
-              </a:rPr>
-              <a:t>Docker</a:t>
-            </a:r>
-            <a:r>
-              <a:rPr lang="en-US" sz="1600" dirty="0" smtClean="0">
-                <a:latin typeface="Open Sans"/>
-              </a:rPr>
-              <a:t> daemon</a:t>
-            </a:r>
-          </a:p>
-          <a:p>
-            <a:pPr algn="just"/>
-            <a:r>
-              <a:rPr lang="en-US" dirty="0" err="1" smtClean="0">
-                <a:latin typeface="Open Sans"/>
-              </a:rPr>
-              <a:t>Regitry</a:t>
-            </a:r>
-            <a:endParaRPr lang="en-US" dirty="0" smtClean="0">
-              <a:latin typeface="Open Sans"/>
-            </a:endParaRPr>
-          </a:p>
-          <a:p>
-            <a:pPr lvl="1" algn="just"/>
-            <a:r>
-              <a:rPr lang="en-US" sz="1600" dirty="0" smtClean="0">
-                <a:latin typeface="Open Sans"/>
-              </a:rPr>
-              <a:t>Like </a:t>
-            </a:r>
-            <a:r>
-              <a:rPr lang="en-US" sz="1600" dirty="0" err="1" smtClean="0">
-                <a:latin typeface="Open Sans"/>
-              </a:rPr>
-              <a:t>nginx</a:t>
-            </a:r>
-            <a:r>
-              <a:rPr lang="en-US" dirty="0" smtClean="0">
-                <a:latin typeface="Open Sans"/>
-              </a:rPr>
-              <a:t>, </a:t>
-            </a:r>
-            <a:r>
-              <a:rPr lang="en-US" dirty="0" err="1" smtClean="0">
-                <a:latin typeface="Open Sans"/>
-              </a:rPr>
-              <a:t>ubuntu</a:t>
-            </a:r>
-            <a:r>
-              <a:rPr lang="en-US" sz="1600" dirty="0" smtClean="0">
-                <a:latin typeface="Open Sans"/>
-              </a:rPr>
-              <a:t> </a:t>
-            </a:r>
-            <a:r>
-              <a:rPr lang="en-US" sz="1600" dirty="0" err="1" smtClean="0">
-                <a:latin typeface="Open Sans"/>
-              </a:rPr>
-              <a:t>etc</a:t>
-            </a:r>
-            <a:endParaRPr lang="en-US" sz="1600" dirty="0" smtClean="0">
-              <a:latin typeface="Open Sans"/>
-            </a:endParaRPr>
-          </a:p>
-          <a:p>
-            <a:pPr algn="just"/>
-            <a:endParaRPr lang="en-US" dirty="0"/>
-          </a:p>
-        </p:txBody>
-      </p:sp>
-    </p:spTree>
-    <p:extLst>
-      <p:ext uri="{BB962C8B-B14F-4D97-AF65-F5344CB8AC3E}">
-        <p14:creationId xmlns:p14="http://schemas.microsoft.com/office/powerpoint/2010/main" val="1023722639"/>
-      </p:ext>
-    </p:extLst>
-  </p:cSld>
-  <p:clrMapOvr>
-    <a:masterClrMapping/>
-  </p:clrMapOvr>
-  <p:timing>
-    <p:tnLst>
-      <p:par>
-        <p:cTn id="1" dur="indefinite" restart="never" nodeType="tmRoot"/>
-      </p:par>
-    </p:tnLst>
-  </p:timing>
-</p:sld>
-</file>
-
-<file path=ppt/slides/slide12.xml><?xml version="1.0" encoding="utf-8"?>
-<p:sld xmlns:a="http://schemas.openxmlformats.org/drawingml/2006/main" xmlns:r="http://schemas.openxmlformats.org/officeDocument/2006/relationships" xmlns:p="http://schemas.openxmlformats.org/presentationml/2006/main">
-  <p:cSld>
-    <p:spTree>
-      <p:nvGrpSpPr>
-        <p:cNvPr id="1" name=""/>
-        <p:cNvGrpSpPr/>
-        <p:nvPr/>
-      </p:nvGrpSpPr>
-      <p:grpSpPr>
-        <a:xfrm>
-          <a:off x="0" y="0"/>
-          <a:ext cx="0" cy="0"/>
-          <a:chOff x="0" y="0"/>
-          <a:chExt cx="0" cy="0"/>
-        </a:xfrm>
-      </p:grpSpPr>
-      <p:sp>
-        <p:nvSpPr>
           <p:cNvPr id="2" name="Title 1">
             <a:extLst>
               <a:ext uri="{FF2B5EF4-FFF2-40B4-BE49-F238E27FC236}">
-                <a16:creationId xmlns:a16="http://schemas.microsoft.com/office/drawing/2014/main" xmlns="" id="{022EF37B-0053-5445-92AD-0BFB56B8098A}"/>
+                <a16:creationId xmlns="" xmlns:a16="http://schemas.microsoft.com/office/drawing/2014/main" id="{E6BED199-5988-3649-A777-705A2852C012}"/>
               </a:ext>
             </a:extLst>
           </p:cNvPr>
@@ -13887,14 +13741,13 @@
           <a:bodyPr/>
           <a:lstStyle/>
           <a:p>
-            <a:pPr algn="just"/>
-            <a:r>
-              <a:rPr lang="en-IN" dirty="0" err="1"/>
+            <a:r>
+              <a:rPr lang="en-IN" dirty="0" err="1" smtClean="0"/>
               <a:t>Docker</a:t>
             </a:r>
             <a:r>
-              <a:rPr lang="en-IN" dirty="0"/>
-              <a:t> Registry</a:t>
+              <a:rPr lang="en-IN" dirty="0" smtClean="0"/>
+              <a:t> Commands</a:t>
             </a:r>
             <a:endParaRPr lang="en-US" dirty="0"/>
           </a:p>
@@ -13905,258 +13758,7 @@
           <p:cNvPr id="3" name="Content Placeholder 2">
             <a:extLst>
               <a:ext uri="{FF2B5EF4-FFF2-40B4-BE49-F238E27FC236}">
-                <a16:creationId xmlns:a16="http://schemas.microsoft.com/office/drawing/2014/main" xmlns="" id="{5D72B523-BBC6-CD48-9A35-296DF2B31BD1}"/>
-              </a:ext>
-            </a:extLst>
-          </p:cNvPr>
-          <p:cNvSpPr>
-            <a:spLocks noGrp="1"/>
-          </p:cNvSpPr>
-          <p:nvPr>
-            <p:ph idx="1"/>
-          </p:nvPr>
-        </p:nvSpPr>
-        <p:spPr>
-          <a:xfrm>
-            <a:off x="533400" y="2286000"/>
-            <a:ext cx="11277600" cy="4343400"/>
-          </a:xfrm>
-        </p:spPr>
-        <p:txBody>
-          <a:bodyPr/>
-          <a:lstStyle/>
-          <a:p>
-            <a:pPr algn="just"/>
-            <a:r>
-              <a:rPr lang="en-US" dirty="0" smtClean="0">
-                <a:latin typeface="Open Sans"/>
-              </a:rPr>
-              <a:t>The </a:t>
-            </a:r>
-            <a:r>
-              <a:rPr lang="en-US" dirty="0" err="1" smtClean="0">
-                <a:latin typeface="Open Sans"/>
-              </a:rPr>
-              <a:t>Docker</a:t>
-            </a:r>
-            <a:r>
-              <a:rPr lang="en-US" dirty="0" smtClean="0">
-                <a:latin typeface="Open Sans"/>
-              </a:rPr>
-              <a:t> Registry is the stateless, highly scalable server side application that stores and let </a:t>
-            </a:r>
-            <a:r>
-              <a:rPr lang="en-US" dirty="0" err="1" smtClean="0">
-                <a:latin typeface="Open Sans"/>
-              </a:rPr>
-              <a:t>distributedocker</a:t>
-            </a:r>
-            <a:r>
-              <a:rPr lang="en-US" dirty="0" smtClean="0">
-                <a:latin typeface="Open Sans"/>
-              </a:rPr>
-              <a:t> images. It allows:</a:t>
-            </a:r>
-          </a:p>
-          <a:p>
-            <a:pPr lvl="1" algn="just"/>
-            <a:r>
-              <a:rPr lang="en-US" dirty="0" smtClean="0">
-                <a:latin typeface="Open Sans"/>
-              </a:rPr>
-              <a:t>Tightly control where your images are stored.</a:t>
-            </a:r>
-          </a:p>
-          <a:p>
-            <a:pPr lvl="1" algn="just"/>
-            <a:r>
-              <a:rPr lang="en-US" dirty="0" smtClean="0">
-                <a:latin typeface="Open Sans"/>
-              </a:rPr>
-              <a:t>Fully own your image distribution pipeline</a:t>
-            </a:r>
-          </a:p>
-          <a:p>
-            <a:pPr lvl="1" algn="just"/>
-            <a:r>
-              <a:rPr lang="en-US" dirty="0" smtClean="0">
-                <a:latin typeface="Open Sans"/>
-              </a:rPr>
-              <a:t>Integrate image storage and distribution tightly into your in-house development workflow.</a:t>
-            </a:r>
-          </a:p>
-          <a:p>
-            <a:pPr lvl="1" algn="just"/>
-            <a:r>
-              <a:rPr lang="en-US" dirty="0" smtClean="0">
-                <a:latin typeface="Open Sans"/>
-              </a:rPr>
-              <a:t>Commands:</a:t>
-            </a:r>
-          </a:p>
-          <a:p>
-            <a:pPr marL="457200" lvl="1" indent="0" algn="just">
-              <a:buNone/>
-            </a:pPr>
-            <a:r>
-              <a:rPr lang="en-US" dirty="0">
-                <a:latin typeface="Open Sans"/>
-              </a:rPr>
-              <a:t>	</a:t>
-            </a:r>
-            <a:r>
-              <a:rPr lang="en-US" dirty="0" smtClean="0">
-                <a:latin typeface="Open Sans"/>
-              </a:rPr>
-              <a:t>To start registry: </a:t>
-            </a:r>
-            <a:r>
-              <a:rPr lang="en-US" dirty="0" err="1" smtClean="0">
-                <a:latin typeface="Open Sans"/>
-              </a:rPr>
-              <a:t>docker</a:t>
-            </a:r>
-            <a:r>
-              <a:rPr lang="en-US" dirty="0" smtClean="0">
-                <a:latin typeface="Open Sans"/>
-              </a:rPr>
-              <a:t> run –d –p 5000:5000 –name registry registry:2</a:t>
-            </a:r>
-          </a:p>
-          <a:p>
-            <a:pPr marL="457200" lvl="1" indent="0" algn="just">
-              <a:buNone/>
-            </a:pPr>
-            <a:r>
-              <a:rPr lang="en-US" dirty="0">
-                <a:latin typeface="Open Sans"/>
-              </a:rPr>
-              <a:t>	</a:t>
-            </a:r>
-            <a:r>
-              <a:rPr lang="en-US" dirty="0" smtClean="0">
-                <a:latin typeface="Open Sans"/>
-              </a:rPr>
-              <a:t>To stop Registry: </a:t>
-            </a:r>
-            <a:r>
-              <a:rPr lang="en-US" dirty="0" err="1" smtClean="0">
-                <a:latin typeface="Open Sans"/>
-              </a:rPr>
-              <a:t>docker</a:t>
-            </a:r>
-            <a:r>
-              <a:rPr lang="en-US" dirty="0" smtClean="0">
-                <a:latin typeface="Open Sans"/>
-              </a:rPr>
-              <a:t> container stop registry &amp;&amp;  </a:t>
-            </a:r>
-            <a:r>
-              <a:rPr lang="en-US" dirty="0" err="1" smtClean="0">
-                <a:latin typeface="Open Sans"/>
-              </a:rPr>
-              <a:t>docker</a:t>
-            </a:r>
-            <a:r>
-              <a:rPr lang="en-US" dirty="0" smtClean="0">
-                <a:latin typeface="Open Sans"/>
-              </a:rPr>
-              <a:t> container </a:t>
-            </a:r>
-            <a:r>
-              <a:rPr lang="en-US" dirty="0" err="1" smtClean="0">
-                <a:latin typeface="Open Sans"/>
-              </a:rPr>
-              <a:t>rm</a:t>
-            </a:r>
-            <a:r>
-              <a:rPr lang="en-US" dirty="0" smtClean="0">
-                <a:latin typeface="Open Sans"/>
-              </a:rPr>
-              <a:t> –v registry </a:t>
-            </a:r>
-            <a:endParaRPr lang="en-US" dirty="0">
-              <a:latin typeface="Open Sans"/>
-            </a:endParaRPr>
-          </a:p>
-        </p:txBody>
-      </p:sp>
-    </p:spTree>
-    <p:extLst>
-      <p:ext uri="{BB962C8B-B14F-4D97-AF65-F5344CB8AC3E}">
-        <p14:creationId xmlns:p14="http://schemas.microsoft.com/office/powerpoint/2010/main" val="1699113012"/>
-      </p:ext>
-    </p:extLst>
-  </p:cSld>
-  <p:clrMapOvr>
-    <a:masterClrMapping/>
-  </p:clrMapOvr>
-  <p:timing>
-    <p:tnLst>
-      <p:par>
-        <p:cTn id="1" dur="indefinite" restart="never" nodeType="tmRoot"/>
-      </p:par>
-    </p:tnLst>
-  </p:timing>
-</p:sld>
-</file>
-
-<file path=ppt/slides/slide13.xml><?xml version="1.0" encoding="utf-8"?>
-<p:sld xmlns:a="http://schemas.openxmlformats.org/drawingml/2006/main" xmlns:r="http://schemas.openxmlformats.org/officeDocument/2006/relationships" xmlns:p="http://schemas.openxmlformats.org/presentationml/2006/main">
-  <p:cSld>
-    <p:spTree>
-      <p:nvGrpSpPr>
-        <p:cNvPr id="1" name=""/>
-        <p:cNvGrpSpPr/>
-        <p:nvPr/>
-      </p:nvGrpSpPr>
-      <p:grpSpPr>
-        <a:xfrm>
-          <a:off x="0" y="0"/>
-          <a:ext cx="0" cy="0"/>
-          <a:chOff x="0" y="0"/>
-          <a:chExt cx="0" cy="0"/>
-        </a:xfrm>
-      </p:grpSpPr>
-      <p:sp>
-        <p:nvSpPr>
-          <p:cNvPr id="2" name="Title 1">
-            <a:extLst>
-              <a:ext uri="{FF2B5EF4-FFF2-40B4-BE49-F238E27FC236}">
-                <a16:creationId xmlns:a16="http://schemas.microsoft.com/office/drawing/2014/main" xmlns="" id="{E6BED199-5988-3649-A777-705A2852C012}"/>
-              </a:ext>
-            </a:extLst>
-          </p:cNvPr>
-          <p:cNvSpPr>
-            <a:spLocks noGrp="1"/>
-          </p:cNvSpPr>
-          <p:nvPr>
-            <p:ph type="title"/>
-          </p:nvPr>
-        </p:nvSpPr>
-        <p:spPr/>
-        <p:txBody>
-          <a:bodyPr/>
-          <a:lstStyle/>
-          <a:p>
-            <a:r>
-              <a:rPr lang="en-IN" dirty="0" err="1" smtClean="0"/>
-              <a:t>Docker</a:t>
-            </a:r>
-            <a:r>
-              <a:rPr lang="en-IN" dirty="0" smtClean="0"/>
-              <a:t> Commands</a:t>
-            </a:r>
-            <a:endParaRPr lang="en-US" dirty="0"/>
-          </a:p>
-        </p:txBody>
-      </p:sp>
-      <p:sp>
-        <p:nvSpPr>
-          <p:cNvPr id="3" name="Content Placeholder 2">
-            <a:extLst>
-              <a:ext uri="{FF2B5EF4-FFF2-40B4-BE49-F238E27FC236}">
-                <a16:creationId xmlns:a16="http://schemas.microsoft.com/office/drawing/2014/main" xmlns="" id="{ECCCB671-0E58-9841-9F17-CC45A8AFCFC0}"/>
+                <a16:creationId xmlns="" xmlns:a16="http://schemas.microsoft.com/office/drawing/2014/main" id="{ECCCB671-0E58-9841-9F17-CC45A8AFCFC0}"/>
               </a:ext>
             </a:extLst>
           </p:cNvPr>
@@ -15404,7 +15006,7 @@
           <p:cNvPr id="2" name="Title 1">
             <a:extLst>
               <a:ext uri="{FF2B5EF4-FFF2-40B4-BE49-F238E27FC236}">
-                <a16:creationId xmlns:a16="http://schemas.microsoft.com/office/drawing/2014/main" xmlns="" id="{9BA1904D-3783-564B-8293-3ACF5C93F8BE}"/>
+                <a16:creationId xmlns="" xmlns:a16="http://schemas.microsoft.com/office/drawing/2014/main" id="{9BA1904D-3783-564B-8293-3ACF5C93F8BE}"/>
               </a:ext>
             </a:extLst>
           </p:cNvPr>
@@ -15434,7 +15036,7 @@
           <p:cNvPr id="3" name="Content Placeholder 2">
             <a:extLst>
               <a:ext uri="{FF2B5EF4-FFF2-40B4-BE49-F238E27FC236}">
-                <a16:creationId xmlns:a16="http://schemas.microsoft.com/office/drawing/2014/main" xmlns="" id="{71366C8A-5967-BF47-B1BA-B0D4AA74949F}"/>
+                <a16:creationId xmlns="" xmlns:a16="http://schemas.microsoft.com/office/drawing/2014/main" id="{71366C8A-5967-BF47-B1BA-B0D4AA74949F}"/>
               </a:ext>
             </a:extLst>
           </p:cNvPr>
@@ -15948,11 +15550,7 @@
             <a:pPr algn="just"/>
             <a:r>
               <a:rPr lang="en-US" dirty="0" smtClean="0"/>
-              <a:t>Popularity </a:t>
-            </a:r>
-            <a:r>
-              <a:rPr lang="en-US" dirty="0" smtClean="0"/>
-              <a:t>of </a:t>
+              <a:t>Popularity of </a:t>
             </a:r>
             <a:r>
               <a:rPr lang="en-US" dirty="0" err="1" smtClean="0"/>
@@ -16593,7 +16191,7 @@
           <p:cNvPr id="2" name="Title 1">
             <a:extLst>
               <a:ext uri="{FF2B5EF4-FFF2-40B4-BE49-F238E27FC236}">
-                <a16:creationId xmlns:a16="http://schemas.microsoft.com/office/drawing/2014/main" xmlns="" id="{56620923-99EF-B74A-9C1D-414CE50BBB09}"/>
+                <a16:creationId xmlns="" xmlns:a16="http://schemas.microsoft.com/office/drawing/2014/main" id="{56620923-99EF-B74A-9C1D-414CE50BBB09}"/>
               </a:ext>
             </a:extLst>
           </p:cNvPr>
@@ -16631,7 +16229,7 @@
           <p:cNvPr id="3" name="Content Placeholder 2">
             <a:extLst>
               <a:ext uri="{FF2B5EF4-FFF2-40B4-BE49-F238E27FC236}">
-                <a16:creationId xmlns:a16="http://schemas.microsoft.com/office/drawing/2014/main" xmlns="" id="{070B9698-93FF-0C47-A943-A0FF369D0681}"/>
+                <a16:creationId xmlns="" xmlns:a16="http://schemas.microsoft.com/office/drawing/2014/main" id="{070B9698-93FF-0C47-A943-A0FF369D0681}"/>
               </a:ext>
             </a:extLst>
           </p:cNvPr>
@@ -17027,7 +16625,7 @@
           <p:cNvPr id="2" name="Title 1">
             <a:extLst>
               <a:ext uri="{FF2B5EF4-FFF2-40B4-BE49-F238E27FC236}">
-                <a16:creationId xmlns:a16="http://schemas.microsoft.com/office/drawing/2014/main" xmlns="" id="{45A6B393-B7CD-FB4C-AD69-4CA7CD97F1B7}"/>
+                <a16:creationId xmlns="" xmlns:a16="http://schemas.microsoft.com/office/drawing/2014/main" id="{45A6B393-B7CD-FB4C-AD69-4CA7CD97F1B7}"/>
               </a:ext>
             </a:extLst>
           </p:cNvPr>
@@ -17061,7 +16659,7 @@
           <p:cNvPr id="3" name="Content Placeholder 2">
             <a:extLst>
               <a:ext uri="{FF2B5EF4-FFF2-40B4-BE49-F238E27FC236}">
-                <a16:creationId xmlns:a16="http://schemas.microsoft.com/office/drawing/2014/main" xmlns="" id="{0221C280-9F5B-F342-84F1-E34D26C4B1A7}"/>
+                <a16:creationId xmlns="" xmlns:a16="http://schemas.microsoft.com/office/drawing/2014/main" id="{0221C280-9F5B-F342-84F1-E34D26C4B1A7}"/>
               </a:ext>
             </a:extLst>
           </p:cNvPr>
@@ -17333,7 +16931,19 @@
             </a:r>
             <a:r>
               <a:rPr lang="en-US" dirty="0" smtClean="0"/>
-              <a:t> Container</a:t>
+              <a:t> </a:t>
+            </a:r>
+            <a:r>
+              <a:rPr lang="en-US" dirty="0" smtClean="0"/>
+              <a:t>Container and </a:t>
+            </a:r>
+            <a:r>
+              <a:rPr lang="en-US" dirty="0" err="1" smtClean="0"/>
+              <a:t>Docker</a:t>
+            </a:r>
+            <a:r>
+              <a:rPr lang="en-US" dirty="0" smtClean="0"/>
+              <a:t> Hub</a:t>
             </a:r>
             <a:endParaRPr lang="en-US" dirty="0"/>
           </a:p>
@@ -17351,8 +16961,8 @@
         </p:nvSpPr>
         <p:spPr>
           <a:xfrm>
-            <a:off x="533400" y="2286000"/>
-            <a:ext cx="10591800" cy="4343400"/>
+            <a:off x="533400" y="2133600"/>
+            <a:ext cx="11506200" cy="4495800"/>
           </a:xfrm>
         </p:spPr>
         <p:txBody>
@@ -17391,12 +17001,9 @@
             </a:r>
           </a:p>
           <a:p>
-            <a:pPr lvl="1" algn="just">
-              <a:buFont typeface="Arial"/>
-              <a:buChar char="•"/>
-            </a:pPr>
-            <a:r>
-              <a:rPr lang="en-US" sz="1800" dirty="0">
+            <a:pPr lvl="1" algn="just"/>
+            <a:r>
+              <a:rPr lang="en-US" dirty="0">
                 <a:solidFill>
                   <a:srgbClr val="4A4A4A"/>
                 </a:solidFill>
@@ -17406,25 +17013,61 @@
             </a:r>
           </a:p>
           <a:p>
-            <a:pPr lvl="1" algn="just">
-              <a:buFont typeface="Arial"/>
-              <a:buChar char="•"/>
-            </a:pPr>
-            <a:r>
-              <a:rPr lang="en-US" sz="1800" dirty="0">
+            <a:pPr lvl="1" algn="just"/>
+            <a:r>
+              <a:rPr lang="en-US" dirty="0">
                 <a:solidFill>
                   <a:srgbClr val="4A4A4A"/>
                 </a:solidFill>
                 <a:latin typeface="Open Sans"/>
               </a:rPr>
-              <a:t>Run the container</a:t>
-            </a:r>
-          </a:p>
-          <a:p>
-            <a:pPr lvl="2" algn="just">
-              <a:buFont typeface="Wingdings" pitchFamily="2" charset="2"/>
-              <a:buChar char="q"/>
-            </a:pPr>
+              <a:t>Run the </a:t>
+            </a:r>
+            <a:r>
+              <a:rPr lang="en-US" dirty="0" smtClean="0">
+                <a:solidFill>
+                  <a:srgbClr val="4A4A4A"/>
+                </a:solidFill>
+                <a:latin typeface="Open Sans"/>
+              </a:rPr>
+              <a:t>container - </a:t>
+            </a:r>
+            <a:r>
+              <a:rPr lang="en-US" sz="1400" dirty="0" smtClean="0">
+                <a:solidFill>
+                  <a:srgbClr val="4A4A4A"/>
+                </a:solidFill>
+                <a:latin typeface="Open Sans"/>
+              </a:rPr>
+              <a:t>Pause </a:t>
+            </a:r>
+            <a:r>
+              <a:rPr lang="en-US" sz="1400" dirty="0">
+                <a:solidFill>
+                  <a:srgbClr val="4A4A4A"/>
+                </a:solidFill>
+                <a:latin typeface="Open Sans"/>
+              </a:rPr>
+              <a:t>the container(optional</a:t>
+            </a:r>
+            <a:r>
+              <a:rPr lang="en-US" sz="1400" dirty="0" smtClean="0">
+                <a:solidFill>
+                  <a:srgbClr val="4A4A4A"/>
+                </a:solidFill>
+                <a:latin typeface="Open Sans"/>
+              </a:rPr>
+              <a:t>), </a:t>
+            </a:r>
+            <a:r>
+              <a:rPr lang="en-US" sz="1600" dirty="0" smtClean="0">
+                <a:solidFill>
+                  <a:srgbClr val="4A4A4A"/>
+                </a:solidFill>
+                <a:latin typeface="Open Sans"/>
+              </a:rPr>
+              <a:t>Un-pause </a:t>
+            </a:r>
             <a:r>
               <a:rPr lang="en-US" sz="1600" dirty="0">
                 <a:solidFill>
@@ -17432,14 +17075,17 @@
                 </a:solidFill>
                 <a:latin typeface="Open Sans"/>
               </a:rPr>
-              <a:t>Pause the container(optional)</a:t>
-            </a:r>
-          </a:p>
-          <a:p>
-            <a:pPr lvl="2" algn="just">
-              <a:buFont typeface="Wingdings" pitchFamily="2" charset="2"/>
-              <a:buChar char="q"/>
-            </a:pPr>
+              <a:t>the container(optional</a:t>
+            </a:r>
+            <a:r>
+              <a:rPr lang="en-US" sz="1600" dirty="0" smtClean="0">
+                <a:solidFill>
+                  <a:srgbClr val="4A4A4A"/>
+                </a:solidFill>
+                <a:latin typeface="Open Sans"/>
+              </a:rPr>
+              <a:t>), Start </a:t>
+            </a:r>
             <a:r>
               <a:rPr lang="en-US" sz="1600" dirty="0">
                 <a:solidFill>
@@ -17447,14 +17093,17 @@
                 </a:solidFill>
                 <a:latin typeface="Open Sans"/>
               </a:rPr>
-              <a:t>Un-pause the container(optional)</a:t>
-            </a:r>
-          </a:p>
-          <a:p>
-            <a:pPr lvl="2" algn="just">
-              <a:buFont typeface="Wingdings" pitchFamily="2" charset="2"/>
-              <a:buChar char="q"/>
-            </a:pPr>
+              <a:t>the </a:t>
+            </a:r>
+            <a:r>
+              <a:rPr lang="en-US" sz="1600" dirty="0" smtClean="0">
+                <a:solidFill>
+                  <a:srgbClr val="4A4A4A"/>
+                </a:solidFill>
+                <a:latin typeface="Open Sans"/>
+              </a:rPr>
+              <a:t>container, Stop </a:t>
+            </a:r>
             <a:r>
               <a:rPr lang="en-US" sz="1600" dirty="0">
                 <a:solidFill>
@@ -17462,14 +17111,17 @@
                 </a:solidFill>
                 <a:latin typeface="Open Sans"/>
               </a:rPr>
-              <a:t>Start the container</a:t>
-            </a:r>
-          </a:p>
-          <a:p>
-            <a:pPr lvl="2" algn="just">
-              <a:buFont typeface="Wingdings" pitchFamily="2" charset="2"/>
-              <a:buChar char="q"/>
-            </a:pPr>
+              <a:t>the </a:t>
+            </a:r>
+            <a:r>
+              <a:rPr lang="en-US" sz="1600" dirty="0" smtClean="0">
+                <a:solidFill>
+                  <a:srgbClr val="4A4A4A"/>
+                </a:solidFill>
+                <a:latin typeface="Open Sans"/>
+              </a:rPr>
+              <a:t>container, Restart </a:t>
+            </a:r>
             <a:r>
               <a:rPr lang="en-US" sz="1600" dirty="0">
                 <a:solidFill>
@@ -17477,14 +17129,17 @@
                 </a:solidFill>
                 <a:latin typeface="Open Sans"/>
               </a:rPr>
-              <a:t>Stop the container</a:t>
-            </a:r>
-          </a:p>
-          <a:p>
-            <a:pPr lvl="2" algn="just">
-              <a:buFont typeface="Wingdings" pitchFamily="2" charset="2"/>
-              <a:buChar char="q"/>
-            </a:pPr>
+              <a:t>the </a:t>
+            </a:r>
+            <a:r>
+              <a:rPr lang="en-US" sz="1600" dirty="0" smtClean="0">
+                <a:solidFill>
+                  <a:srgbClr val="4A4A4A"/>
+                </a:solidFill>
+                <a:latin typeface="Open Sans"/>
+              </a:rPr>
+              <a:t>container, Kill </a:t>
+            </a:r>
             <a:r>
               <a:rPr lang="en-US" sz="1600" dirty="0">
                 <a:solidFill>
@@ -17492,38 +17147,236 @@
                 </a:solidFill>
                 <a:latin typeface="Open Sans"/>
               </a:rPr>
-              <a:t>Restart the container</a:t>
-            </a:r>
-          </a:p>
-          <a:p>
-            <a:pPr lvl="2" algn="just">
-              <a:buFont typeface="Wingdings" pitchFamily="2" charset="2"/>
-              <a:buChar char="q"/>
-            </a:pPr>
-            <a:r>
-              <a:rPr lang="en-US" sz="1600" dirty="0">
+              <a:t>the container</a:t>
+            </a:r>
+          </a:p>
+          <a:p>
+            <a:pPr lvl="1" algn="just"/>
+            <a:r>
+              <a:rPr lang="en-US" dirty="0">
                 <a:solidFill>
                   <a:srgbClr val="4A4A4A"/>
                 </a:solidFill>
                 <a:latin typeface="Open Sans"/>
               </a:rPr>
-              <a:t>Kill the container</a:t>
-            </a:r>
-          </a:p>
-          <a:p>
-            <a:pPr lvl="1" algn="just">
-              <a:buFont typeface="Arial"/>
-              <a:buChar char="•"/>
-            </a:pPr>
-            <a:r>
-              <a:rPr lang="en-US" sz="1800" dirty="0">
+              <a:t>Destroy the container</a:t>
+            </a:r>
+          </a:p>
+          <a:p>
+            <a:pPr algn="just"/>
+            <a:r>
+              <a:rPr lang="en-US" dirty="0" err="1">
                 <a:solidFill>
                   <a:srgbClr val="4A4A4A"/>
                 </a:solidFill>
                 <a:latin typeface="Open Sans"/>
               </a:rPr>
-              <a:t>Destroy the container</a:t>
-            </a:r>
+              <a:t>Docker</a:t>
+            </a:r>
+            <a:r>
+              <a:rPr lang="en-US" dirty="0">
+                <a:solidFill>
+                  <a:srgbClr val="4A4A4A"/>
+                </a:solidFill>
+                <a:latin typeface="Open Sans"/>
+              </a:rPr>
+              <a:t> images create </a:t>
+            </a:r>
+            <a:r>
+              <a:rPr lang="en-US" dirty="0" err="1">
+                <a:solidFill>
+                  <a:srgbClr val="4A4A4A"/>
+                </a:solidFill>
+                <a:latin typeface="Open Sans"/>
+              </a:rPr>
+              <a:t>docker</a:t>
+            </a:r>
+            <a:r>
+              <a:rPr lang="en-US" dirty="0">
+                <a:solidFill>
+                  <a:srgbClr val="4A4A4A"/>
+                </a:solidFill>
+                <a:latin typeface="Open Sans"/>
+              </a:rPr>
+              <a:t> containers. There has to be a registry where these </a:t>
+            </a:r>
+            <a:r>
+              <a:rPr lang="en-US" dirty="0" err="1">
+                <a:solidFill>
+                  <a:srgbClr val="4A4A4A"/>
+                </a:solidFill>
+                <a:latin typeface="Open Sans"/>
+              </a:rPr>
+              <a:t>docker</a:t>
+            </a:r>
+            <a:r>
+              <a:rPr lang="en-US" dirty="0">
+                <a:solidFill>
+                  <a:srgbClr val="4A4A4A"/>
+                </a:solidFill>
+                <a:latin typeface="Open Sans"/>
+              </a:rPr>
+              <a:t> images live. This registry is </a:t>
+            </a:r>
+            <a:r>
+              <a:rPr lang="en-US" dirty="0" err="1">
+                <a:solidFill>
+                  <a:srgbClr val="4A4A4A"/>
+                </a:solidFill>
+                <a:latin typeface="Open Sans"/>
+              </a:rPr>
+              <a:t>Docker</a:t>
+            </a:r>
+            <a:r>
+              <a:rPr lang="en-US" dirty="0">
+                <a:solidFill>
+                  <a:srgbClr val="4A4A4A"/>
+                </a:solidFill>
+                <a:latin typeface="Open Sans"/>
+              </a:rPr>
+              <a:t> Hub. Users can pick up images from </a:t>
+            </a:r>
+            <a:r>
+              <a:rPr lang="en-US" dirty="0" err="1">
+                <a:solidFill>
+                  <a:srgbClr val="4A4A4A"/>
+                </a:solidFill>
+                <a:latin typeface="Open Sans"/>
+              </a:rPr>
+              <a:t>Docker</a:t>
+            </a:r>
+            <a:r>
+              <a:rPr lang="en-US" dirty="0">
+                <a:solidFill>
+                  <a:srgbClr val="4A4A4A"/>
+                </a:solidFill>
+                <a:latin typeface="Open Sans"/>
+              </a:rPr>
+              <a:t> Hub and use them to create customized images and containers. Currently, the </a:t>
+            </a:r>
+            <a:r>
+              <a:rPr lang="en-US" dirty="0" err="1">
+                <a:solidFill>
+                  <a:srgbClr val="4A4A4A"/>
+                </a:solidFill>
+                <a:latin typeface="Open Sans"/>
+              </a:rPr>
+              <a:t>Docker</a:t>
+            </a:r>
+            <a:r>
+              <a:rPr lang="en-US" dirty="0">
+                <a:solidFill>
+                  <a:srgbClr val="4A4A4A"/>
+                </a:solidFill>
+                <a:latin typeface="Open Sans"/>
+              </a:rPr>
+              <a:t> hub(hub.docker.com) is the world’s largest public repository of image containers.</a:t>
+            </a:r>
+          </a:p>
+          <a:p>
+            <a:pPr algn="just"/>
+            <a:r>
+              <a:rPr lang="en-US" b="1" dirty="0" err="1">
+                <a:solidFill>
+                  <a:srgbClr val="4A4A4A"/>
+                </a:solidFill>
+                <a:latin typeface="Open Sans"/>
+              </a:rPr>
+              <a:t>Docker</a:t>
+            </a:r>
+            <a:r>
+              <a:rPr lang="en-US" b="1" dirty="0">
+                <a:solidFill>
+                  <a:srgbClr val="4A4A4A"/>
+                </a:solidFill>
+                <a:latin typeface="Open Sans"/>
+              </a:rPr>
+              <a:t> machine </a:t>
+            </a:r>
+            <a:r>
+              <a:rPr lang="en-US" dirty="0">
+                <a:solidFill>
+                  <a:srgbClr val="4A4A4A"/>
+                </a:solidFill>
+                <a:latin typeface="Open Sans"/>
+              </a:rPr>
+              <a:t>is a tool that lets you install </a:t>
+            </a:r>
+            <a:r>
+              <a:rPr lang="en-US" dirty="0" err="1">
+                <a:solidFill>
+                  <a:srgbClr val="4A4A4A"/>
+                </a:solidFill>
+                <a:latin typeface="Open Sans"/>
+              </a:rPr>
+              <a:t>Docker</a:t>
+            </a:r>
+            <a:r>
+              <a:rPr lang="en-US" dirty="0">
+                <a:solidFill>
+                  <a:srgbClr val="4A4A4A"/>
+                </a:solidFill>
+                <a:latin typeface="Open Sans"/>
+              </a:rPr>
+              <a:t> Engine on virtual hosts. These hosts can now be managed using the </a:t>
+            </a:r>
+            <a:r>
+              <a:rPr lang="en-US" dirty="0" err="1">
+                <a:solidFill>
+                  <a:srgbClr val="4A4A4A"/>
+                </a:solidFill>
+                <a:latin typeface="Open Sans"/>
+              </a:rPr>
+              <a:t>docker</a:t>
+            </a:r>
+            <a:r>
+              <a:rPr lang="en-US" dirty="0">
+                <a:solidFill>
+                  <a:srgbClr val="4A4A4A"/>
+                </a:solidFill>
+                <a:latin typeface="Open Sans"/>
+              </a:rPr>
+              <a:t>-machine commands. </a:t>
+            </a:r>
+            <a:r>
+              <a:rPr lang="en-US" dirty="0" err="1">
+                <a:solidFill>
+                  <a:srgbClr val="4A4A4A"/>
+                </a:solidFill>
+                <a:latin typeface="Open Sans"/>
+              </a:rPr>
+              <a:t>Docker</a:t>
+            </a:r>
+            <a:r>
+              <a:rPr lang="en-US" dirty="0">
+                <a:solidFill>
+                  <a:srgbClr val="4A4A4A"/>
+                </a:solidFill>
+                <a:latin typeface="Open Sans"/>
+              </a:rPr>
+              <a:t> machine also lets you provision </a:t>
+            </a:r>
+            <a:r>
+              <a:rPr lang="en-US" dirty="0" err="1">
+                <a:solidFill>
+                  <a:srgbClr val="4A4A4A"/>
+                </a:solidFill>
+                <a:latin typeface="Open Sans"/>
+              </a:rPr>
+              <a:t>Docker</a:t>
+            </a:r>
+            <a:r>
+              <a:rPr lang="en-US" dirty="0">
+                <a:solidFill>
+                  <a:srgbClr val="4A4A4A"/>
+                </a:solidFill>
+                <a:latin typeface="Open Sans"/>
+              </a:rPr>
+              <a:t> Swarm Clusters.</a:t>
+            </a:r>
+            <a:endParaRPr lang="en-US" dirty="0">
+              <a:latin typeface="Open Sans"/>
+            </a:endParaRPr>
           </a:p>
           <a:p>
             <a:pPr algn="just"/>
@@ -17809,7 +17662,7 @@
   <a:extraClrSchemeLst/>
   <a:extLst>
     <a:ext uri="{05A4C25C-085E-4340-85A3-A5531E510DB2}">
-      <thm15:themeFamily xmlns:thm15="http://schemas.microsoft.com/office/thememl/2012/main" xmlns="" name="TF10001029" id="{ED3996BA-162B-43C7-B0E2-A5CA4E649741}" vid="{187088E4-27D7-4455-856F-4A44258D82E2}"/>
+      <thm15:themeFamily xmlns="" xmlns:thm15="http://schemas.microsoft.com/office/thememl/2012/main" name="TF10001029" id="{ED3996BA-162B-43C7-B0E2-A5CA4E649741}" vid="{187088E4-27D7-4455-856F-4A44258D82E2}"/>
     </a:ext>
   </a:extLst>
 </a:theme>

</xml_diff>